<commit_message>
PPT updated with a little new concept
- Each car will touch the finish line
- outside the track on both ends will contain grass to make it look realistic
- After the finish line is touched each car will pop-up location notifier with a pop-up animation
</commit_message>
<xml_diff>
--- a/design/01_racing/PPT.pptx
+++ b/design/01_racing/PPT.pptx
@@ -6,7 +6,8 @@
   </p:sldMasterIdLst>
   <p:sldIdLst>
     <p:sldId id="262" r:id="rId2"/>
-    <p:sldId id="263" r:id="rId3"/>
+    <p:sldId id="264" r:id="rId3"/>
+    <p:sldId id="263" r:id="rId4"/>
   </p:sldIdLst>
   <p:sldSz cx="18288000" cy="8686800"/>
   <p:notesSz cx="6858000" cy="9144000"/>
@@ -107,7 +108,7 @@
   </p:defaultTextStyle>
   <p:extLst>
     <p:ext uri="{EFAFB233-063F-42B5-8137-9DF3F51BA10A}">
-      <p15:sldGuideLst xmlns:p15="http://schemas.microsoft.com/office/powerpoint/2012/main"/>
+      <p15:sldGuideLst xmlns:p15="http://schemas.microsoft.com/office/powerpoint/2012/main" xmlns=""/>
     </p:ext>
   </p:extLst>
 </p:presentation>
@@ -244,7 +245,8 @@
           <a:p>
             <a:fld id="{4A67168B-EF9D-4A0B-8783-2CEE5FA2BE28}" type="datetimeFigureOut">
               <a:rPr lang="en-US" smtClean="0"/>
-              <a:t>09-May-21</a:t>
+              <a:pPr/>
+              <a:t>5/9/2021</a:t>
             </a:fld>
             <a:endParaRPr lang="en-US"/>
           </a:p>
@@ -286,6 +288,7 @@
           <a:p>
             <a:fld id="{5D13870C-CD20-40CB-B8BD-EE031D95C12B}" type="slidenum">
               <a:rPr lang="en-US" smtClean="0"/>
+              <a:pPr/>
               <a:t>‹#›</a:t>
             </a:fld>
             <a:endParaRPr lang="en-US"/>
@@ -295,7 +298,7 @@
     </p:spTree>
     <p:extLst>
       <p:ext uri="{BB962C8B-B14F-4D97-AF65-F5344CB8AC3E}">
-        <p14:creationId xmlns:p14="http://schemas.microsoft.com/office/powerpoint/2010/main" val="967739211"/>
+        <p14:creationId xmlns:p14="http://schemas.microsoft.com/office/powerpoint/2010/main" xmlns="" val="967739211"/>
       </p:ext>
     </p:extLst>
   </p:cSld>
@@ -414,7 +417,8 @@
           <a:p>
             <a:fld id="{4A67168B-EF9D-4A0B-8783-2CEE5FA2BE28}" type="datetimeFigureOut">
               <a:rPr lang="en-US" smtClean="0"/>
-              <a:t>09-May-21</a:t>
+              <a:pPr/>
+              <a:t>5/9/2021</a:t>
             </a:fld>
             <a:endParaRPr lang="en-US"/>
           </a:p>
@@ -456,6 +460,7 @@
           <a:p>
             <a:fld id="{5D13870C-CD20-40CB-B8BD-EE031D95C12B}" type="slidenum">
               <a:rPr lang="en-US" smtClean="0"/>
+              <a:pPr/>
               <a:t>‹#›</a:t>
             </a:fld>
             <a:endParaRPr lang="en-US"/>
@@ -465,7 +470,7 @@
     </p:spTree>
     <p:extLst>
       <p:ext uri="{BB962C8B-B14F-4D97-AF65-F5344CB8AC3E}">
-        <p14:creationId xmlns:p14="http://schemas.microsoft.com/office/powerpoint/2010/main" val="3379344108"/>
+        <p14:creationId xmlns:p14="http://schemas.microsoft.com/office/powerpoint/2010/main" xmlns="" val="3379344108"/>
       </p:ext>
     </p:extLst>
   </p:cSld>
@@ -594,7 +599,8 @@
           <a:p>
             <a:fld id="{4A67168B-EF9D-4A0B-8783-2CEE5FA2BE28}" type="datetimeFigureOut">
               <a:rPr lang="en-US" smtClean="0"/>
-              <a:t>09-May-21</a:t>
+              <a:pPr/>
+              <a:t>5/9/2021</a:t>
             </a:fld>
             <a:endParaRPr lang="en-US"/>
           </a:p>
@@ -636,6 +642,7 @@
           <a:p>
             <a:fld id="{5D13870C-CD20-40CB-B8BD-EE031D95C12B}" type="slidenum">
               <a:rPr lang="en-US" smtClean="0"/>
+              <a:pPr/>
               <a:t>‹#›</a:t>
             </a:fld>
             <a:endParaRPr lang="en-US"/>
@@ -645,7 +652,7 @@
     </p:spTree>
     <p:extLst>
       <p:ext uri="{BB962C8B-B14F-4D97-AF65-F5344CB8AC3E}">
-        <p14:creationId xmlns:p14="http://schemas.microsoft.com/office/powerpoint/2010/main" val="1222268438"/>
+        <p14:creationId xmlns:p14="http://schemas.microsoft.com/office/powerpoint/2010/main" xmlns="" val="1222268438"/>
       </p:ext>
     </p:extLst>
   </p:cSld>
@@ -764,7 +771,8 @@
           <a:p>
             <a:fld id="{4A67168B-EF9D-4A0B-8783-2CEE5FA2BE28}" type="datetimeFigureOut">
               <a:rPr lang="en-US" smtClean="0"/>
-              <a:t>09-May-21</a:t>
+              <a:pPr/>
+              <a:t>5/9/2021</a:t>
             </a:fld>
             <a:endParaRPr lang="en-US"/>
           </a:p>
@@ -806,6 +814,7 @@
           <a:p>
             <a:fld id="{5D13870C-CD20-40CB-B8BD-EE031D95C12B}" type="slidenum">
               <a:rPr lang="en-US" smtClean="0"/>
+              <a:pPr/>
               <a:t>‹#›</a:t>
             </a:fld>
             <a:endParaRPr lang="en-US"/>
@@ -815,7 +824,7 @@
     </p:spTree>
     <p:extLst>
       <p:ext uri="{BB962C8B-B14F-4D97-AF65-F5344CB8AC3E}">
-        <p14:creationId xmlns:p14="http://schemas.microsoft.com/office/powerpoint/2010/main" val="229408001"/>
+        <p14:creationId xmlns:p14="http://schemas.microsoft.com/office/powerpoint/2010/main" xmlns="" val="229408001"/>
       </p:ext>
     </p:extLst>
   </p:cSld>
@@ -1010,7 +1019,8 @@
           <a:p>
             <a:fld id="{4A67168B-EF9D-4A0B-8783-2CEE5FA2BE28}" type="datetimeFigureOut">
               <a:rPr lang="en-US" smtClean="0"/>
-              <a:t>09-May-21</a:t>
+              <a:pPr/>
+              <a:t>5/9/2021</a:t>
             </a:fld>
             <a:endParaRPr lang="en-US"/>
           </a:p>
@@ -1052,6 +1062,7 @@
           <a:p>
             <a:fld id="{5D13870C-CD20-40CB-B8BD-EE031D95C12B}" type="slidenum">
               <a:rPr lang="en-US" smtClean="0"/>
+              <a:pPr/>
               <a:t>‹#›</a:t>
             </a:fld>
             <a:endParaRPr lang="en-US"/>
@@ -1061,7 +1072,7 @@
     </p:spTree>
     <p:extLst>
       <p:ext uri="{BB962C8B-B14F-4D97-AF65-F5344CB8AC3E}">
-        <p14:creationId xmlns:p14="http://schemas.microsoft.com/office/powerpoint/2010/main" val="1114941216"/>
+        <p14:creationId xmlns:p14="http://schemas.microsoft.com/office/powerpoint/2010/main" xmlns="" val="1114941216"/>
       </p:ext>
     </p:extLst>
   </p:cSld>
@@ -1242,7 +1253,8 @@
           <a:p>
             <a:fld id="{4A67168B-EF9D-4A0B-8783-2CEE5FA2BE28}" type="datetimeFigureOut">
               <a:rPr lang="en-US" smtClean="0"/>
-              <a:t>09-May-21</a:t>
+              <a:pPr/>
+              <a:t>5/9/2021</a:t>
             </a:fld>
             <a:endParaRPr lang="en-US"/>
           </a:p>
@@ -1284,6 +1296,7 @@
           <a:p>
             <a:fld id="{5D13870C-CD20-40CB-B8BD-EE031D95C12B}" type="slidenum">
               <a:rPr lang="en-US" smtClean="0"/>
+              <a:pPr/>
               <a:t>‹#›</a:t>
             </a:fld>
             <a:endParaRPr lang="en-US"/>
@@ -1293,7 +1306,7 @@
     </p:spTree>
     <p:extLst>
       <p:ext uri="{BB962C8B-B14F-4D97-AF65-F5344CB8AC3E}">
-        <p14:creationId xmlns:p14="http://schemas.microsoft.com/office/powerpoint/2010/main" val="930451477"/>
+        <p14:creationId xmlns:p14="http://schemas.microsoft.com/office/powerpoint/2010/main" xmlns="" val="930451477"/>
       </p:ext>
     </p:extLst>
   </p:cSld>
@@ -1609,7 +1622,8 @@
           <a:p>
             <a:fld id="{4A67168B-EF9D-4A0B-8783-2CEE5FA2BE28}" type="datetimeFigureOut">
               <a:rPr lang="en-US" smtClean="0"/>
-              <a:t>09-May-21</a:t>
+              <a:pPr/>
+              <a:t>5/9/2021</a:t>
             </a:fld>
             <a:endParaRPr lang="en-US"/>
           </a:p>
@@ -1651,6 +1665,7 @@
           <a:p>
             <a:fld id="{5D13870C-CD20-40CB-B8BD-EE031D95C12B}" type="slidenum">
               <a:rPr lang="en-US" smtClean="0"/>
+              <a:pPr/>
               <a:t>‹#›</a:t>
             </a:fld>
             <a:endParaRPr lang="en-US"/>
@@ -1660,7 +1675,7 @@
     </p:spTree>
     <p:extLst>
       <p:ext uri="{BB962C8B-B14F-4D97-AF65-F5344CB8AC3E}">
-        <p14:creationId xmlns:p14="http://schemas.microsoft.com/office/powerpoint/2010/main" val="2704284776"/>
+        <p14:creationId xmlns:p14="http://schemas.microsoft.com/office/powerpoint/2010/main" xmlns="" val="2704284776"/>
       </p:ext>
     </p:extLst>
   </p:cSld>
@@ -1727,7 +1742,8 @@
           <a:p>
             <a:fld id="{4A67168B-EF9D-4A0B-8783-2CEE5FA2BE28}" type="datetimeFigureOut">
               <a:rPr lang="en-US" smtClean="0"/>
-              <a:t>09-May-21</a:t>
+              <a:pPr/>
+              <a:t>5/9/2021</a:t>
             </a:fld>
             <a:endParaRPr lang="en-US"/>
           </a:p>
@@ -1769,6 +1785,7 @@
           <a:p>
             <a:fld id="{5D13870C-CD20-40CB-B8BD-EE031D95C12B}" type="slidenum">
               <a:rPr lang="en-US" smtClean="0"/>
+              <a:pPr/>
               <a:t>‹#›</a:t>
             </a:fld>
             <a:endParaRPr lang="en-US"/>
@@ -1778,7 +1795,7 @@
     </p:spTree>
     <p:extLst>
       <p:ext uri="{BB962C8B-B14F-4D97-AF65-F5344CB8AC3E}">
-        <p14:creationId xmlns:p14="http://schemas.microsoft.com/office/powerpoint/2010/main" val="1414016009"/>
+        <p14:creationId xmlns:p14="http://schemas.microsoft.com/office/powerpoint/2010/main" xmlns="" val="1414016009"/>
       </p:ext>
     </p:extLst>
   </p:cSld>
@@ -1822,7 +1839,8 @@
           <a:p>
             <a:fld id="{4A67168B-EF9D-4A0B-8783-2CEE5FA2BE28}" type="datetimeFigureOut">
               <a:rPr lang="en-US" smtClean="0"/>
-              <a:t>09-May-21</a:t>
+              <a:pPr/>
+              <a:t>5/9/2021</a:t>
             </a:fld>
             <a:endParaRPr lang="en-US"/>
           </a:p>
@@ -1864,6 +1882,7 @@
           <a:p>
             <a:fld id="{5D13870C-CD20-40CB-B8BD-EE031D95C12B}" type="slidenum">
               <a:rPr lang="en-US" smtClean="0"/>
+              <a:pPr/>
               <a:t>‹#›</a:t>
             </a:fld>
             <a:endParaRPr lang="en-US"/>
@@ -1873,7 +1892,7 @@
     </p:spTree>
     <p:extLst>
       <p:ext uri="{BB962C8B-B14F-4D97-AF65-F5344CB8AC3E}">
-        <p14:creationId xmlns:p14="http://schemas.microsoft.com/office/powerpoint/2010/main" val="1966812025"/>
+        <p14:creationId xmlns:p14="http://schemas.microsoft.com/office/powerpoint/2010/main" xmlns="" val="1966812025"/>
       </p:ext>
     </p:extLst>
   </p:cSld>
@@ -2099,7 +2118,8 @@
           <a:p>
             <a:fld id="{4A67168B-EF9D-4A0B-8783-2CEE5FA2BE28}" type="datetimeFigureOut">
               <a:rPr lang="en-US" smtClean="0"/>
-              <a:t>09-May-21</a:t>
+              <a:pPr/>
+              <a:t>5/9/2021</a:t>
             </a:fld>
             <a:endParaRPr lang="en-US"/>
           </a:p>
@@ -2141,6 +2161,7 @@
           <a:p>
             <a:fld id="{5D13870C-CD20-40CB-B8BD-EE031D95C12B}" type="slidenum">
               <a:rPr lang="en-US" smtClean="0"/>
+              <a:pPr/>
               <a:t>‹#›</a:t>
             </a:fld>
             <a:endParaRPr lang="en-US"/>
@@ -2150,7 +2171,7 @@
     </p:spTree>
     <p:extLst>
       <p:ext uri="{BB962C8B-B14F-4D97-AF65-F5344CB8AC3E}">
-        <p14:creationId xmlns:p14="http://schemas.microsoft.com/office/powerpoint/2010/main" val="3101190381"/>
+        <p14:creationId xmlns:p14="http://schemas.microsoft.com/office/powerpoint/2010/main" xmlns="" val="3101190381"/>
       </p:ext>
     </p:extLst>
   </p:cSld>
@@ -2356,7 +2377,8 @@
           <a:p>
             <a:fld id="{4A67168B-EF9D-4A0B-8783-2CEE5FA2BE28}" type="datetimeFigureOut">
               <a:rPr lang="en-US" smtClean="0"/>
-              <a:t>09-May-21</a:t>
+              <a:pPr/>
+              <a:t>5/9/2021</a:t>
             </a:fld>
             <a:endParaRPr lang="en-US"/>
           </a:p>
@@ -2398,6 +2420,7 @@
           <a:p>
             <a:fld id="{5D13870C-CD20-40CB-B8BD-EE031D95C12B}" type="slidenum">
               <a:rPr lang="en-US" smtClean="0"/>
+              <a:pPr/>
               <a:t>‹#›</a:t>
             </a:fld>
             <a:endParaRPr lang="en-US"/>
@@ -2407,7 +2430,7 @@
     </p:spTree>
     <p:extLst>
       <p:ext uri="{BB962C8B-B14F-4D97-AF65-F5344CB8AC3E}">
-        <p14:creationId xmlns:p14="http://schemas.microsoft.com/office/powerpoint/2010/main" val="7323608"/>
+        <p14:creationId xmlns:p14="http://schemas.microsoft.com/office/powerpoint/2010/main" xmlns="" val="7323608"/>
       </p:ext>
     </p:extLst>
   </p:cSld>
@@ -2569,7 +2592,8 @@
           <a:p>
             <a:fld id="{4A67168B-EF9D-4A0B-8783-2CEE5FA2BE28}" type="datetimeFigureOut">
               <a:rPr lang="en-US" smtClean="0"/>
-              <a:t>09-May-21</a:t>
+              <a:pPr/>
+              <a:t>5/9/2021</a:t>
             </a:fld>
             <a:endParaRPr lang="en-US"/>
           </a:p>
@@ -2647,6 +2671,7 @@
           <a:p>
             <a:fld id="{5D13870C-CD20-40CB-B8BD-EE031D95C12B}" type="slidenum">
               <a:rPr lang="en-US" smtClean="0"/>
+              <a:pPr/>
               <a:t>‹#›</a:t>
             </a:fld>
             <a:endParaRPr lang="en-US"/>
@@ -2656,7 +2681,7 @@
     </p:spTree>
     <p:extLst>
       <p:ext uri="{BB962C8B-B14F-4D97-AF65-F5344CB8AC3E}">
-        <p14:creationId xmlns:p14="http://schemas.microsoft.com/office/powerpoint/2010/main" val="1218410339"/>
+        <p14:creationId xmlns:p14="http://schemas.microsoft.com/office/powerpoint/2010/main" xmlns="" val="1218410339"/>
       </p:ext>
     </p:extLst>
   </p:cSld>
@@ -2987,7 +3012,7 @@
           <p:cNvPr id="84" name="racing track EOS">
             <a:extLst>
               <a:ext uri="{FF2B5EF4-FFF2-40B4-BE49-F238E27FC236}">
-                <a16:creationId xmlns:a16="http://schemas.microsoft.com/office/drawing/2014/main" id="{85FD0623-8AD8-45A7-9652-A5C69AA5F460}"/>
+                <a16:creationId xmlns:a16="http://schemas.microsoft.com/office/drawing/2014/main" xmlns="" id="{85FD0623-8AD8-45A7-9652-A5C69AA5F460}"/>
               </a:ext>
             </a:extLst>
           </p:cNvPr>
@@ -3007,7 +3032,7 @@
             <p:cNvPr id="85" name="Picture 84">
               <a:extLst>
                 <a:ext uri="{FF2B5EF4-FFF2-40B4-BE49-F238E27FC236}">
-                  <a16:creationId xmlns:a16="http://schemas.microsoft.com/office/drawing/2014/main" id="{7735410B-AECA-4BF2-BC5C-4EA1783F58DC}"/>
+                  <a16:creationId xmlns:a16="http://schemas.microsoft.com/office/drawing/2014/main" xmlns="" id="{7735410B-AECA-4BF2-BC5C-4EA1783F58DC}"/>
                 </a:ext>
               </a:extLst>
             </p:cNvPr>
@@ -3017,13 +3042,13 @@
             <p:nvPr/>
           </p:nvPicPr>
           <p:blipFill rotWithShape="1">
-            <a:blip r:embed="rId2">
+            <a:blip r:embed="rId2" cstate="print">
               <a:extLst>
                 <a:ext uri="{28A0092B-C50C-407E-A947-70E740481C1C}">
-                  <a14:useLocalDpi xmlns:a14="http://schemas.microsoft.com/office/drawing/2010/main" val="0"/>
+                  <a14:useLocalDpi xmlns:a14="http://schemas.microsoft.com/office/drawing/2010/main" xmlns="" val="0"/>
                 </a:ext>
                 <a:ext uri="{837473B0-CC2E-450A-ABE3-18F120FF3D39}">
-                  <a1611:picAttrSrcUrl xmlns:a1611="http://schemas.microsoft.com/office/drawing/2016/11/main" r:id="rId3"/>
+                  <a1611:picAttrSrcUrl xmlns:a1611="http://schemas.microsoft.com/office/drawing/2016/11/main" xmlns="" r:id="rId3"/>
                 </a:ext>
               </a:extLst>
             </a:blip>
@@ -3045,7 +3070,7 @@
             <p:cNvPr id="86" name="Straight Connector 85">
               <a:extLst>
                 <a:ext uri="{FF2B5EF4-FFF2-40B4-BE49-F238E27FC236}">
-                  <a16:creationId xmlns:a16="http://schemas.microsoft.com/office/drawing/2014/main" id="{AE385433-D3F1-473E-BE7B-C4DFF3E5CA44}"/>
+                  <a16:creationId xmlns:a16="http://schemas.microsoft.com/office/drawing/2014/main" xmlns="" id="{AE385433-D3F1-473E-BE7B-C4DFF3E5CA44}"/>
                 </a:ext>
               </a:extLst>
             </p:cNvPr>
@@ -3088,7 +3113,7 @@
             <p:cNvPr id="87" name="Straight Connector 86">
               <a:extLst>
                 <a:ext uri="{FF2B5EF4-FFF2-40B4-BE49-F238E27FC236}">
-                  <a16:creationId xmlns:a16="http://schemas.microsoft.com/office/drawing/2014/main" id="{4294BC53-FDBA-43F3-B4A7-77371FFD2C60}"/>
+                  <a16:creationId xmlns:a16="http://schemas.microsoft.com/office/drawing/2014/main" xmlns="" id="{4294BC53-FDBA-43F3-B4A7-77371FFD2C60}"/>
                 </a:ext>
               </a:extLst>
             </p:cNvPr>
@@ -3131,7 +3156,7 @@
             <p:cNvPr id="88" name="Straight Connector 87">
               <a:extLst>
                 <a:ext uri="{FF2B5EF4-FFF2-40B4-BE49-F238E27FC236}">
-                  <a16:creationId xmlns:a16="http://schemas.microsoft.com/office/drawing/2014/main" id="{7CB90548-CCAF-4A63-AA7B-02FD8A2EA000}"/>
+                  <a16:creationId xmlns:a16="http://schemas.microsoft.com/office/drawing/2014/main" xmlns="" id="{7CB90548-CCAF-4A63-AA7B-02FD8A2EA000}"/>
                 </a:ext>
               </a:extLst>
             </p:cNvPr>
@@ -3174,7 +3199,7 @@
             <p:cNvPr id="89" name="Straight Connector 88">
               <a:extLst>
                 <a:ext uri="{FF2B5EF4-FFF2-40B4-BE49-F238E27FC236}">
-                  <a16:creationId xmlns:a16="http://schemas.microsoft.com/office/drawing/2014/main" id="{701C408C-62FB-42B3-ACC3-3D23687B8E94}"/>
+                  <a16:creationId xmlns:a16="http://schemas.microsoft.com/office/drawing/2014/main" xmlns="" id="{701C408C-62FB-42B3-ACC3-3D23687B8E94}"/>
                 </a:ext>
               </a:extLst>
             </p:cNvPr>
@@ -3217,7 +3242,7 @@
             <p:cNvPr id="90" name="Straight Connector 89">
               <a:extLst>
                 <a:ext uri="{FF2B5EF4-FFF2-40B4-BE49-F238E27FC236}">
-                  <a16:creationId xmlns:a16="http://schemas.microsoft.com/office/drawing/2014/main" id="{A4AE1794-50D5-4F0D-B99D-2F27B413496B}"/>
+                  <a16:creationId xmlns:a16="http://schemas.microsoft.com/office/drawing/2014/main" xmlns="" id="{A4AE1794-50D5-4F0D-B99D-2F27B413496B}"/>
                 </a:ext>
               </a:extLst>
             </p:cNvPr>
@@ -3260,7 +3285,7 @@
             <p:cNvPr id="91" name="Straight Connector 90">
               <a:extLst>
                 <a:ext uri="{FF2B5EF4-FFF2-40B4-BE49-F238E27FC236}">
-                  <a16:creationId xmlns:a16="http://schemas.microsoft.com/office/drawing/2014/main" id="{0C3FC505-109B-414B-B1B0-A26E39459852}"/>
+                  <a16:creationId xmlns:a16="http://schemas.microsoft.com/office/drawing/2014/main" xmlns="" id="{0C3FC505-109B-414B-B1B0-A26E39459852}"/>
                 </a:ext>
               </a:extLst>
             </p:cNvPr>
@@ -3303,7 +3328,7 @@
             <p:cNvPr id="92" name="Straight Connector 91">
               <a:extLst>
                 <a:ext uri="{FF2B5EF4-FFF2-40B4-BE49-F238E27FC236}">
-                  <a16:creationId xmlns:a16="http://schemas.microsoft.com/office/drawing/2014/main" id="{4A570AEB-56D7-4817-97DE-60E66AF1F686}"/>
+                  <a16:creationId xmlns:a16="http://schemas.microsoft.com/office/drawing/2014/main" xmlns="" id="{4A570AEB-56D7-4817-97DE-60E66AF1F686}"/>
                 </a:ext>
               </a:extLst>
             </p:cNvPr>
@@ -3346,7 +3371,7 @@
             <p:cNvPr id="93" name="Straight Connector 92">
               <a:extLst>
                 <a:ext uri="{FF2B5EF4-FFF2-40B4-BE49-F238E27FC236}">
-                  <a16:creationId xmlns:a16="http://schemas.microsoft.com/office/drawing/2014/main" id="{FECC3B51-D918-4C53-824A-7F9A6964789A}"/>
+                  <a16:creationId xmlns:a16="http://schemas.microsoft.com/office/drawing/2014/main" xmlns="" id="{FECC3B51-D918-4C53-824A-7F9A6964789A}"/>
                 </a:ext>
               </a:extLst>
             </p:cNvPr>
@@ -3389,7 +3414,7 @@
             <p:cNvPr id="94" name="Straight Connector 93">
               <a:extLst>
                 <a:ext uri="{FF2B5EF4-FFF2-40B4-BE49-F238E27FC236}">
-                  <a16:creationId xmlns:a16="http://schemas.microsoft.com/office/drawing/2014/main" id="{A185CDC6-4A0D-43D9-B4FF-9E5A92602C91}"/>
+                  <a16:creationId xmlns:a16="http://schemas.microsoft.com/office/drawing/2014/main" xmlns="" id="{A185CDC6-4A0D-43D9-B4FF-9E5A92602C91}"/>
                 </a:ext>
               </a:extLst>
             </p:cNvPr>
@@ -3432,7 +3457,7 @@
             <p:cNvPr id="95" name="Straight Connector 94">
               <a:extLst>
                 <a:ext uri="{FF2B5EF4-FFF2-40B4-BE49-F238E27FC236}">
-                  <a16:creationId xmlns:a16="http://schemas.microsoft.com/office/drawing/2014/main" id="{887B49AE-F474-441F-905A-F5759B7EE634}"/>
+                  <a16:creationId xmlns:a16="http://schemas.microsoft.com/office/drawing/2014/main" xmlns="" id="{887B49AE-F474-441F-905A-F5759B7EE634}"/>
                 </a:ext>
               </a:extLst>
             </p:cNvPr>
@@ -3475,7 +3500,7 @@
             <p:cNvPr id="96" name="Straight Connector 95">
               <a:extLst>
                 <a:ext uri="{FF2B5EF4-FFF2-40B4-BE49-F238E27FC236}">
-                  <a16:creationId xmlns:a16="http://schemas.microsoft.com/office/drawing/2014/main" id="{F4170704-41DE-4468-965B-FA8A7DA47582}"/>
+                  <a16:creationId xmlns:a16="http://schemas.microsoft.com/office/drawing/2014/main" xmlns="" id="{F4170704-41DE-4468-965B-FA8A7DA47582}"/>
                 </a:ext>
               </a:extLst>
             </p:cNvPr>
@@ -3518,7 +3543,7 @@
             <p:cNvPr id="97" name="Straight Connector 96">
               <a:extLst>
                 <a:ext uri="{FF2B5EF4-FFF2-40B4-BE49-F238E27FC236}">
-                  <a16:creationId xmlns:a16="http://schemas.microsoft.com/office/drawing/2014/main" id="{F72968C5-C328-4CAE-BD2A-9A5896B6ADEA}"/>
+                  <a16:creationId xmlns:a16="http://schemas.microsoft.com/office/drawing/2014/main" xmlns="" id="{F72968C5-C328-4CAE-BD2A-9A5896B6ADEA}"/>
                 </a:ext>
               </a:extLst>
             </p:cNvPr>
@@ -3561,7 +3586,7 @@
             <p:cNvPr id="98" name="Straight Connector 97">
               <a:extLst>
                 <a:ext uri="{FF2B5EF4-FFF2-40B4-BE49-F238E27FC236}">
-                  <a16:creationId xmlns:a16="http://schemas.microsoft.com/office/drawing/2014/main" id="{E0C47198-3A9F-46B9-A0C4-010AB0DF4E7E}"/>
+                  <a16:creationId xmlns:a16="http://schemas.microsoft.com/office/drawing/2014/main" xmlns="" id="{E0C47198-3A9F-46B9-A0C4-010AB0DF4E7E}"/>
                 </a:ext>
               </a:extLst>
             </p:cNvPr>
@@ -3604,7 +3629,7 @@
             <p:cNvPr id="99" name="Straight Connector 98">
               <a:extLst>
                 <a:ext uri="{FF2B5EF4-FFF2-40B4-BE49-F238E27FC236}">
-                  <a16:creationId xmlns:a16="http://schemas.microsoft.com/office/drawing/2014/main" id="{155E1828-2500-48CC-B2DA-534696D89B6D}"/>
+                  <a16:creationId xmlns:a16="http://schemas.microsoft.com/office/drawing/2014/main" xmlns="" id="{155E1828-2500-48CC-B2DA-534696D89B6D}"/>
                 </a:ext>
               </a:extLst>
             </p:cNvPr>
@@ -3647,7 +3672,7 @@
             <p:cNvPr id="100" name="Straight Connector 99">
               <a:extLst>
                 <a:ext uri="{FF2B5EF4-FFF2-40B4-BE49-F238E27FC236}">
-                  <a16:creationId xmlns:a16="http://schemas.microsoft.com/office/drawing/2014/main" id="{D9F4F903-B736-4556-B79B-41DA97B5E16F}"/>
+                  <a16:creationId xmlns:a16="http://schemas.microsoft.com/office/drawing/2014/main" xmlns="" id="{D9F4F903-B736-4556-B79B-41DA97B5E16F}"/>
                 </a:ext>
               </a:extLst>
             </p:cNvPr>
@@ -3690,7 +3715,7 @@
             <p:cNvPr id="101" name="Straight Connector 100">
               <a:extLst>
                 <a:ext uri="{FF2B5EF4-FFF2-40B4-BE49-F238E27FC236}">
-                  <a16:creationId xmlns:a16="http://schemas.microsoft.com/office/drawing/2014/main" id="{56117362-2098-4FCE-BA2E-09BCCC5D312C}"/>
+                  <a16:creationId xmlns:a16="http://schemas.microsoft.com/office/drawing/2014/main" xmlns="" id="{56117362-2098-4FCE-BA2E-09BCCC5D312C}"/>
                 </a:ext>
               </a:extLst>
             </p:cNvPr>
@@ -3733,7 +3758,7 @@
             <p:cNvPr id="102" name="Straight Connector 101">
               <a:extLst>
                 <a:ext uri="{FF2B5EF4-FFF2-40B4-BE49-F238E27FC236}">
-                  <a16:creationId xmlns:a16="http://schemas.microsoft.com/office/drawing/2014/main" id="{BE169206-38DB-476F-A263-1DD8F813E0FC}"/>
+                  <a16:creationId xmlns:a16="http://schemas.microsoft.com/office/drawing/2014/main" xmlns="" id="{BE169206-38DB-476F-A263-1DD8F813E0FC}"/>
                 </a:ext>
               </a:extLst>
             </p:cNvPr>
@@ -3776,7 +3801,7 @@
             <p:cNvPr id="103" name="Straight Connector 102">
               <a:extLst>
                 <a:ext uri="{FF2B5EF4-FFF2-40B4-BE49-F238E27FC236}">
-                  <a16:creationId xmlns:a16="http://schemas.microsoft.com/office/drawing/2014/main" id="{B03B8749-4527-4387-B320-055DD5C453E8}"/>
+                  <a16:creationId xmlns:a16="http://schemas.microsoft.com/office/drawing/2014/main" xmlns="" id="{B03B8749-4527-4387-B320-055DD5C453E8}"/>
                 </a:ext>
               </a:extLst>
             </p:cNvPr>
@@ -3819,7 +3844,7 @@
             <p:cNvPr id="104" name="Straight Connector 103">
               <a:extLst>
                 <a:ext uri="{FF2B5EF4-FFF2-40B4-BE49-F238E27FC236}">
-                  <a16:creationId xmlns:a16="http://schemas.microsoft.com/office/drawing/2014/main" id="{C2481700-C55C-474E-95F7-4205EB126E74}"/>
+                  <a16:creationId xmlns:a16="http://schemas.microsoft.com/office/drawing/2014/main" xmlns="" id="{C2481700-C55C-474E-95F7-4205EB126E74}"/>
                 </a:ext>
               </a:extLst>
             </p:cNvPr>
@@ -3862,7 +3887,7 @@
             <p:cNvPr id="105" name="Straight Connector 104">
               <a:extLst>
                 <a:ext uri="{FF2B5EF4-FFF2-40B4-BE49-F238E27FC236}">
-                  <a16:creationId xmlns:a16="http://schemas.microsoft.com/office/drawing/2014/main" id="{C5A35055-8F2E-4084-876C-176E0B9D616A}"/>
+                  <a16:creationId xmlns:a16="http://schemas.microsoft.com/office/drawing/2014/main" xmlns="" id="{C5A35055-8F2E-4084-876C-176E0B9D616A}"/>
                 </a:ext>
               </a:extLst>
             </p:cNvPr>
@@ -3906,7 +3931,7 @@
           <p:cNvPr id="106" name="racing track visa/master">
             <a:extLst>
               <a:ext uri="{FF2B5EF4-FFF2-40B4-BE49-F238E27FC236}">
-                <a16:creationId xmlns:a16="http://schemas.microsoft.com/office/drawing/2014/main" id="{B50B1219-8A24-4638-AD2D-6D16AAFC5578}"/>
+                <a16:creationId xmlns:a16="http://schemas.microsoft.com/office/drawing/2014/main" xmlns="" id="{B50B1219-8A24-4638-AD2D-6D16AAFC5578}"/>
               </a:ext>
             </a:extLst>
           </p:cNvPr>
@@ -3926,7 +3951,7 @@
             <p:cNvPr id="107" name="Picture 106">
               <a:extLst>
                 <a:ext uri="{FF2B5EF4-FFF2-40B4-BE49-F238E27FC236}">
-                  <a16:creationId xmlns:a16="http://schemas.microsoft.com/office/drawing/2014/main" id="{264C350F-20BC-421F-B5B2-B526C525C3AE}"/>
+                  <a16:creationId xmlns:a16="http://schemas.microsoft.com/office/drawing/2014/main" xmlns="" id="{264C350F-20BC-421F-B5B2-B526C525C3AE}"/>
                 </a:ext>
               </a:extLst>
             </p:cNvPr>
@@ -3936,13 +3961,13 @@
             <p:nvPr/>
           </p:nvPicPr>
           <p:blipFill rotWithShape="1">
-            <a:blip r:embed="rId2">
+            <a:blip r:embed="rId2" cstate="print">
               <a:extLst>
                 <a:ext uri="{28A0092B-C50C-407E-A947-70E740481C1C}">
-                  <a14:useLocalDpi xmlns:a14="http://schemas.microsoft.com/office/drawing/2010/main" val="0"/>
+                  <a14:useLocalDpi xmlns:a14="http://schemas.microsoft.com/office/drawing/2010/main" xmlns="" val="0"/>
                 </a:ext>
                 <a:ext uri="{837473B0-CC2E-450A-ABE3-18F120FF3D39}">
-                  <a1611:picAttrSrcUrl xmlns:a1611="http://schemas.microsoft.com/office/drawing/2016/11/main" r:id="rId3"/>
+                  <a1611:picAttrSrcUrl xmlns:a1611="http://schemas.microsoft.com/office/drawing/2016/11/main" xmlns="" r:id="rId3"/>
                 </a:ext>
               </a:extLst>
             </a:blip>
@@ -3964,7 +3989,7 @@
             <p:cNvPr id="108" name="Straight Connector 107">
               <a:extLst>
                 <a:ext uri="{FF2B5EF4-FFF2-40B4-BE49-F238E27FC236}">
-                  <a16:creationId xmlns:a16="http://schemas.microsoft.com/office/drawing/2014/main" id="{4815DEA3-6635-4D22-AC24-43F9C7D91602}"/>
+                  <a16:creationId xmlns:a16="http://schemas.microsoft.com/office/drawing/2014/main" xmlns="" id="{4815DEA3-6635-4D22-AC24-43F9C7D91602}"/>
                 </a:ext>
               </a:extLst>
             </p:cNvPr>
@@ -4007,7 +4032,7 @@
             <p:cNvPr id="109" name="Straight Connector 108">
               <a:extLst>
                 <a:ext uri="{FF2B5EF4-FFF2-40B4-BE49-F238E27FC236}">
-                  <a16:creationId xmlns:a16="http://schemas.microsoft.com/office/drawing/2014/main" id="{A4A36E0B-A01B-4E9F-BCBE-6EECFB23BA7E}"/>
+                  <a16:creationId xmlns:a16="http://schemas.microsoft.com/office/drawing/2014/main" xmlns="" id="{A4A36E0B-A01B-4E9F-BCBE-6EECFB23BA7E}"/>
                 </a:ext>
               </a:extLst>
             </p:cNvPr>
@@ -4050,7 +4075,7 @@
             <p:cNvPr id="110" name="Straight Connector 109">
               <a:extLst>
                 <a:ext uri="{FF2B5EF4-FFF2-40B4-BE49-F238E27FC236}">
-                  <a16:creationId xmlns:a16="http://schemas.microsoft.com/office/drawing/2014/main" id="{F2ADD9E9-17FC-4F8D-A2B9-A65539EC11A9}"/>
+                  <a16:creationId xmlns:a16="http://schemas.microsoft.com/office/drawing/2014/main" xmlns="" id="{F2ADD9E9-17FC-4F8D-A2B9-A65539EC11A9}"/>
                 </a:ext>
               </a:extLst>
             </p:cNvPr>
@@ -4093,7 +4118,7 @@
             <p:cNvPr id="111" name="Straight Connector 110">
               <a:extLst>
                 <a:ext uri="{FF2B5EF4-FFF2-40B4-BE49-F238E27FC236}">
-                  <a16:creationId xmlns:a16="http://schemas.microsoft.com/office/drawing/2014/main" id="{3F419110-EAA1-403C-8B66-981727806540}"/>
+                  <a16:creationId xmlns:a16="http://schemas.microsoft.com/office/drawing/2014/main" xmlns="" id="{3F419110-EAA1-403C-8B66-981727806540}"/>
                 </a:ext>
               </a:extLst>
             </p:cNvPr>
@@ -4136,7 +4161,7 @@
             <p:cNvPr id="112" name="Straight Connector 111">
               <a:extLst>
                 <a:ext uri="{FF2B5EF4-FFF2-40B4-BE49-F238E27FC236}">
-                  <a16:creationId xmlns:a16="http://schemas.microsoft.com/office/drawing/2014/main" id="{89BCADBD-74D3-4C6F-86C1-398C704DB40B}"/>
+                  <a16:creationId xmlns:a16="http://schemas.microsoft.com/office/drawing/2014/main" xmlns="" id="{89BCADBD-74D3-4C6F-86C1-398C704DB40B}"/>
                 </a:ext>
               </a:extLst>
             </p:cNvPr>
@@ -4179,7 +4204,7 @@
             <p:cNvPr id="113" name="Straight Connector 112">
               <a:extLst>
                 <a:ext uri="{FF2B5EF4-FFF2-40B4-BE49-F238E27FC236}">
-                  <a16:creationId xmlns:a16="http://schemas.microsoft.com/office/drawing/2014/main" id="{C889D6A2-6E0A-460E-A001-38D23B4CE547}"/>
+                  <a16:creationId xmlns:a16="http://schemas.microsoft.com/office/drawing/2014/main" xmlns="" id="{C889D6A2-6E0A-460E-A001-38D23B4CE547}"/>
                 </a:ext>
               </a:extLst>
             </p:cNvPr>
@@ -4222,7 +4247,7 @@
             <p:cNvPr id="114" name="Straight Connector 113">
               <a:extLst>
                 <a:ext uri="{FF2B5EF4-FFF2-40B4-BE49-F238E27FC236}">
-                  <a16:creationId xmlns:a16="http://schemas.microsoft.com/office/drawing/2014/main" id="{93CAFC69-1449-4F5B-A91D-D4571207948A}"/>
+                  <a16:creationId xmlns:a16="http://schemas.microsoft.com/office/drawing/2014/main" xmlns="" id="{93CAFC69-1449-4F5B-A91D-D4571207948A}"/>
                 </a:ext>
               </a:extLst>
             </p:cNvPr>
@@ -4265,7 +4290,7 @@
             <p:cNvPr id="115" name="Straight Connector 114">
               <a:extLst>
                 <a:ext uri="{FF2B5EF4-FFF2-40B4-BE49-F238E27FC236}">
-                  <a16:creationId xmlns:a16="http://schemas.microsoft.com/office/drawing/2014/main" id="{FD58AC46-CFFE-47E1-9679-19DE25E53771}"/>
+                  <a16:creationId xmlns:a16="http://schemas.microsoft.com/office/drawing/2014/main" xmlns="" id="{FD58AC46-CFFE-47E1-9679-19DE25E53771}"/>
                 </a:ext>
               </a:extLst>
             </p:cNvPr>
@@ -4308,7 +4333,7 @@
             <p:cNvPr id="116" name="Straight Connector 115">
               <a:extLst>
                 <a:ext uri="{FF2B5EF4-FFF2-40B4-BE49-F238E27FC236}">
-                  <a16:creationId xmlns:a16="http://schemas.microsoft.com/office/drawing/2014/main" id="{902941B1-9188-4EED-A9E6-0BF87EB96009}"/>
+                  <a16:creationId xmlns:a16="http://schemas.microsoft.com/office/drawing/2014/main" xmlns="" id="{902941B1-9188-4EED-A9E6-0BF87EB96009}"/>
                 </a:ext>
               </a:extLst>
             </p:cNvPr>
@@ -4351,7 +4376,7 @@
             <p:cNvPr id="117" name="Straight Connector 116">
               <a:extLst>
                 <a:ext uri="{FF2B5EF4-FFF2-40B4-BE49-F238E27FC236}">
-                  <a16:creationId xmlns:a16="http://schemas.microsoft.com/office/drawing/2014/main" id="{5CB5F202-0A9A-494E-BD3A-99B06B5E2DF6}"/>
+                  <a16:creationId xmlns:a16="http://schemas.microsoft.com/office/drawing/2014/main" xmlns="" id="{5CB5F202-0A9A-494E-BD3A-99B06B5E2DF6}"/>
                 </a:ext>
               </a:extLst>
             </p:cNvPr>
@@ -4394,7 +4419,7 @@
             <p:cNvPr id="118" name="Straight Connector 117">
               <a:extLst>
                 <a:ext uri="{FF2B5EF4-FFF2-40B4-BE49-F238E27FC236}">
-                  <a16:creationId xmlns:a16="http://schemas.microsoft.com/office/drawing/2014/main" id="{0F083D3F-3637-48E2-AB94-CFBF55EE31F3}"/>
+                  <a16:creationId xmlns:a16="http://schemas.microsoft.com/office/drawing/2014/main" xmlns="" id="{0F083D3F-3637-48E2-AB94-CFBF55EE31F3}"/>
                 </a:ext>
               </a:extLst>
             </p:cNvPr>
@@ -4437,7 +4462,7 @@
             <p:cNvPr id="119" name="Straight Connector 118">
               <a:extLst>
                 <a:ext uri="{FF2B5EF4-FFF2-40B4-BE49-F238E27FC236}">
-                  <a16:creationId xmlns:a16="http://schemas.microsoft.com/office/drawing/2014/main" id="{1569FA43-FFC4-441B-8EFE-686AF934C361}"/>
+                  <a16:creationId xmlns:a16="http://schemas.microsoft.com/office/drawing/2014/main" xmlns="" id="{1569FA43-FFC4-441B-8EFE-686AF934C361}"/>
                 </a:ext>
               </a:extLst>
             </p:cNvPr>
@@ -4480,7 +4505,7 @@
             <p:cNvPr id="120" name="Straight Connector 119">
               <a:extLst>
                 <a:ext uri="{FF2B5EF4-FFF2-40B4-BE49-F238E27FC236}">
-                  <a16:creationId xmlns:a16="http://schemas.microsoft.com/office/drawing/2014/main" id="{58DDADA8-44AC-40B9-9285-DCCF903D7C6A}"/>
+                  <a16:creationId xmlns:a16="http://schemas.microsoft.com/office/drawing/2014/main" xmlns="" id="{58DDADA8-44AC-40B9-9285-DCCF903D7C6A}"/>
                 </a:ext>
               </a:extLst>
             </p:cNvPr>
@@ -4523,7 +4548,7 @@
             <p:cNvPr id="121" name="Straight Connector 120">
               <a:extLst>
                 <a:ext uri="{FF2B5EF4-FFF2-40B4-BE49-F238E27FC236}">
-                  <a16:creationId xmlns:a16="http://schemas.microsoft.com/office/drawing/2014/main" id="{9E825616-8091-47F3-8C7C-768B79C43093}"/>
+                  <a16:creationId xmlns:a16="http://schemas.microsoft.com/office/drawing/2014/main" xmlns="" id="{9E825616-8091-47F3-8C7C-768B79C43093}"/>
                 </a:ext>
               </a:extLst>
             </p:cNvPr>
@@ -4566,7 +4591,7 @@
             <p:cNvPr id="122" name="Straight Connector 121">
               <a:extLst>
                 <a:ext uri="{FF2B5EF4-FFF2-40B4-BE49-F238E27FC236}">
-                  <a16:creationId xmlns:a16="http://schemas.microsoft.com/office/drawing/2014/main" id="{3DE2B2A6-D47C-4DB3-80D9-EF6CCDBF93CC}"/>
+                  <a16:creationId xmlns:a16="http://schemas.microsoft.com/office/drawing/2014/main" xmlns="" id="{3DE2B2A6-D47C-4DB3-80D9-EF6CCDBF93CC}"/>
                 </a:ext>
               </a:extLst>
             </p:cNvPr>
@@ -4609,7 +4634,7 @@
             <p:cNvPr id="123" name="Straight Connector 122">
               <a:extLst>
                 <a:ext uri="{FF2B5EF4-FFF2-40B4-BE49-F238E27FC236}">
-                  <a16:creationId xmlns:a16="http://schemas.microsoft.com/office/drawing/2014/main" id="{0C218469-9D6F-4C64-B9D9-D040A426EC15}"/>
+                  <a16:creationId xmlns:a16="http://schemas.microsoft.com/office/drawing/2014/main" xmlns="" id="{0C218469-9D6F-4C64-B9D9-D040A426EC15}"/>
                 </a:ext>
               </a:extLst>
             </p:cNvPr>
@@ -4652,7 +4677,7 @@
             <p:cNvPr id="124" name="Straight Connector 123">
               <a:extLst>
                 <a:ext uri="{FF2B5EF4-FFF2-40B4-BE49-F238E27FC236}">
-                  <a16:creationId xmlns:a16="http://schemas.microsoft.com/office/drawing/2014/main" id="{0D6DDA0F-54C9-4280-BD77-C249AB177E7F}"/>
+                  <a16:creationId xmlns:a16="http://schemas.microsoft.com/office/drawing/2014/main" xmlns="" id="{0D6DDA0F-54C9-4280-BD77-C249AB177E7F}"/>
                 </a:ext>
               </a:extLst>
             </p:cNvPr>
@@ -4695,7 +4720,7 @@
             <p:cNvPr id="125" name="Straight Connector 124">
               <a:extLst>
                 <a:ext uri="{FF2B5EF4-FFF2-40B4-BE49-F238E27FC236}">
-                  <a16:creationId xmlns:a16="http://schemas.microsoft.com/office/drawing/2014/main" id="{5140B315-E54D-469B-8632-65AA58BD437B}"/>
+                  <a16:creationId xmlns:a16="http://schemas.microsoft.com/office/drawing/2014/main" xmlns="" id="{5140B315-E54D-469B-8632-65AA58BD437B}"/>
                 </a:ext>
               </a:extLst>
             </p:cNvPr>
@@ -4738,7 +4763,7 @@
             <p:cNvPr id="126" name="Straight Connector 125">
               <a:extLst>
                 <a:ext uri="{FF2B5EF4-FFF2-40B4-BE49-F238E27FC236}">
-                  <a16:creationId xmlns:a16="http://schemas.microsoft.com/office/drawing/2014/main" id="{DE5E4694-FF13-4859-93F2-E10CD211999A}"/>
+                  <a16:creationId xmlns:a16="http://schemas.microsoft.com/office/drawing/2014/main" xmlns="" id="{DE5E4694-FF13-4859-93F2-E10CD211999A}"/>
                 </a:ext>
               </a:extLst>
             </p:cNvPr>
@@ -4781,7 +4806,7 @@
             <p:cNvPr id="127" name="Straight Connector 126">
               <a:extLst>
                 <a:ext uri="{FF2B5EF4-FFF2-40B4-BE49-F238E27FC236}">
-                  <a16:creationId xmlns:a16="http://schemas.microsoft.com/office/drawing/2014/main" id="{98A9D74B-DAB5-4591-A190-53A42C35E715}"/>
+                  <a16:creationId xmlns:a16="http://schemas.microsoft.com/office/drawing/2014/main" xmlns="" id="{98A9D74B-DAB5-4591-A190-53A42C35E715}"/>
                 </a:ext>
               </a:extLst>
             </p:cNvPr>
@@ -4825,7 +4850,7 @@
           <p:cNvPr id="128" name="racing track paypal">
             <a:extLst>
               <a:ext uri="{FF2B5EF4-FFF2-40B4-BE49-F238E27FC236}">
-                <a16:creationId xmlns:a16="http://schemas.microsoft.com/office/drawing/2014/main" id="{3541E9F3-C6FD-4594-BBA9-66BE4A17B144}"/>
+                <a16:creationId xmlns:a16="http://schemas.microsoft.com/office/drawing/2014/main" xmlns="" id="{3541E9F3-C6FD-4594-BBA9-66BE4A17B144}"/>
               </a:ext>
             </a:extLst>
           </p:cNvPr>
@@ -4845,7 +4870,7 @@
             <p:cNvPr id="129" name="Picture 128">
               <a:extLst>
                 <a:ext uri="{FF2B5EF4-FFF2-40B4-BE49-F238E27FC236}">
-                  <a16:creationId xmlns:a16="http://schemas.microsoft.com/office/drawing/2014/main" id="{0DAA0AD0-B7E4-4A9A-A895-2E99C72B40AA}"/>
+                  <a16:creationId xmlns:a16="http://schemas.microsoft.com/office/drawing/2014/main" xmlns="" id="{0DAA0AD0-B7E4-4A9A-A895-2E99C72B40AA}"/>
                 </a:ext>
               </a:extLst>
             </p:cNvPr>
@@ -4855,13 +4880,13 @@
             <p:nvPr/>
           </p:nvPicPr>
           <p:blipFill rotWithShape="1">
-            <a:blip r:embed="rId2">
+            <a:blip r:embed="rId2" cstate="print">
               <a:extLst>
                 <a:ext uri="{28A0092B-C50C-407E-A947-70E740481C1C}">
-                  <a14:useLocalDpi xmlns:a14="http://schemas.microsoft.com/office/drawing/2010/main" val="0"/>
+                  <a14:useLocalDpi xmlns:a14="http://schemas.microsoft.com/office/drawing/2010/main" xmlns="" val="0"/>
                 </a:ext>
                 <a:ext uri="{837473B0-CC2E-450A-ABE3-18F120FF3D39}">
-                  <a1611:picAttrSrcUrl xmlns:a1611="http://schemas.microsoft.com/office/drawing/2016/11/main" r:id="rId3"/>
+                  <a1611:picAttrSrcUrl xmlns:a1611="http://schemas.microsoft.com/office/drawing/2016/11/main" xmlns="" r:id="rId3"/>
                 </a:ext>
               </a:extLst>
             </a:blip>
@@ -4883,7 +4908,7 @@
             <p:cNvPr id="130" name="Straight Connector 129">
               <a:extLst>
                 <a:ext uri="{FF2B5EF4-FFF2-40B4-BE49-F238E27FC236}">
-                  <a16:creationId xmlns:a16="http://schemas.microsoft.com/office/drawing/2014/main" id="{B94875C8-D650-48A5-8954-0D3DD6D35EAF}"/>
+                  <a16:creationId xmlns:a16="http://schemas.microsoft.com/office/drawing/2014/main" xmlns="" id="{B94875C8-D650-48A5-8954-0D3DD6D35EAF}"/>
                 </a:ext>
               </a:extLst>
             </p:cNvPr>
@@ -4926,7 +4951,7 @@
             <p:cNvPr id="131" name="Straight Connector 130">
               <a:extLst>
                 <a:ext uri="{FF2B5EF4-FFF2-40B4-BE49-F238E27FC236}">
-                  <a16:creationId xmlns:a16="http://schemas.microsoft.com/office/drawing/2014/main" id="{03C5A7EB-5B07-4A88-BC2C-6F1D4E36E2B2}"/>
+                  <a16:creationId xmlns:a16="http://schemas.microsoft.com/office/drawing/2014/main" xmlns="" id="{03C5A7EB-5B07-4A88-BC2C-6F1D4E36E2B2}"/>
                 </a:ext>
               </a:extLst>
             </p:cNvPr>
@@ -4969,7 +4994,7 @@
             <p:cNvPr id="132" name="Straight Connector 131">
               <a:extLst>
                 <a:ext uri="{FF2B5EF4-FFF2-40B4-BE49-F238E27FC236}">
-                  <a16:creationId xmlns:a16="http://schemas.microsoft.com/office/drawing/2014/main" id="{B00BC802-B122-4433-BABE-503A62A86C4B}"/>
+                  <a16:creationId xmlns:a16="http://schemas.microsoft.com/office/drawing/2014/main" xmlns="" id="{B00BC802-B122-4433-BABE-503A62A86C4B}"/>
                 </a:ext>
               </a:extLst>
             </p:cNvPr>
@@ -5012,7 +5037,7 @@
             <p:cNvPr id="133" name="Straight Connector 132">
               <a:extLst>
                 <a:ext uri="{FF2B5EF4-FFF2-40B4-BE49-F238E27FC236}">
-                  <a16:creationId xmlns:a16="http://schemas.microsoft.com/office/drawing/2014/main" id="{94DC80FB-17EF-43F4-B3FC-EDF87AF6BFA4}"/>
+                  <a16:creationId xmlns:a16="http://schemas.microsoft.com/office/drawing/2014/main" xmlns="" id="{94DC80FB-17EF-43F4-B3FC-EDF87AF6BFA4}"/>
                 </a:ext>
               </a:extLst>
             </p:cNvPr>
@@ -5055,7 +5080,7 @@
             <p:cNvPr id="134" name="Straight Connector 133">
               <a:extLst>
                 <a:ext uri="{FF2B5EF4-FFF2-40B4-BE49-F238E27FC236}">
-                  <a16:creationId xmlns:a16="http://schemas.microsoft.com/office/drawing/2014/main" id="{80AB6ABF-F964-4AFA-915E-10BED68B3F6B}"/>
+                  <a16:creationId xmlns:a16="http://schemas.microsoft.com/office/drawing/2014/main" xmlns="" id="{80AB6ABF-F964-4AFA-915E-10BED68B3F6B}"/>
                 </a:ext>
               </a:extLst>
             </p:cNvPr>
@@ -5098,7 +5123,7 @@
             <p:cNvPr id="135" name="Straight Connector 134">
               <a:extLst>
                 <a:ext uri="{FF2B5EF4-FFF2-40B4-BE49-F238E27FC236}">
-                  <a16:creationId xmlns:a16="http://schemas.microsoft.com/office/drawing/2014/main" id="{A5EB79BE-4903-48EF-A767-C88C7456A3B9}"/>
+                  <a16:creationId xmlns:a16="http://schemas.microsoft.com/office/drawing/2014/main" xmlns="" id="{A5EB79BE-4903-48EF-A767-C88C7456A3B9}"/>
                 </a:ext>
               </a:extLst>
             </p:cNvPr>
@@ -5141,7 +5166,7 @@
             <p:cNvPr id="136" name="Straight Connector 135">
               <a:extLst>
                 <a:ext uri="{FF2B5EF4-FFF2-40B4-BE49-F238E27FC236}">
-                  <a16:creationId xmlns:a16="http://schemas.microsoft.com/office/drawing/2014/main" id="{39755888-4D07-4E7D-8A2E-DF43A656861A}"/>
+                  <a16:creationId xmlns:a16="http://schemas.microsoft.com/office/drawing/2014/main" xmlns="" id="{39755888-4D07-4E7D-8A2E-DF43A656861A}"/>
                 </a:ext>
               </a:extLst>
             </p:cNvPr>
@@ -5184,7 +5209,7 @@
             <p:cNvPr id="137" name="Straight Connector 136">
               <a:extLst>
                 <a:ext uri="{FF2B5EF4-FFF2-40B4-BE49-F238E27FC236}">
-                  <a16:creationId xmlns:a16="http://schemas.microsoft.com/office/drawing/2014/main" id="{07276CC9-962F-43F3-9775-986ECCC048D1}"/>
+                  <a16:creationId xmlns:a16="http://schemas.microsoft.com/office/drawing/2014/main" xmlns="" id="{07276CC9-962F-43F3-9775-986ECCC048D1}"/>
                 </a:ext>
               </a:extLst>
             </p:cNvPr>
@@ -5227,7 +5252,7 @@
             <p:cNvPr id="138" name="Straight Connector 137">
               <a:extLst>
                 <a:ext uri="{FF2B5EF4-FFF2-40B4-BE49-F238E27FC236}">
-                  <a16:creationId xmlns:a16="http://schemas.microsoft.com/office/drawing/2014/main" id="{600CD930-FECF-43A5-B112-74B9B99A1D59}"/>
+                  <a16:creationId xmlns:a16="http://schemas.microsoft.com/office/drawing/2014/main" xmlns="" id="{600CD930-FECF-43A5-B112-74B9B99A1D59}"/>
                 </a:ext>
               </a:extLst>
             </p:cNvPr>
@@ -5270,7 +5295,7 @@
             <p:cNvPr id="139" name="Straight Connector 138">
               <a:extLst>
                 <a:ext uri="{FF2B5EF4-FFF2-40B4-BE49-F238E27FC236}">
-                  <a16:creationId xmlns:a16="http://schemas.microsoft.com/office/drawing/2014/main" id="{F46C035E-A05F-4925-8A53-6634659FDD89}"/>
+                  <a16:creationId xmlns:a16="http://schemas.microsoft.com/office/drawing/2014/main" xmlns="" id="{F46C035E-A05F-4925-8A53-6634659FDD89}"/>
                 </a:ext>
               </a:extLst>
             </p:cNvPr>
@@ -5313,7 +5338,7 @@
             <p:cNvPr id="140" name="Straight Connector 139">
               <a:extLst>
                 <a:ext uri="{FF2B5EF4-FFF2-40B4-BE49-F238E27FC236}">
-                  <a16:creationId xmlns:a16="http://schemas.microsoft.com/office/drawing/2014/main" id="{87564FF6-1EA2-4BDD-8408-CA331D797E19}"/>
+                  <a16:creationId xmlns:a16="http://schemas.microsoft.com/office/drawing/2014/main" xmlns="" id="{87564FF6-1EA2-4BDD-8408-CA331D797E19}"/>
                 </a:ext>
               </a:extLst>
             </p:cNvPr>
@@ -5356,7 +5381,7 @@
             <p:cNvPr id="141" name="Straight Connector 140">
               <a:extLst>
                 <a:ext uri="{FF2B5EF4-FFF2-40B4-BE49-F238E27FC236}">
-                  <a16:creationId xmlns:a16="http://schemas.microsoft.com/office/drawing/2014/main" id="{FF39313C-8073-4232-9787-19B515D47173}"/>
+                  <a16:creationId xmlns:a16="http://schemas.microsoft.com/office/drawing/2014/main" xmlns="" id="{FF39313C-8073-4232-9787-19B515D47173}"/>
                 </a:ext>
               </a:extLst>
             </p:cNvPr>
@@ -5399,7 +5424,7 @@
             <p:cNvPr id="142" name="Straight Connector 141">
               <a:extLst>
                 <a:ext uri="{FF2B5EF4-FFF2-40B4-BE49-F238E27FC236}">
-                  <a16:creationId xmlns:a16="http://schemas.microsoft.com/office/drawing/2014/main" id="{343DFE0F-8395-49C7-97B3-C1C37FC170D0}"/>
+                  <a16:creationId xmlns:a16="http://schemas.microsoft.com/office/drawing/2014/main" xmlns="" id="{343DFE0F-8395-49C7-97B3-C1C37FC170D0}"/>
                 </a:ext>
               </a:extLst>
             </p:cNvPr>
@@ -5442,7 +5467,7 @@
             <p:cNvPr id="143" name="Straight Connector 142">
               <a:extLst>
                 <a:ext uri="{FF2B5EF4-FFF2-40B4-BE49-F238E27FC236}">
-                  <a16:creationId xmlns:a16="http://schemas.microsoft.com/office/drawing/2014/main" id="{87A1B4DC-72AE-432B-9905-8537755CE9A6}"/>
+                  <a16:creationId xmlns:a16="http://schemas.microsoft.com/office/drawing/2014/main" xmlns="" id="{87A1B4DC-72AE-432B-9905-8537755CE9A6}"/>
                 </a:ext>
               </a:extLst>
             </p:cNvPr>
@@ -5485,7 +5510,7 @@
             <p:cNvPr id="144" name="Straight Connector 143">
               <a:extLst>
                 <a:ext uri="{FF2B5EF4-FFF2-40B4-BE49-F238E27FC236}">
-                  <a16:creationId xmlns:a16="http://schemas.microsoft.com/office/drawing/2014/main" id="{CB7AB49B-E5EF-4355-9289-46A5CB491291}"/>
+                  <a16:creationId xmlns:a16="http://schemas.microsoft.com/office/drawing/2014/main" xmlns="" id="{CB7AB49B-E5EF-4355-9289-46A5CB491291}"/>
                 </a:ext>
               </a:extLst>
             </p:cNvPr>
@@ -5528,7 +5553,7 @@
             <p:cNvPr id="145" name="Straight Connector 144">
               <a:extLst>
                 <a:ext uri="{FF2B5EF4-FFF2-40B4-BE49-F238E27FC236}">
-                  <a16:creationId xmlns:a16="http://schemas.microsoft.com/office/drawing/2014/main" id="{4FA1416B-E46C-4779-9F96-579EC50D96A5}"/>
+                  <a16:creationId xmlns:a16="http://schemas.microsoft.com/office/drawing/2014/main" xmlns="" id="{4FA1416B-E46C-4779-9F96-579EC50D96A5}"/>
                 </a:ext>
               </a:extLst>
             </p:cNvPr>
@@ -5571,7 +5596,7 @@
             <p:cNvPr id="146" name="Straight Connector 145">
               <a:extLst>
                 <a:ext uri="{FF2B5EF4-FFF2-40B4-BE49-F238E27FC236}">
-                  <a16:creationId xmlns:a16="http://schemas.microsoft.com/office/drawing/2014/main" id="{F3AA2356-54CA-4DDF-B2DF-D8C77308DF10}"/>
+                  <a16:creationId xmlns:a16="http://schemas.microsoft.com/office/drawing/2014/main" xmlns="" id="{F3AA2356-54CA-4DDF-B2DF-D8C77308DF10}"/>
                 </a:ext>
               </a:extLst>
             </p:cNvPr>
@@ -5614,7 +5639,7 @@
             <p:cNvPr id="147" name="Straight Connector 146">
               <a:extLst>
                 <a:ext uri="{FF2B5EF4-FFF2-40B4-BE49-F238E27FC236}">
-                  <a16:creationId xmlns:a16="http://schemas.microsoft.com/office/drawing/2014/main" id="{83E74B78-60DB-465B-BD40-BC0A3231EBA4}"/>
+                  <a16:creationId xmlns:a16="http://schemas.microsoft.com/office/drawing/2014/main" xmlns="" id="{83E74B78-60DB-465B-BD40-BC0A3231EBA4}"/>
                 </a:ext>
               </a:extLst>
             </p:cNvPr>
@@ -5657,7 +5682,7 @@
             <p:cNvPr id="148" name="Straight Connector 147">
               <a:extLst>
                 <a:ext uri="{FF2B5EF4-FFF2-40B4-BE49-F238E27FC236}">
-                  <a16:creationId xmlns:a16="http://schemas.microsoft.com/office/drawing/2014/main" id="{615EDE7B-94E0-4229-99F0-1F36A5193007}"/>
+                  <a16:creationId xmlns:a16="http://schemas.microsoft.com/office/drawing/2014/main" xmlns="" id="{615EDE7B-94E0-4229-99F0-1F36A5193007}"/>
                 </a:ext>
               </a:extLst>
             </p:cNvPr>
@@ -5700,7 +5725,7 @@
             <p:cNvPr id="149" name="Straight Connector 148">
               <a:extLst>
                 <a:ext uri="{FF2B5EF4-FFF2-40B4-BE49-F238E27FC236}">
-                  <a16:creationId xmlns:a16="http://schemas.microsoft.com/office/drawing/2014/main" id="{8E4F12EF-068E-4D18-8806-F05B218CFD4E}"/>
+                  <a16:creationId xmlns:a16="http://schemas.microsoft.com/office/drawing/2014/main" xmlns="" id="{8E4F12EF-068E-4D18-8806-F05B218CFD4E}"/>
                 </a:ext>
               </a:extLst>
             </p:cNvPr>
@@ -5744,7 +5769,7 @@
           <p:cNvPr id="150" name="racing track ETH">
             <a:extLst>
               <a:ext uri="{FF2B5EF4-FFF2-40B4-BE49-F238E27FC236}">
-                <a16:creationId xmlns:a16="http://schemas.microsoft.com/office/drawing/2014/main" id="{9551C5B5-21FC-4924-A784-BCFA1A674CBC}"/>
+                <a16:creationId xmlns:a16="http://schemas.microsoft.com/office/drawing/2014/main" xmlns="" id="{9551C5B5-21FC-4924-A784-BCFA1A674CBC}"/>
               </a:ext>
             </a:extLst>
           </p:cNvPr>
@@ -5764,7 +5789,7 @@
             <p:cNvPr id="151" name="Picture 150">
               <a:extLst>
                 <a:ext uri="{FF2B5EF4-FFF2-40B4-BE49-F238E27FC236}">
-                  <a16:creationId xmlns:a16="http://schemas.microsoft.com/office/drawing/2014/main" id="{FC5DC9B9-B22A-4C11-80E3-0AEC1E476674}"/>
+                  <a16:creationId xmlns:a16="http://schemas.microsoft.com/office/drawing/2014/main" xmlns="" id="{FC5DC9B9-B22A-4C11-80E3-0AEC1E476674}"/>
                 </a:ext>
               </a:extLst>
             </p:cNvPr>
@@ -5774,13 +5799,13 @@
             <p:nvPr/>
           </p:nvPicPr>
           <p:blipFill rotWithShape="1">
-            <a:blip r:embed="rId2">
+            <a:blip r:embed="rId2" cstate="print">
               <a:extLst>
                 <a:ext uri="{28A0092B-C50C-407E-A947-70E740481C1C}">
-                  <a14:useLocalDpi xmlns:a14="http://schemas.microsoft.com/office/drawing/2010/main" val="0"/>
+                  <a14:useLocalDpi xmlns:a14="http://schemas.microsoft.com/office/drawing/2010/main" xmlns="" val="0"/>
                 </a:ext>
                 <a:ext uri="{837473B0-CC2E-450A-ABE3-18F120FF3D39}">
-                  <a1611:picAttrSrcUrl xmlns:a1611="http://schemas.microsoft.com/office/drawing/2016/11/main" r:id="rId3"/>
+                  <a1611:picAttrSrcUrl xmlns:a1611="http://schemas.microsoft.com/office/drawing/2016/11/main" xmlns="" r:id="rId3"/>
                 </a:ext>
               </a:extLst>
             </a:blip>
@@ -5802,7 +5827,7 @@
             <p:cNvPr id="152" name="Straight Connector 151">
               <a:extLst>
                 <a:ext uri="{FF2B5EF4-FFF2-40B4-BE49-F238E27FC236}">
-                  <a16:creationId xmlns:a16="http://schemas.microsoft.com/office/drawing/2014/main" id="{D6F86F22-E2A1-44DF-86DA-D66F0316AD8B}"/>
+                  <a16:creationId xmlns:a16="http://schemas.microsoft.com/office/drawing/2014/main" xmlns="" id="{D6F86F22-E2A1-44DF-86DA-D66F0316AD8B}"/>
                 </a:ext>
               </a:extLst>
             </p:cNvPr>
@@ -5845,7 +5870,7 @@
             <p:cNvPr id="153" name="Straight Connector 152">
               <a:extLst>
                 <a:ext uri="{FF2B5EF4-FFF2-40B4-BE49-F238E27FC236}">
-                  <a16:creationId xmlns:a16="http://schemas.microsoft.com/office/drawing/2014/main" id="{5F0A2FD8-A935-4BEF-B60E-CFD1222D8294}"/>
+                  <a16:creationId xmlns:a16="http://schemas.microsoft.com/office/drawing/2014/main" xmlns="" id="{5F0A2FD8-A935-4BEF-B60E-CFD1222D8294}"/>
                 </a:ext>
               </a:extLst>
             </p:cNvPr>
@@ -5888,7 +5913,7 @@
             <p:cNvPr id="154" name="Straight Connector 153">
               <a:extLst>
                 <a:ext uri="{FF2B5EF4-FFF2-40B4-BE49-F238E27FC236}">
-                  <a16:creationId xmlns:a16="http://schemas.microsoft.com/office/drawing/2014/main" id="{AEC6BB4C-0CE0-408F-B7CE-2C81CA6C28AB}"/>
+                  <a16:creationId xmlns:a16="http://schemas.microsoft.com/office/drawing/2014/main" xmlns="" id="{AEC6BB4C-0CE0-408F-B7CE-2C81CA6C28AB}"/>
                 </a:ext>
               </a:extLst>
             </p:cNvPr>
@@ -5931,7 +5956,7 @@
             <p:cNvPr id="155" name="Straight Connector 154">
               <a:extLst>
                 <a:ext uri="{FF2B5EF4-FFF2-40B4-BE49-F238E27FC236}">
-                  <a16:creationId xmlns:a16="http://schemas.microsoft.com/office/drawing/2014/main" id="{A2DF727F-D590-42ED-9F88-BC3B8AFD89AC}"/>
+                  <a16:creationId xmlns:a16="http://schemas.microsoft.com/office/drawing/2014/main" xmlns="" id="{A2DF727F-D590-42ED-9F88-BC3B8AFD89AC}"/>
                 </a:ext>
               </a:extLst>
             </p:cNvPr>
@@ -5974,7 +5999,7 @@
             <p:cNvPr id="156" name="Straight Connector 155">
               <a:extLst>
                 <a:ext uri="{FF2B5EF4-FFF2-40B4-BE49-F238E27FC236}">
-                  <a16:creationId xmlns:a16="http://schemas.microsoft.com/office/drawing/2014/main" id="{6A018206-4A18-4498-ACF0-F7FA6D7C316D}"/>
+                  <a16:creationId xmlns:a16="http://schemas.microsoft.com/office/drawing/2014/main" xmlns="" id="{6A018206-4A18-4498-ACF0-F7FA6D7C316D}"/>
                 </a:ext>
               </a:extLst>
             </p:cNvPr>
@@ -6017,7 +6042,7 @@
             <p:cNvPr id="157" name="Straight Connector 156">
               <a:extLst>
                 <a:ext uri="{FF2B5EF4-FFF2-40B4-BE49-F238E27FC236}">
-                  <a16:creationId xmlns:a16="http://schemas.microsoft.com/office/drawing/2014/main" id="{8A784E56-56F7-4322-80A1-2EBD4E0476B4}"/>
+                  <a16:creationId xmlns:a16="http://schemas.microsoft.com/office/drawing/2014/main" xmlns="" id="{8A784E56-56F7-4322-80A1-2EBD4E0476B4}"/>
                 </a:ext>
               </a:extLst>
             </p:cNvPr>
@@ -6060,7 +6085,7 @@
             <p:cNvPr id="158" name="Straight Connector 157">
               <a:extLst>
                 <a:ext uri="{FF2B5EF4-FFF2-40B4-BE49-F238E27FC236}">
-                  <a16:creationId xmlns:a16="http://schemas.microsoft.com/office/drawing/2014/main" id="{20714372-98A5-4B2E-9F9A-1F2C0EF5E17B}"/>
+                  <a16:creationId xmlns:a16="http://schemas.microsoft.com/office/drawing/2014/main" xmlns="" id="{20714372-98A5-4B2E-9F9A-1F2C0EF5E17B}"/>
                 </a:ext>
               </a:extLst>
             </p:cNvPr>
@@ -6103,7 +6128,7 @@
             <p:cNvPr id="159" name="Straight Connector 158">
               <a:extLst>
                 <a:ext uri="{FF2B5EF4-FFF2-40B4-BE49-F238E27FC236}">
-                  <a16:creationId xmlns:a16="http://schemas.microsoft.com/office/drawing/2014/main" id="{B944900F-64F2-4E72-AA0C-83286E75BC84}"/>
+                  <a16:creationId xmlns:a16="http://schemas.microsoft.com/office/drawing/2014/main" xmlns="" id="{B944900F-64F2-4E72-AA0C-83286E75BC84}"/>
                 </a:ext>
               </a:extLst>
             </p:cNvPr>
@@ -6146,7 +6171,7 @@
             <p:cNvPr id="160" name="Straight Connector 159">
               <a:extLst>
                 <a:ext uri="{FF2B5EF4-FFF2-40B4-BE49-F238E27FC236}">
-                  <a16:creationId xmlns:a16="http://schemas.microsoft.com/office/drawing/2014/main" id="{14738CF8-5505-4BB6-852F-8311176FDBD9}"/>
+                  <a16:creationId xmlns:a16="http://schemas.microsoft.com/office/drawing/2014/main" xmlns="" id="{14738CF8-5505-4BB6-852F-8311176FDBD9}"/>
                 </a:ext>
               </a:extLst>
             </p:cNvPr>
@@ -6189,7 +6214,7 @@
             <p:cNvPr id="161" name="Straight Connector 160">
               <a:extLst>
                 <a:ext uri="{FF2B5EF4-FFF2-40B4-BE49-F238E27FC236}">
-                  <a16:creationId xmlns:a16="http://schemas.microsoft.com/office/drawing/2014/main" id="{8D577A44-C055-44E7-AA52-76B07E83BD9A}"/>
+                  <a16:creationId xmlns:a16="http://schemas.microsoft.com/office/drawing/2014/main" xmlns="" id="{8D577A44-C055-44E7-AA52-76B07E83BD9A}"/>
                 </a:ext>
               </a:extLst>
             </p:cNvPr>
@@ -6232,7 +6257,7 @@
             <p:cNvPr id="162" name="Straight Connector 161">
               <a:extLst>
                 <a:ext uri="{FF2B5EF4-FFF2-40B4-BE49-F238E27FC236}">
-                  <a16:creationId xmlns:a16="http://schemas.microsoft.com/office/drawing/2014/main" id="{A984FC95-2A9D-47A7-869F-5ADD9D6EF344}"/>
+                  <a16:creationId xmlns:a16="http://schemas.microsoft.com/office/drawing/2014/main" xmlns="" id="{A984FC95-2A9D-47A7-869F-5ADD9D6EF344}"/>
                 </a:ext>
               </a:extLst>
             </p:cNvPr>
@@ -6275,7 +6300,7 @@
             <p:cNvPr id="163" name="Straight Connector 162">
               <a:extLst>
                 <a:ext uri="{FF2B5EF4-FFF2-40B4-BE49-F238E27FC236}">
-                  <a16:creationId xmlns:a16="http://schemas.microsoft.com/office/drawing/2014/main" id="{9F9D82FC-84FE-45B5-86F6-9CCC6CD43E29}"/>
+                  <a16:creationId xmlns:a16="http://schemas.microsoft.com/office/drawing/2014/main" xmlns="" id="{9F9D82FC-84FE-45B5-86F6-9CCC6CD43E29}"/>
                 </a:ext>
               </a:extLst>
             </p:cNvPr>
@@ -6318,7 +6343,7 @@
             <p:cNvPr id="164" name="Straight Connector 163">
               <a:extLst>
                 <a:ext uri="{FF2B5EF4-FFF2-40B4-BE49-F238E27FC236}">
-                  <a16:creationId xmlns:a16="http://schemas.microsoft.com/office/drawing/2014/main" id="{9460CF91-DBE9-43C0-9837-4E7C3F50D1E5}"/>
+                  <a16:creationId xmlns:a16="http://schemas.microsoft.com/office/drawing/2014/main" xmlns="" id="{9460CF91-DBE9-43C0-9837-4E7C3F50D1E5}"/>
                 </a:ext>
               </a:extLst>
             </p:cNvPr>
@@ -6361,7 +6386,7 @@
             <p:cNvPr id="165" name="Straight Connector 164">
               <a:extLst>
                 <a:ext uri="{FF2B5EF4-FFF2-40B4-BE49-F238E27FC236}">
-                  <a16:creationId xmlns:a16="http://schemas.microsoft.com/office/drawing/2014/main" id="{07128103-7C42-4219-8BAF-220904C60DC2}"/>
+                  <a16:creationId xmlns:a16="http://schemas.microsoft.com/office/drawing/2014/main" xmlns="" id="{07128103-7C42-4219-8BAF-220904C60DC2}"/>
                 </a:ext>
               </a:extLst>
             </p:cNvPr>
@@ -6404,7 +6429,7 @@
             <p:cNvPr id="166" name="Straight Connector 165">
               <a:extLst>
                 <a:ext uri="{FF2B5EF4-FFF2-40B4-BE49-F238E27FC236}">
-                  <a16:creationId xmlns:a16="http://schemas.microsoft.com/office/drawing/2014/main" id="{DBE8A6EA-F003-48C8-BDA0-2BB6E46ADF2B}"/>
+                  <a16:creationId xmlns:a16="http://schemas.microsoft.com/office/drawing/2014/main" xmlns="" id="{DBE8A6EA-F003-48C8-BDA0-2BB6E46ADF2B}"/>
                 </a:ext>
               </a:extLst>
             </p:cNvPr>
@@ -6447,7 +6472,7 @@
             <p:cNvPr id="167" name="Straight Connector 166">
               <a:extLst>
                 <a:ext uri="{FF2B5EF4-FFF2-40B4-BE49-F238E27FC236}">
-                  <a16:creationId xmlns:a16="http://schemas.microsoft.com/office/drawing/2014/main" id="{0927E0BD-0891-4F71-A515-4870116954B0}"/>
+                  <a16:creationId xmlns:a16="http://schemas.microsoft.com/office/drawing/2014/main" xmlns="" id="{0927E0BD-0891-4F71-A515-4870116954B0}"/>
                 </a:ext>
               </a:extLst>
             </p:cNvPr>
@@ -6490,7 +6515,7 @@
             <p:cNvPr id="168" name="Straight Connector 167">
               <a:extLst>
                 <a:ext uri="{FF2B5EF4-FFF2-40B4-BE49-F238E27FC236}">
-                  <a16:creationId xmlns:a16="http://schemas.microsoft.com/office/drawing/2014/main" id="{D8EA5FFE-B048-4A79-8392-5BD3580BB6BE}"/>
+                  <a16:creationId xmlns:a16="http://schemas.microsoft.com/office/drawing/2014/main" xmlns="" id="{D8EA5FFE-B048-4A79-8392-5BD3580BB6BE}"/>
                 </a:ext>
               </a:extLst>
             </p:cNvPr>
@@ -6533,7 +6558,7 @@
             <p:cNvPr id="169" name="Straight Connector 168">
               <a:extLst>
                 <a:ext uri="{FF2B5EF4-FFF2-40B4-BE49-F238E27FC236}">
-                  <a16:creationId xmlns:a16="http://schemas.microsoft.com/office/drawing/2014/main" id="{2FEB6237-674E-4FA4-8513-59CFC4772835}"/>
+                  <a16:creationId xmlns:a16="http://schemas.microsoft.com/office/drawing/2014/main" xmlns="" id="{2FEB6237-674E-4FA4-8513-59CFC4772835}"/>
                 </a:ext>
               </a:extLst>
             </p:cNvPr>
@@ -6576,7 +6601,7 @@
             <p:cNvPr id="170" name="Straight Connector 169">
               <a:extLst>
                 <a:ext uri="{FF2B5EF4-FFF2-40B4-BE49-F238E27FC236}">
-                  <a16:creationId xmlns:a16="http://schemas.microsoft.com/office/drawing/2014/main" id="{0F9E652E-F85C-426A-B5F8-F943150336DF}"/>
+                  <a16:creationId xmlns:a16="http://schemas.microsoft.com/office/drawing/2014/main" xmlns="" id="{0F9E652E-F85C-426A-B5F8-F943150336DF}"/>
                 </a:ext>
               </a:extLst>
             </p:cNvPr>
@@ -6619,7 +6644,7 @@
             <p:cNvPr id="171" name="Straight Connector 170">
               <a:extLst>
                 <a:ext uri="{FF2B5EF4-FFF2-40B4-BE49-F238E27FC236}">
-                  <a16:creationId xmlns:a16="http://schemas.microsoft.com/office/drawing/2014/main" id="{2BAE3AEA-93FE-43F0-84F2-1616D10B4ECB}"/>
+                  <a16:creationId xmlns:a16="http://schemas.microsoft.com/office/drawing/2014/main" xmlns="" id="{2BAE3AEA-93FE-43F0-84F2-1616D10B4ECB}"/>
                 </a:ext>
               </a:extLst>
             </p:cNvPr>
@@ -6663,7 +6688,7 @@
           <p:cNvPr id="172" name="racing track BTC">
             <a:extLst>
               <a:ext uri="{FF2B5EF4-FFF2-40B4-BE49-F238E27FC236}">
-                <a16:creationId xmlns:a16="http://schemas.microsoft.com/office/drawing/2014/main" id="{D5870CA9-4439-487E-AC8F-BFEC7CD77BDD}"/>
+                <a16:creationId xmlns:a16="http://schemas.microsoft.com/office/drawing/2014/main" xmlns="" id="{D5870CA9-4439-487E-AC8F-BFEC7CD77BDD}"/>
               </a:ext>
             </a:extLst>
           </p:cNvPr>
@@ -6683,7 +6708,7 @@
             <p:cNvPr id="173" name="Picture 172">
               <a:extLst>
                 <a:ext uri="{FF2B5EF4-FFF2-40B4-BE49-F238E27FC236}">
-                  <a16:creationId xmlns:a16="http://schemas.microsoft.com/office/drawing/2014/main" id="{27BE7AF4-9711-4D87-935C-1A25EA750CB6}"/>
+                  <a16:creationId xmlns:a16="http://schemas.microsoft.com/office/drawing/2014/main" xmlns="" id="{27BE7AF4-9711-4D87-935C-1A25EA750CB6}"/>
                 </a:ext>
               </a:extLst>
             </p:cNvPr>
@@ -6693,13 +6718,13 @@
             <p:nvPr/>
           </p:nvPicPr>
           <p:blipFill rotWithShape="1">
-            <a:blip r:embed="rId2">
+            <a:blip r:embed="rId2" cstate="print">
               <a:extLst>
                 <a:ext uri="{28A0092B-C50C-407E-A947-70E740481C1C}">
-                  <a14:useLocalDpi xmlns:a14="http://schemas.microsoft.com/office/drawing/2010/main" val="0"/>
+                  <a14:useLocalDpi xmlns:a14="http://schemas.microsoft.com/office/drawing/2010/main" xmlns="" val="0"/>
                 </a:ext>
                 <a:ext uri="{837473B0-CC2E-450A-ABE3-18F120FF3D39}">
-                  <a1611:picAttrSrcUrl xmlns:a1611="http://schemas.microsoft.com/office/drawing/2016/11/main" r:id="rId3"/>
+                  <a1611:picAttrSrcUrl xmlns:a1611="http://schemas.microsoft.com/office/drawing/2016/11/main" xmlns="" r:id="rId3"/>
                 </a:ext>
               </a:extLst>
             </a:blip>
@@ -6721,7 +6746,7 @@
             <p:cNvPr id="174" name="Straight Connector 173">
               <a:extLst>
                 <a:ext uri="{FF2B5EF4-FFF2-40B4-BE49-F238E27FC236}">
-                  <a16:creationId xmlns:a16="http://schemas.microsoft.com/office/drawing/2014/main" id="{5C817EC0-FEEC-48F3-8FB0-C0D36CA1773C}"/>
+                  <a16:creationId xmlns:a16="http://schemas.microsoft.com/office/drawing/2014/main" xmlns="" id="{5C817EC0-FEEC-48F3-8FB0-C0D36CA1773C}"/>
                 </a:ext>
               </a:extLst>
             </p:cNvPr>
@@ -6764,7 +6789,7 @@
             <p:cNvPr id="175" name="Straight Connector 174">
               <a:extLst>
                 <a:ext uri="{FF2B5EF4-FFF2-40B4-BE49-F238E27FC236}">
-                  <a16:creationId xmlns:a16="http://schemas.microsoft.com/office/drawing/2014/main" id="{71C907F1-1C4B-4771-89BE-625DB01077AF}"/>
+                  <a16:creationId xmlns:a16="http://schemas.microsoft.com/office/drawing/2014/main" xmlns="" id="{71C907F1-1C4B-4771-89BE-625DB01077AF}"/>
                 </a:ext>
               </a:extLst>
             </p:cNvPr>
@@ -6807,7 +6832,7 @@
             <p:cNvPr id="176" name="Straight Connector 175">
               <a:extLst>
                 <a:ext uri="{FF2B5EF4-FFF2-40B4-BE49-F238E27FC236}">
-                  <a16:creationId xmlns:a16="http://schemas.microsoft.com/office/drawing/2014/main" id="{6B8BBA39-FC1C-4156-85B7-A54F7BA4E741}"/>
+                  <a16:creationId xmlns:a16="http://schemas.microsoft.com/office/drawing/2014/main" xmlns="" id="{6B8BBA39-FC1C-4156-85B7-A54F7BA4E741}"/>
                 </a:ext>
               </a:extLst>
             </p:cNvPr>
@@ -6850,7 +6875,7 @@
             <p:cNvPr id="177" name="Straight Connector 176">
               <a:extLst>
                 <a:ext uri="{FF2B5EF4-FFF2-40B4-BE49-F238E27FC236}">
-                  <a16:creationId xmlns:a16="http://schemas.microsoft.com/office/drawing/2014/main" id="{F2A5AB73-8A55-4DC2-A312-81FE2C5FD72D}"/>
+                  <a16:creationId xmlns:a16="http://schemas.microsoft.com/office/drawing/2014/main" xmlns="" id="{F2A5AB73-8A55-4DC2-A312-81FE2C5FD72D}"/>
                 </a:ext>
               </a:extLst>
             </p:cNvPr>
@@ -6893,7 +6918,7 @@
             <p:cNvPr id="178" name="Straight Connector 177">
               <a:extLst>
                 <a:ext uri="{FF2B5EF4-FFF2-40B4-BE49-F238E27FC236}">
-                  <a16:creationId xmlns:a16="http://schemas.microsoft.com/office/drawing/2014/main" id="{8F67EA3A-BDC1-4977-8C5E-76FE6266D4C3}"/>
+                  <a16:creationId xmlns:a16="http://schemas.microsoft.com/office/drawing/2014/main" xmlns="" id="{8F67EA3A-BDC1-4977-8C5E-76FE6266D4C3}"/>
                 </a:ext>
               </a:extLst>
             </p:cNvPr>
@@ -6936,7 +6961,7 @@
             <p:cNvPr id="179" name="Straight Connector 178">
               <a:extLst>
                 <a:ext uri="{FF2B5EF4-FFF2-40B4-BE49-F238E27FC236}">
-                  <a16:creationId xmlns:a16="http://schemas.microsoft.com/office/drawing/2014/main" id="{99A87147-480E-4DEE-A25C-F33BF4AA60E0}"/>
+                  <a16:creationId xmlns:a16="http://schemas.microsoft.com/office/drawing/2014/main" xmlns="" id="{99A87147-480E-4DEE-A25C-F33BF4AA60E0}"/>
                 </a:ext>
               </a:extLst>
             </p:cNvPr>
@@ -6979,7 +7004,7 @@
             <p:cNvPr id="180" name="Straight Connector 179">
               <a:extLst>
                 <a:ext uri="{FF2B5EF4-FFF2-40B4-BE49-F238E27FC236}">
-                  <a16:creationId xmlns:a16="http://schemas.microsoft.com/office/drawing/2014/main" id="{C306D792-8968-4E96-AEC8-64E97EC96511}"/>
+                  <a16:creationId xmlns:a16="http://schemas.microsoft.com/office/drawing/2014/main" xmlns="" id="{C306D792-8968-4E96-AEC8-64E97EC96511}"/>
                 </a:ext>
               </a:extLst>
             </p:cNvPr>
@@ -7022,7 +7047,7 @@
             <p:cNvPr id="181" name="Straight Connector 180">
               <a:extLst>
                 <a:ext uri="{FF2B5EF4-FFF2-40B4-BE49-F238E27FC236}">
-                  <a16:creationId xmlns:a16="http://schemas.microsoft.com/office/drawing/2014/main" id="{434BD2DE-F043-4F7B-AFF6-3A8860E250E6}"/>
+                  <a16:creationId xmlns:a16="http://schemas.microsoft.com/office/drawing/2014/main" xmlns="" id="{434BD2DE-F043-4F7B-AFF6-3A8860E250E6}"/>
                 </a:ext>
               </a:extLst>
             </p:cNvPr>
@@ -7065,7 +7090,7 @@
             <p:cNvPr id="182" name="Straight Connector 181">
               <a:extLst>
                 <a:ext uri="{FF2B5EF4-FFF2-40B4-BE49-F238E27FC236}">
-                  <a16:creationId xmlns:a16="http://schemas.microsoft.com/office/drawing/2014/main" id="{73BC4BDA-D270-4C19-AAA3-FDB2E1FD42AF}"/>
+                  <a16:creationId xmlns:a16="http://schemas.microsoft.com/office/drawing/2014/main" xmlns="" id="{73BC4BDA-D270-4C19-AAA3-FDB2E1FD42AF}"/>
                 </a:ext>
               </a:extLst>
             </p:cNvPr>
@@ -7108,7 +7133,7 @@
             <p:cNvPr id="183" name="Straight Connector 182">
               <a:extLst>
                 <a:ext uri="{FF2B5EF4-FFF2-40B4-BE49-F238E27FC236}">
-                  <a16:creationId xmlns:a16="http://schemas.microsoft.com/office/drawing/2014/main" id="{01D49EBE-3F0B-4AE3-B70E-20C3BF90D8CD}"/>
+                  <a16:creationId xmlns:a16="http://schemas.microsoft.com/office/drawing/2014/main" xmlns="" id="{01D49EBE-3F0B-4AE3-B70E-20C3BF90D8CD}"/>
                 </a:ext>
               </a:extLst>
             </p:cNvPr>
@@ -7151,7 +7176,7 @@
             <p:cNvPr id="184" name="Straight Connector 183">
               <a:extLst>
                 <a:ext uri="{FF2B5EF4-FFF2-40B4-BE49-F238E27FC236}">
-                  <a16:creationId xmlns:a16="http://schemas.microsoft.com/office/drawing/2014/main" id="{764F2D2B-DEC4-4DF2-AF41-14D2DBB8778F}"/>
+                  <a16:creationId xmlns:a16="http://schemas.microsoft.com/office/drawing/2014/main" xmlns="" id="{764F2D2B-DEC4-4DF2-AF41-14D2DBB8778F}"/>
                 </a:ext>
               </a:extLst>
             </p:cNvPr>
@@ -7194,7 +7219,7 @@
             <p:cNvPr id="185" name="Straight Connector 184">
               <a:extLst>
                 <a:ext uri="{FF2B5EF4-FFF2-40B4-BE49-F238E27FC236}">
-                  <a16:creationId xmlns:a16="http://schemas.microsoft.com/office/drawing/2014/main" id="{966BE678-6A71-4658-A78C-263949283A4F}"/>
+                  <a16:creationId xmlns:a16="http://schemas.microsoft.com/office/drawing/2014/main" xmlns="" id="{966BE678-6A71-4658-A78C-263949283A4F}"/>
                 </a:ext>
               </a:extLst>
             </p:cNvPr>
@@ -7237,7 +7262,7 @@
             <p:cNvPr id="186" name="Straight Connector 185">
               <a:extLst>
                 <a:ext uri="{FF2B5EF4-FFF2-40B4-BE49-F238E27FC236}">
-                  <a16:creationId xmlns:a16="http://schemas.microsoft.com/office/drawing/2014/main" id="{59122140-6DA5-4CFB-8C04-A6EFF1262440}"/>
+                  <a16:creationId xmlns:a16="http://schemas.microsoft.com/office/drawing/2014/main" xmlns="" id="{59122140-6DA5-4CFB-8C04-A6EFF1262440}"/>
                 </a:ext>
               </a:extLst>
             </p:cNvPr>
@@ -7280,7 +7305,7 @@
             <p:cNvPr id="187" name="Straight Connector 186">
               <a:extLst>
                 <a:ext uri="{FF2B5EF4-FFF2-40B4-BE49-F238E27FC236}">
-                  <a16:creationId xmlns:a16="http://schemas.microsoft.com/office/drawing/2014/main" id="{633342FB-E32B-4014-9241-4C2A49FEE6A2}"/>
+                  <a16:creationId xmlns:a16="http://schemas.microsoft.com/office/drawing/2014/main" xmlns="" id="{633342FB-E32B-4014-9241-4C2A49FEE6A2}"/>
                 </a:ext>
               </a:extLst>
             </p:cNvPr>
@@ -7323,7 +7348,7 @@
             <p:cNvPr id="188" name="Straight Connector 187">
               <a:extLst>
                 <a:ext uri="{FF2B5EF4-FFF2-40B4-BE49-F238E27FC236}">
-                  <a16:creationId xmlns:a16="http://schemas.microsoft.com/office/drawing/2014/main" id="{04FA1E17-8F55-4BCA-851E-F65D44794B82}"/>
+                  <a16:creationId xmlns:a16="http://schemas.microsoft.com/office/drawing/2014/main" xmlns="" id="{04FA1E17-8F55-4BCA-851E-F65D44794B82}"/>
                 </a:ext>
               </a:extLst>
             </p:cNvPr>
@@ -7366,7 +7391,7 @@
             <p:cNvPr id="189" name="Straight Connector 188">
               <a:extLst>
                 <a:ext uri="{FF2B5EF4-FFF2-40B4-BE49-F238E27FC236}">
-                  <a16:creationId xmlns:a16="http://schemas.microsoft.com/office/drawing/2014/main" id="{77DA7AC9-1BDD-49EF-9456-769069F3E9AE}"/>
+                  <a16:creationId xmlns:a16="http://schemas.microsoft.com/office/drawing/2014/main" xmlns="" id="{77DA7AC9-1BDD-49EF-9456-769069F3E9AE}"/>
                 </a:ext>
               </a:extLst>
             </p:cNvPr>
@@ -7409,7 +7434,7 @@
             <p:cNvPr id="190" name="Straight Connector 189">
               <a:extLst>
                 <a:ext uri="{FF2B5EF4-FFF2-40B4-BE49-F238E27FC236}">
-                  <a16:creationId xmlns:a16="http://schemas.microsoft.com/office/drawing/2014/main" id="{3ABEE2F7-2A28-4E3A-BE72-9AB76D7C94C2}"/>
+                  <a16:creationId xmlns:a16="http://schemas.microsoft.com/office/drawing/2014/main" xmlns="" id="{3ABEE2F7-2A28-4E3A-BE72-9AB76D7C94C2}"/>
                 </a:ext>
               </a:extLst>
             </p:cNvPr>
@@ -7452,7 +7477,7 @@
             <p:cNvPr id="191" name="Straight Connector 190">
               <a:extLst>
                 <a:ext uri="{FF2B5EF4-FFF2-40B4-BE49-F238E27FC236}">
-                  <a16:creationId xmlns:a16="http://schemas.microsoft.com/office/drawing/2014/main" id="{C73E7DDE-E3F0-45CD-A764-3F7230D99CD5}"/>
+                  <a16:creationId xmlns:a16="http://schemas.microsoft.com/office/drawing/2014/main" xmlns="" id="{C73E7DDE-E3F0-45CD-A764-3F7230D99CD5}"/>
                 </a:ext>
               </a:extLst>
             </p:cNvPr>
@@ -7495,7 +7520,7 @@
             <p:cNvPr id="192" name="Straight Connector 191">
               <a:extLst>
                 <a:ext uri="{FF2B5EF4-FFF2-40B4-BE49-F238E27FC236}">
-                  <a16:creationId xmlns:a16="http://schemas.microsoft.com/office/drawing/2014/main" id="{2834EF65-A276-4FB6-8C6B-2779BE2B07C7}"/>
+                  <a16:creationId xmlns:a16="http://schemas.microsoft.com/office/drawing/2014/main" xmlns="" id="{2834EF65-A276-4FB6-8C6B-2779BE2B07C7}"/>
                 </a:ext>
               </a:extLst>
             </p:cNvPr>
@@ -7538,7 +7563,7 @@
             <p:cNvPr id="193" name="Straight Connector 192">
               <a:extLst>
                 <a:ext uri="{FF2B5EF4-FFF2-40B4-BE49-F238E27FC236}">
-                  <a16:creationId xmlns:a16="http://schemas.microsoft.com/office/drawing/2014/main" id="{D642F713-81DB-4F29-8F0B-FFFAC12E582B}"/>
+                  <a16:creationId xmlns:a16="http://schemas.microsoft.com/office/drawing/2014/main" xmlns="" id="{D642F713-81DB-4F29-8F0B-FFFAC12E582B}"/>
                 </a:ext>
               </a:extLst>
             </p:cNvPr>
@@ -7582,7 +7607,7 @@
           <p:cNvPr id="39" name="Straight Connector 38">
             <a:extLst>
               <a:ext uri="{FF2B5EF4-FFF2-40B4-BE49-F238E27FC236}">
-                <a16:creationId xmlns:a16="http://schemas.microsoft.com/office/drawing/2014/main" id="{6D6C5C93-4C0A-47AE-82A3-D7C49FD7C7EF}"/>
+                <a16:creationId xmlns:a16="http://schemas.microsoft.com/office/drawing/2014/main" xmlns="" id="{6D6C5C93-4C0A-47AE-82A3-D7C49FD7C7EF}"/>
               </a:ext>
             </a:extLst>
           </p:cNvPr>
@@ -7592,9 +7617,9 @@
           <p:nvPr/>
         </p:nvCxnSpPr>
         <p:spPr>
-          <a:xfrm>
-            <a:off x="0" y="1603044"/>
-            <a:ext cx="18374400" cy="13622"/>
+          <a:xfrm flipV="1">
+            <a:off x="0" y="1600200"/>
+            <a:ext cx="18288000" cy="2844"/>
           </a:xfrm>
           <a:prstGeom prst="line">
             <a:avLst/>
@@ -7625,7 +7650,7 @@
           <p:cNvPr id="204" name="Straight Connector 203">
             <a:extLst>
               <a:ext uri="{FF2B5EF4-FFF2-40B4-BE49-F238E27FC236}">
-                <a16:creationId xmlns:a16="http://schemas.microsoft.com/office/drawing/2014/main" id="{C838F322-7F82-47BA-9216-F4A87BF6D705}"/>
+                <a16:creationId xmlns:a16="http://schemas.microsoft.com/office/drawing/2014/main" xmlns="" id="{C838F322-7F82-47BA-9216-F4A87BF6D705}"/>
               </a:ext>
             </a:extLst>
           </p:cNvPr>
@@ -7668,7 +7693,7 @@
           <p:cNvPr id="205" name="Straight Connector 204">
             <a:extLst>
               <a:ext uri="{FF2B5EF4-FFF2-40B4-BE49-F238E27FC236}">
-                <a16:creationId xmlns:a16="http://schemas.microsoft.com/office/drawing/2014/main" id="{1EC903C1-738F-4C0E-8F95-DCA44D35C572}"/>
+                <a16:creationId xmlns:a16="http://schemas.microsoft.com/office/drawing/2014/main" xmlns="" id="{1EC903C1-738F-4C0E-8F95-DCA44D35C572}"/>
               </a:ext>
             </a:extLst>
           </p:cNvPr>
@@ -7711,7 +7736,7 @@
           <p:cNvPr id="206" name="Straight Connector 205">
             <a:extLst>
               <a:ext uri="{FF2B5EF4-FFF2-40B4-BE49-F238E27FC236}">
-                <a16:creationId xmlns:a16="http://schemas.microsoft.com/office/drawing/2014/main" id="{0002D4CD-538F-44B7-BDC2-5E139F46CAAA}"/>
+                <a16:creationId xmlns:a16="http://schemas.microsoft.com/office/drawing/2014/main" xmlns="" id="{0002D4CD-538F-44B7-BDC2-5E139F46CAAA}"/>
               </a:ext>
             </a:extLst>
           </p:cNvPr>
@@ -7754,7 +7779,7 @@
           <p:cNvPr id="207" name="Straight Connector 206">
             <a:extLst>
               <a:ext uri="{FF2B5EF4-FFF2-40B4-BE49-F238E27FC236}">
-                <a16:creationId xmlns:a16="http://schemas.microsoft.com/office/drawing/2014/main" id="{48519236-634E-4876-979D-7A8661AFEBDF}"/>
+                <a16:creationId xmlns:a16="http://schemas.microsoft.com/office/drawing/2014/main" xmlns="" id="{48519236-634E-4876-979D-7A8661AFEBDF}"/>
               </a:ext>
             </a:extLst>
           </p:cNvPr>
@@ -7797,7 +7822,7 @@
           <p:cNvPr id="208" name="Straight Connector 207">
             <a:extLst>
               <a:ext uri="{FF2B5EF4-FFF2-40B4-BE49-F238E27FC236}">
-                <a16:creationId xmlns:a16="http://schemas.microsoft.com/office/drawing/2014/main" id="{83404C2A-00C1-482D-B57B-792B89C12FF4}"/>
+                <a16:creationId xmlns:a16="http://schemas.microsoft.com/office/drawing/2014/main" xmlns="" id="{83404C2A-00C1-482D-B57B-792B89C12FF4}"/>
               </a:ext>
             </a:extLst>
           </p:cNvPr>
@@ -7837,10 +7862,217 @@
       </p:cxnSp>
       <p:grpSp>
         <p:nvGrpSpPr>
-          <p:cNvPr id="14" name="Car ETH">
+          <p:cNvPr id="230" name="Group 229"/>
+          <p:cNvGrpSpPr/>
+          <p:nvPr/>
+        </p:nvGrpSpPr>
+        <p:grpSpPr>
+          <a:xfrm>
+            <a:off x="2393055" y="2436268"/>
+            <a:ext cx="1507594" cy="1409677"/>
+            <a:chOff x="2393055" y="2436268"/>
+            <a:chExt cx="1507594" cy="1409677"/>
+          </a:xfrm>
+        </p:grpSpPr>
+        <p:pic>
+          <p:nvPicPr>
+            <p:cNvPr id="10" name="Picture 9">
+              <a:extLst>
+                <a:ext uri="{FF2B5EF4-FFF2-40B4-BE49-F238E27FC236}">
+                  <a16:creationId xmlns:a16="http://schemas.microsoft.com/office/drawing/2014/main" xmlns="" id="{3607E0D5-37A3-4072-98B7-1B249E06736C}"/>
+                </a:ext>
+              </a:extLst>
+            </p:cNvPr>
+            <p:cNvPicPr>
+              <a:picLocks noChangeAspect="1"/>
+            </p:cNvPicPr>
+            <p:nvPr/>
+          </p:nvPicPr>
+          <p:blipFill>
+            <a:blip r:embed="rId4" cstate="print">
+              <a:duotone>
+                <a:prstClr val="black"/>
+                <a:schemeClr val="bg2">
+                  <a:lumMod val="10000"/>
+                  <a:tint val="45000"/>
+                  <a:satMod val="400000"/>
+                </a:schemeClr>
+              </a:duotone>
+              <a:extLst>
+                <a:ext uri="{28A0092B-C50C-407E-A947-70E740481C1C}">
+                  <a14:useLocalDpi xmlns:a14="http://schemas.microsoft.com/office/drawing/2010/main" xmlns="" val="0"/>
+                </a:ext>
+                <a:ext uri="{837473B0-CC2E-450A-ABE3-18F120FF3D39}">
+                  <a1611:picAttrSrcUrl xmlns:a1611="http://schemas.microsoft.com/office/drawing/2016/11/main" xmlns="" r:id="rId5"/>
+                </a:ext>
+              </a:extLst>
+            </a:blip>
+            <a:stretch>
+              <a:fillRect/>
+            </a:stretch>
+          </p:blipFill>
+          <p:spPr>
+            <a:xfrm>
+              <a:off x="2393055" y="2436268"/>
+              <a:ext cx="1507594" cy="1409677"/>
+            </a:xfrm>
+            <a:prstGeom prst="rect">
+              <a:avLst/>
+            </a:prstGeom>
+          </p:spPr>
+        </p:pic>
+        <p:pic>
+          <p:nvPicPr>
+            <p:cNvPr id="1032" name="Picture 8" descr="Eth ethcoin etherium icon - Crypto Currency And Coin">
+              <a:extLst>
+                <a:ext uri="{FF2B5EF4-FFF2-40B4-BE49-F238E27FC236}">
+                  <a16:creationId xmlns:a16="http://schemas.microsoft.com/office/drawing/2014/main" xmlns="" id="{01BDD77B-2F38-4DB7-81EC-1DEB383FB2DA}"/>
+                </a:ext>
+              </a:extLst>
+            </p:cNvPr>
+            <p:cNvPicPr>
+              <a:picLocks noChangeAspect="1" noChangeArrowheads="1"/>
+            </p:cNvPicPr>
+            <p:nvPr/>
+          </p:nvPicPr>
+          <p:blipFill>
+            <a:blip r:embed="rId6" cstate="print">
+              <a:extLst>
+                <a:ext uri="{28A0092B-C50C-407E-A947-70E740481C1C}">
+                  <a14:useLocalDpi xmlns:a14="http://schemas.microsoft.com/office/drawing/2010/main" xmlns="" val="0"/>
+                </a:ext>
+              </a:extLst>
+            </a:blip>
+            <a:srcRect/>
+            <a:stretch>
+              <a:fillRect/>
+            </a:stretch>
+          </p:blipFill>
+          <p:spPr bwMode="auto">
+            <a:xfrm>
+              <a:off x="2836542" y="2970498"/>
+              <a:ext cx="335574" cy="313778"/>
+            </a:xfrm>
+            <a:prstGeom prst="rect">
+              <a:avLst/>
+            </a:prstGeom>
+            <a:noFill/>
+            <a:extLst>
+              <a:ext uri="{909E8E84-426E-40DD-AFC4-6F175D3DCCD1}">
+                <a14:hiddenFill xmlns:a14="http://schemas.microsoft.com/office/drawing/2010/main" xmlns="">
+                  <a:solidFill>
+                    <a:srgbClr val="FFFFFF"/>
+                  </a:solidFill>
+                </a14:hiddenFill>
+              </a:ext>
+            </a:extLst>
+          </p:spPr>
+        </p:pic>
+      </p:grpSp>
+      <p:grpSp>
+        <p:nvGrpSpPr>
+          <p:cNvPr id="232" name="Group 231"/>
+          <p:cNvGrpSpPr/>
+          <p:nvPr/>
+        </p:nvGrpSpPr>
+        <p:grpSpPr>
+          <a:xfrm>
+            <a:off x="2415400" y="5385012"/>
+            <a:ext cx="1437694" cy="1499870"/>
+            <a:chOff x="2415400" y="5385012"/>
+            <a:chExt cx="1437694" cy="1499870"/>
+          </a:xfrm>
+        </p:grpSpPr>
+        <p:pic>
+          <p:nvPicPr>
+            <p:cNvPr id="22" name="Picture 21">
+              <a:extLst>
+                <a:ext uri="{FF2B5EF4-FFF2-40B4-BE49-F238E27FC236}">
+                  <a16:creationId xmlns:a16="http://schemas.microsoft.com/office/drawing/2014/main" xmlns="" id="{96940D9A-343E-4C03-A625-D48E1BC71038}"/>
+                </a:ext>
+              </a:extLst>
+            </p:cNvPr>
+            <p:cNvPicPr>
+              <a:picLocks noChangeAspect="1"/>
+            </p:cNvPicPr>
+            <p:nvPr/>
+          </p:nvPicPr>
+          <p:blipFill>
+            <a:blip r:embed="rId7" cstate="print">
+              <a:extLst>
+                <a:ext uri="{28A0092B-C50C-407E-A947-70E740481C1C}">
+                  <a14:useLocalDpi xmlns:a14="http://schemas.microsoft.com/office/drawing/2010/main" xmlns="" val="0"/>
+                </a:ext>
+              </a:extLst>
+            </a:blip>
+            <a:stretch>
+              <a:fillRect/>
+            </a:stretch>
+          </p:blipFill>
+          <p:spPr>
+            <a:xfrm>
+              <a:off x="2415400" y="5385012"/>
+              <a:ext cx="1437694" cy="1499870"/>
+            </a:xfrm>
+            <a:prstGeom prst="rect">
+              <a:avLst/>
+            </a:prstGeom>
+          </p:spPr>
+        </p:pic>
+        <p:pic>
+          <p:nvPicPr>
+            <p:cNvPr id="23" name="Picture 6" descr="CRYPTO BASICS | Secure and Easy way to Bitcoin | Learn the basics About  Crypto | BITCOIN LIVE MARKET| CRYPTO NEWS | What is EOS?">
+              <a:extLst>
+                <a:ext uri="{FF2B5EF4-FFF2-40B4-BE49-F238E27FC236}">
+                  <a16:creationId xmlns:a16="http://schemas.microsoft.com/office/drawing/2014/main" xmlns="" id="{67EE83DC-5E80-4639-A3E0-C4E862E7FAE0}"/>
+                </a:ext>
+              </a:extLst>
+            </p:cNvPr>
+            <p:cNvPicPr>
+              <a:picLocks noChangeAspect="1" noChangeArrowheads="1"/>
+            </p:cNvPicPr>
+            <p:nvPr/>
+          </p:nvPicPr>
+          <p:blipFill>
+            <a:blip r:embed="rId8" cstate="print">
+              <a:extLst>
+                <a:ext uri="{28A0092B-C50C-407E-A947-70E740481C1C}">
+                  <a14:useLocalDpi xmlns:a14="http://schemas.microsoft.com/office/drawing/2010/main" xmlns="" val="0"/>
+                </a:ext>
+              </a:extLst>
+            </a:blip>
+            <a:srcRect/>
+            <a:stretch>
+              <a:fillRect/>
+            </a:stretch>
+          </p:blipFill>
+          <p:spPr bwMode="auto">
+            <a:xfrm>
+              <a:off x="2848733" y="5973737"/>
+              <a:ext cx="295610" cy="308395"/>
+            </a:xfrm>
+            <a:prstGeom prst="rect">
+              <a:avLst/>
+            </a:prstGeom>
+            <a:noFill/>
+            <a:extLst>
+              <a:ext uri="{909E8E84-426E-40DD-AFC4-6F175D3DCCD1}">
+                <a14:hiddenFill xmlns:a14="http://schemas.microsoft.com/office/drawing/2010/main" xmlns="">
+                  <a:solidFill>
+                    <a:srgbClr val="FFFFFF"/>
+                  </a:solidFill>
+                </a14:hiddenFill>
+              </a:ext>
+            </a:extLst>
+          </p:spPr>
+        </p:pic>
+      </p:grpSp>
+      <p:grpSp>
+        <p:nvGrpSpPr>
+          <p:cNvPr id="34" name="Car BTC">
             <a:extLst>
               <a:ext uri="{FF2B5EF4-FFF2-40B4-BE49-F238E27FC236}">
-                <a16:creationId xmlns:a16="http://schemas.microsoft.com/office/drawing/2014/main" id="{213B11AE-9770-4E07-9989-C3BDAFFDD2B0}"/>
+                <a16:creationId xmlns:a16="http://schemas.microsoft.com/office/drawing/2014/main" xmlns="" id="{32BB49BC-7CB0-4E65-871A-8ED71797CDEA}"/>
               </a:ext>
             </a:extLst>
           </p:cNvPr>
@@ -7849,218 +8081,7 @@
         </p:nvGrpSpPr>
         <p:grpSpPr>
           <a:xfrm>
-            <a:off x="2481955" y="2436268"/>
-            <a:ext cx="1507594" cy="1409677"/>
-            <a:chOff x="799707" y="113990"/>
-            <a:chExt cx="1483870" cy="1486593"/>
-          </a:xfrm>
-        </p:grpSpPr>
-        <p:pic>
-          <p:nvPicPr>
-            <p:cNvPr id="10" name="Picture 9">
-              <a:extLst>
-                <a:ext uri="{FF2B5EF4-FFF2-40B4-BE49-F238E27FC236}">
-                  <a16:creationId xmlns:a16="http://schemas.microsoft.com/office/drawing/2014/main" id="{3607E0D5-37A3-4072-98B7-1B249E06736C}"/>
-                </a:ext>
-              </a:extLst>
-            </p:cNvPr>
-            <p:cNvPicPr>
-              <a:picLocks noChangeAspect="1"/>
-            </p:cNvPicPr>
-            <p:nvPr/>
-          </p:nvPicPr>
-          <p:blipFill>
-            <a:blip r:embed="rId4">
-              <a:extLst>
-                <a:ext uri="{28A0092B-C50C-407E-A947-70E740481C1C}">
-                  <a14:useLocalDpi xmlns:a14="http://schemas.microsoft.com/office/drawing/2010/main" val="0"/>
-                </a:ext>
-                <a:ext uri="{837473B0-CC2E-450A-ABE3-18F120FF3D39}">
-                  <a1611:picAttrSrcUrl xmlns:a1611="http://schemas.microsoft.com/office/drawing/2016/11/main" r:id="rId5"/>
-                </a:ext>
-              </a:extLst>
-            </a:blip>
-            <a:stretch>
-              <a:fillRect/>
-            </a:stretch>
-          </p:blipFill>
-          <p:spPr>
-            <a:xfrm>
-              <a:off x="799707" y="113990"/>
-              <a:ext cx="1483870" cy="1486593"/>
-            </a:xfrm>
-            <a:prstGeom prst="rect">
-              <a:avLst/>
-            </a:prstGeom>
-          </p:spPr>
-        </p:pic>
-        <p:pic>
-          <p:nvPicPr>
-            <p:cNvPr id="1032" name="Picture 8" descr="Eth ethcoin etherium icon - Crypto Currency And Coin">
-              <a:extLst>
-                <a:ext uri="{FF2B5EF4-FFF2-40B4-BE49-F238E27FC236}">
-                  <a16:creationId xmlns:a16="http://schemas.microsoft.com/office/drawing/2014/main" id="{01BDD77B-2F38-4DB7-81EC-1DEB383FB2DA}"/>
-                </a:ext>
-              </a:extLst>
-            </p:cNvPr>
-            <p:cNvPicPr>
-              <a:picLocks noChangeAspect="1" noChangeArrowheads="1"/>
-            </p:cNvPicPr>
-            <p:nvPr/>
-          </p:nvPicPr>
-          <p:blipFill>
-            <a:blip r:embed="rId6">
-              <a:extLst>
-                <a:ext uri="{28A0092B-C50C-407E-A947-70E740481C1C}">
-                  <a14:useLocalDpi xmlns:a14="http://schemas.microsoft.com/office/drawing/2010/main" val="0"/>
-                </a:ext>
-              </a:extLst>
-            </a:blip>
-            <a:srcRect/>
-            <a:stretch>
-              <a:fillRect/>
-            </a:stretch>
-          </p:blipFill>
-          <p:spPr bwMode="auto">
-            <a:xfrm>
-              <a:off x="1236215" y="677369"/>
-              <a:ext cx="330293" cy="330899"/>
-            </a:xfrm>
-            <a:prstGeom prst="rect">
-              <a:avLst/>
-            </a:prstGeom>
-            <a:noFill/>
-            <a:extLst>
-              <a:ext uri="{909E8E84-426E-40DD-AFC4-6F175D3DCCD1}">
-                <a14:hiddenFill xmlns:a14="http://schemas.microsoft.com/office/drawing/2010/main">
-                  <a:solidFill>
-                    <a:srgbClr val="FFFFFF"/>
-                  </a:solidFill>
-                </a14:hiddenFill>
-              </a:ext>
-            </a:extLst>
-          </p:spPr>
-        </p:pic>
-      </p:grpSp>
-      <p:grpSp>
-        <p:nvGrpSpPr>
-          <p:cNvPr id="18" name="Car EOS">
-            <a:extLst>
-              <a:ext uri="{FF2B5EF4-FFF2-40B4-BE49-F238E27FC236}">
-                <a16:creationId xmlns:a16="http://schemas.microsoft.com/office/drawing/2014/main" id="{DA8CB07A-25E3-4AD9-97C4-3A2BA113395F}"/>
-              </a:ext>
-            </a:extLst>
-          </p:cNvPr>
-          <p:cNvGrpSpPr/>
-          <p:nvPr/>
-        </p:nvGrpSpPr>
-        <p:grpSpPr>
-          <a:xfrm>
-            <a:off x="2504300" y="5385012"/>
-            <a:ext cx="1437694" cy="1499870"/>
-            <a:chOff x="799707" y="4685309"/>
-            <a:chExt cx="1578811" cy="1578811"/>
-          </a:xfrm>
-        </p:grpSpPr>
-        <p:pic>
-          <p:nvPicPr>
-            <p:cNvPr id="22" name="Picture 21">
-              <a:extLst>
-                <a:ext uri="{FF2B5EF4-FFF2-40B4-BE49-F238E27FC236}">
-                  <a16:creationId xmlns:a16="http://schemas.microsoft.com/office/drawing/2014/main" id="{96940D9A-343E-4C03-A625-D48E1BC71038}"/>
-                </a:ext>
-              </a:extLst>
-            </p:cNvPr>
-            <p:cNvPicPr>
-              <a:picLocks noChangeAspect="1"/>
-            </p:cNvPicPr>
-            <p:nvPr/>
-          </p:nvPicPr>
-          <p:blipFill>
-            <a:blip r:embed="rId7">
-              <a:extLst>
-                <a:ext uri="{28A0092B-C50C-407E-A947-70E740481C1C}">
-                  <a14:useLocalDpi xmlns:a14="http://schemas.microsoft.com/office/drawing/2010/main" val="0"/>
-                </a:ext>
-              </a:extLst>
-            </a:blip>
-            <a:stretch>
-              <a:fillRect/>
-            </a:stretch>
-          </p:blipFill>
-          <p:spPr>
-            <a:xfrm>
-              <a:off x="799707" y="4685309"/>
-              <a:ext cx="1578811" cy="1578811"/>
-            </a:xfrm>
-            <a:prstGeom prst="rect">
-              <a:avLst/>
-            </a:prstGeom>
-          </p:spPr>
-        </p:pic>
-        <p:pic>
-          <p:nvPicPr>
-            <p:cNvPr id="23" name="Picture 6" descr="CRYPTO BASICS | Secure and Easy way to Bitcoin | Learn the basics About  Crypto | BITCOIN LIVE MARKET| CRYPTO NEWS | What is EOS?">
-              <a:extLst>
-                <a:ext uri="{FF2B5EF4-FFF2-40B4-BE49-F238E27FC236}">
-                  <a16:creationId xmlns:a16="http://schemas.microsoft.com/office/drawing/2014/main" id="{67EE83DC-5E80-4639-A3E0-C4E862E7FAE0}"/>
-                </a:ext>
-              </a:extLst>
-            </p:cNvPr>
-            <p:cNvPicPr>
-              <a:picLocks noChangeAspect="1" noChangeArrowheads="1"/>
-            </p:cNvPicPr>
-            <p:nvPr/>
-          </p:nvPicPr>
-          <p:blipFill>
-            <a:blip r:embed="rId8">
-              <a:extLst>
-                <a:ext uri="{28A0092B-C50C-407E-A947-70E740481C1C}">
-                  <a14:useLocalDpi xmlns:a14="http://schemas.microsoft.com/office/drawing/2010/main" val="0"/>
-                </a:ext>
-              </a:extLst>
-            </a:blip>
-            <a:srcRect/>
-            <a:stretch>
-              <a:fillRect/>
-            </a:stretch>
-          </p:blipFill>
-          <p:spPr bwMode="auto">
-            <a:xfrm>
-              <a:off x="1275574" y="5305020"/>
-              <a:ext cx="324626" cy="324626"/>
-            </a:xfrm>
-            <a:prstGeom prst="rect">
-              <a:avLst/>
-            </a:prstGeom>
-            <a:noFill/>
-            <a:extLst>
-              <a:ext uri="{909E8E84-426E-40DD-AFC4-6F175D3DCCD1}">
-                <a14:hiddenFill xmlns:a14="http://schemas.microsoft.com/office/drawing/2010/main">
-                  <a:solidFill>
-                    <a:srgbClr val="FFFFFF"/>
-                  </a:solidFill>
-                </a14:hiddenFill>
-              </a:ext>
-            </a:extLst>
-          </p:spPr>
-        </p:pic>
-      </p:grpSp>
-      <p:grpSp>
-        <p:nvGrpSpPr>
-          <p:cNvPr id="34" name="Car BTC">
-            <a:extLst>
-              <a:ext uri="{FF2B5EF4-FFF2-40B4-BE49-F238E27FC236}">
-                <a16:creationId xmlns:a16="http://schemas.microsoft.com/office/drawing/2014/main" id="{32BB49BC-7CB0-4E65-871A-8ED71797CDEA}"/>
-              </a:ext>
-            </a:extLst>
-          </p:cNvPr>
-          <p:cNvGrpSpPr/>
-          <p:nvPr/>
-        </p:nvGrpSpPr>
-        <p:grpSpPr>
-          <a:xfrm>
-            <a:off x="2517468" y="1379336"/>
+            <a:off x="2428568" y="1379336"/>
             <a:ext cx="1433757" cy="1409677"/>
             <a:chOff x="2517468" y="1379336"/>
             <a:chExt cx="1433757" cy="1409677"/>
@@ -8071,7 +8092,7 @@
             <p:cNvPr id="31" name="Picture 30">
               <a:extLst>
                 <a:ext uri="{FF2B5EF4-FFF2-40B4-BE49-F238E27FC236}">
-                  <a16:creationId xmlns:a16="http://schemas.microsoft.com/office/drawing/2014/main" id="{F6DAAFAE-389B-48E1-B659-E8BBA71C5021}"/>
+                  <a16:creationId xmlns:a16="http://schemas.microsoft.com/office/drawing/2014/main" xmlns="" id="{F6DAAFAE-389B-48E1-B659-E8BBA71C5021}"/>
                 </a:ext>
               </a:extLst>
             </p:cNvPr>
@@ -8081,7 +8102,7 @@
             <p:nvPr/>
           </p:nvPicPr>
           <p:blipFill>
-            <a:blip r:embed="rId9">
+            <a:blip r:embed="rId9" cstate="print">
               <a:duotone>
                 <a:prstClr val="black"/>
                 <a:schemeClr val="accent2">
@@ -8091,10 +8112,10 @@
               </a:duotone>
               <a:extLst>
                 <a:ext uri="{28A0092B-C50C-407E-A947-70E740481C1C}">
-                  <a14:useLocalDpi xmlns:a14="http://schemas.microsoft.com/office/drawing/2010/main" val="0"/>
+                  <a14:useLocalDpi xmlns:a14="http://schemas.microsoft.com/office/drawing/2010/main" xmlns="" val="0"/>
                 </a:ext>
                 <a:ext uri="{837473B0-CC2E-450A-ABE3-18F120FF3D39}">
-                  <a1611:picAttrSrcUrl xmlns:a1611="http://schemas.microsoft.com/office/drawing/2016/11/main" r:id="rId10"/>
+                  <a1611:picAttrSrcUrl xmlns:a1611="http://schemas.microsoft.com/office/drawing/2016/11/main" xmlns="" r:id="rId10"/>
                 </a:ext>
               </a:extLst>
             </a:blip>
@@ -8117,7 +8138,7 @@
             <p:cNvPr id="32" name="Picture 12">
               <a:extLst>
                 <a:ext uri="{FF2B5EF4-FFF2-40B4-BE49-F238E27FC236}">
-                  <a16:creationId xmlns:a16="http://schemas.microsoft.com/office/drawing/2014/main" id="{D4074AB2-7FDD-4FB5-AFE5-0F26E14C9E5C}"/>
+                  <a16:creationId xmlns:a16="http://schemas.microsoft.com/office/drawing/2014/main" xmlns="" id="{D4074AB2-7FDD-4FB5-AFE5-0F26E14C9E5C}"/>
                 </a:ext>
               </a:extLst>
             </p:cNvPr>
@@ -8127,10 +8148,10 @@
             <p:nvPr/>
           </p:nvPicPr>
           <p:blipFill>
-            <a:blip r:embed="rId11">
+            <a:blip r:embed="rId11" cstate="print">
               <a:extLst>
                 <a:ext uri="{28A0092B-C50C-407E-A947-70E740481C1C}">
-                  <a14:useLocalDpi xmlns:a14="http://schemas.microsoft.com/office/drawing/2010/main" val="0"/>
+                  <a14:useLocalDpi xmlns:a14="http://schemas.microsoft.com/office/drawing/2010/main" xmlns="" val="0"/>
                 </a:ext>
               </a:extLst>
             </a:blip>
@@ -8150,213 +8171,7 @@
             <a:noFill/>
             <a:extLst>
               <a:ext uri="{909E8E84-426E-40DD-AFC4-6F175D3DCCD1}">
-                <a14:hiddenFill xmlns:a14="http://schemas.microsoft.com/office/drawing/2010/main">
-                  <a:solidFill>
-                    <a:srgbClr val="FFFFFF"/>
-                  </a:solidFill>
-                </a14:hiddenFill>
-              </a:ext>
-            </a:extLst>
-          </p:spPr>
-        </p:pic>
-      </p:grpSp>
-      <p:grpSp>
-        <p:nvGrpSpPr>
-          <p:cNvPr id="37" name="Car Visa/Mastercard">
-            <a:extLst>
-              <a:ext uri="{FF2B5EF4-FFF2-40B4-BE49-F238E27FC236}">
-                <a16:creationId xmlns:a16="http://schemas.microsoft.com/office/drawing/2014/main" id="{CD3B579E-6221-4301-8328-2C1C9E5E03AD}"/>
-              </a:ext>
-            </a:extLst>
-          </p:cNvPr>
-          <p:cNvGrpSpPr/>
-          <p:nvPr/>
-        </p:nvGrpSpPr>
-        <p:grpSpPr>
-          <a:xfrm>
-            <a:off x="2463197" y="4724322"/>
-            <a:ext cx="1526352" cy="814212"/>
-            <a:chOff x="1091597" y="4724322"/>
-            <a:chExt cx="1526352" cy="814212"/>
-          </a:xfrm>
-        </p:grpSpPr>
-        <p:pic>
-          <p:nvPicPr>
-            <p:cNvPr id="11" name="Picture 10">
-              <a:extLst>
-                <a:ext uri="{FF2B5EF4-FFF2-40B4-BE49-F238E27FC236}">
-                  <a16:creationId xmlns:a16="http://schemas.microsoft.com/office/drawing/2014/main" id="{34334EB8-90BD-4EEA-9A7E-AB7CFB4979AB}"/>
-                </a:ext>
-              </a:extLst>
-            </p:cNvPr>
-            <p:cNvPicPr>
-              <a:picLocks noChangeAspect="1"/>
-            </p:cNvPicPr>
-            <p:nvPr/>
-          </p:nvPicPr>
-          <p:blipFill>
-            <a:blip r:embed="rId12">
-              <a:extLst>
-                <a:ext uri="{BEBA8EAE-BF5A-486C-A8C5-ECC9F3942E4B}">
-                  <a14:imgProps xmlns:a14="http://schemas.microsoft.com/office/drawing/2010/main">
-                    <a14:imgLayer r:embed="rId13">
-                      <a14:imgEffect>
-                        <a14:colorTemperature colorTemp="5900"/>
-                      </a14:imgEffect>
-                    </a14:imgLayer>
-                  </a14:imgProps>
-                </a:ext>
-                <a:ext uri="{28A0092B-C50C-407E-A947-70E740481C1C}">
-                  <a14:useLocalDpi xmlns:a14="http://schemas.microsoft.com/office/drawing/2010/main" val="0"/>
-                </a:ext>
-              </a:extLst>
-            </a:blip>
-            <a:stretch>
-              <a:fillRect/>
-            </a:stretch>
-          </p:blipFill>
-          <p:spPr>
-            <a:xfrm>
-              <a:off x="1091597" y="4724322"/>
-              <a:ext cx="1526352" cy="814212"/>
-            </a:xfrm>
-            <a:prstGeom prst="rect">
-              <a:avLst/>
-            </a:prstGeom>
-          </p:spPr>
-        </p:pic>
-        <p:pic>
-          <p:nvPicPr>
-            <p:cNvPr id="28" name="Picture 27">
-              <a:extLst>
-                <a:ext uri="{FF2B5EF4-FFF2-40B4-BE49-F238E27FC236}">
-                  <a16:creationId xmlns:a16="http://schemas.microsoft.com/office/drawing/2014/main" id="{03A14022-682A-4D1B-B371-6E3F71C6F5DE}"/>
-                </a:ext>
-              </a:extLst>
-            </p:cNvPr>
-            <p:cNvPicPr>
-              <a:picLocks noChangeAspect="1"/>
-            </p:cNvPicPr>
-            <p:nvPr/>
-          </p:nvPicPr>
-          <p:blipFill>
-            <a:blip r:embed="rId14">
-              <a:extLst>
-                <a:ext uri="{28A0092B-C50C-407E-A947-70E740481C1C}">
-                  <a14:useLocalDpi xmlns:a14="http://schemas.microsoft.com/office/drawing/2010/main" val="0"/>
-                </a:ext>
-              </a:extLst>
-            </a:blip>
-            <a:stretch>
-              <a:fillRect/>
-            </a:stretch>
-          </p:blipFill>
-          <p:spPr>
-            <a:xfrm>
-              <a:off x="1285973" y="4791165"/>
-              <a:ext cx="866907" cy="481615"/>
-            </a:xfrm>
-            <a:prstGeom prst="rect">
-              <a:avLst/>
-            </a:prstGeom>
-          </p:spPr>
-        </p:pic>
-      </p:grpSp>
-      <p:grpSp>
-        <p:nvGrpSpPr>
-          <p:cNvPr id="29" name="Car Paypal">
-            <a:extLst>
-              <a:ext uri="{FF2B5EF4-FFF2-40B4-BE49-F238E27FC236}">
-                <a16:creationId xmlns:a16="http://schemas.microsoft.com/office/drawing/2014/main" id="{27A8CF32-02C3-4FDB-B0C1-C053D284EFCA}"/>
-              </a:ext>
-            </a:extLst>
-          </p:cNvPr>
-          <p:cNvGrpSpPr/>
-          <p:nvPr/>
-        </p:nvGrpSpPr>
-        <p:grpSpPr>
-          <a:xfrm>
-            <a:off x="2489679" y="3706775"/>
-            <a:ext cx="1499871" cy="814216"/>
-            <a:chOff x="1118078" y="3706775"/>
-            <a:chExt cx="1499871" cy="814216"/>
-          </a:xfrm>
-        </p:grpSpPr>
-        <p:pic>
-          <p:nvPicPr>
-            <p:cNvPr id="13" name="Picture 12">
-              <a:extLst>
-                <a:ext uri="{FF2B5EF4-FFF2-40B4-BE49-F238E27FC236}">
-                  <a16:creationId xmlns:a16="http://schemas.microsoft.com/office/drawing/2014/main" id="{AF995F73-BDFB-4C24-A545-91D26C2901AC}"/>
-                </a:ext>
-              </a:extLst>
-            </p:cNvPr>
-            <p:cNvPicPr>
-              <a:picLocks noChangeAspect="1"/>
-            </p:cNvPicPr>
-            <p:nvPr/>
-          </p:nvPicPr>
-          <p:blipFill>
-            <a:blip r:embed="rId15">
-              <a:extLst>
-                <a:ext uri="{28A0092B-C50C-407E-A947-70E740481C1C}">
-                  <a14:useLocalDpi xmlns:a14="http://schemas.microsoft.com/office/drawing/2010/main" val="0"/>
-                </a:ext>
-              </a:extLst>
-            </a:blip>
-            <a:stretch>
-              <a:fillRect/>
-            </a:stretch>
-          </p:blipFill>
-          <p:spPr>
-            <a:xfrm>
-              <a:off x="1118078" y="3706775"/>
-              <a:ext cx="1499871" cy="814216"/>
-            </a:xfrm>
-            <a:prstGeom prst="rect">
-              <a:avLst/>
-            </a:prstGeom>
-          </p:spPr>
-        </p:pic>
-        <p:pic>
-          <p:nvPicPr>
-            <p:cNvPr id="1038" name="Picture 14" descr="Download Paypal Logo Transparent Png HQ PNG Image | FreePNGImg">
-              <a:extLst>
-                <a:ext uri="{FF2B5EF4-FFF2-40B4-BE49-F238E27FC236}">
-                  <a16:creationId xmlns:a16="http://schemas.microsoft.com/office/drawing/2014/main" id="{858294D3-7705-4A54-A840-D955FF644CA2}"/>
-                </a:ext>
-              </a:extLst>
-            </p:cNvPr>
-            <p:cNvPicPr>
-              <a:picLocks noChangeAspect="1" noChangeArrowheads="1"/>
-            </p:cNvPicPr>
-            <p:nvPr/>
-          </p:nvPicPr>
-          <p:blipFill>
-            <a:blip r:embed="rId16" cstate="email">
-              <a:extLst>
-                <a:ext uri="{28A0092B-C50C-407E-A947-70E740481C1C}">
-                  <a14:useLocalDpi xmlns:a14="http://schemas.microsoft.com/office/drawing/2010/main"/>
-                </a:ext>
-              </a:extLst>
-            </a:blip>
-            <a:srcRect/>
-            <a:stretch>
-              <a:fillRect/>
-            </a:stretch>
-          </p:blipFill>
-          <p:spPr bwMode="auto">
-            <a:xfrm>
-              <a:off x="1449610" y="3918933"/>
-              <a:ext cx="561332" cy="391122"/>
-            </a:xfrm>
-            <a:prstGeom prst="rect">
-              <a:avLst/>
-            </a:prstGeom>
-            <a:noFill/>
-            <a:extLst>
-              <a:ext uri="{909E8E84-426E-40DD-AFC4-6F175D3DCCD1}">
-                <a14:hiddenFill xmlns:a14="http://schemas.microsoft.com/office/drawing/2010/main">
+                <a14:hiddenFill xmlns:a14="http://schemas.microsoft.com/office/drawing/2010/main" xmlns="">
                   <a:solidFill>
                     <a:srgbClr val="FFFFFF"/>
                   </a:solidFill>
@@ -8371,7 +8186,7 @@
           <p:cNvPr id="263" name="Straight Connector 262">
             <a:extLst>
               <a:ext uri="{FF2B5EF4-FFF2-40B4-BE49-F238E27FC236}">
-                <a16:creationId xmlns:a16="http://schemas.microsoft.com/office/drawing/2014/main" id="{238327E0-6B4F-4FB1-B791-779CFCB25767}"/>
+                <a16:creationId xmlns:a16="http://schemas.microsoft.com/office/drawing/2014/main" xmlns="" id="{238327E0-6B4F-4FB1-B791-779CFCB25767}"/>
               </a:ext>
             </a:extLst>
           </p:cNvPr>
@@ -8414,7 +8229,7 @@
           <p:cNvPr id="264" name="Straight Connector 263">
             <a:extLst>
               <a:ext uri="{FF2B5EF4-FFF2-40B4-BE49-F238E27FC236}">
-                <a16:creationId xmlns:a16="http://schemas.microsoft.com/office/drawing/2014/main" id="{DC706EEE-9114-4BD1-8A88-776F6E8D719A}"/>
+                <a16:creationId xmlns:a16="http://schemas.microsoft.com/office/drawing/2014/main" xmlns="" id="{DC706EEE-9114-4BD1-8A88-776F6E8D719A}"/>
               </a:ext>
             </a:extLst>
           </p:cNvPr>
@@ -8457,7 +8272,7 @@
           <p:cNvPr id="265" name="Straight Connector 264">
             <a:extLst>
               <a:ext uri="{FF2B5EF4-FFF2-40B4-BE49-F238E27FC236}">
-                <a16:creationId xmlns:a16="http://schemas.microsoft.com/office/drawing/2014/main" id="{1EA8650F-775A-4212-99C7-82043874A002}"/>
+                <a16:creationId xmlns:a16="http://schemas.microsoft.com/office/drawing/2014/main" xmlns="" id="{1EA8650F-775A-4212-99C7-82043874A002}"/>
               </a:ext>
             </a:extLst>
           </p:cNvPr>
@@ -8500,7 +8315,7 @@
           <p:cNvPr id="266" name="Straight Connector 265">
             <a:extLst>
               <a:ext uri="{FF2B5EF4-FFF2-40B4-BE49-F238E27FC236}">
-                <a16:creationId xmlns:a16="http://schemas.microsoft.com/office/drawing/2014/main" id="{693AEC0C-A8C7-4058-B962-0A690FF895F4}"/>
+                <a16:creationId xmlns:a16="http://schemas.microsoft.com/office/drawing/2014/main" xmlns="" id="{693AEC0C-A8C7-4058-B962-0A690FF895F4}"/>
               </a:ext>
             </a:extLst>
           </p:cNvPr>
@@ -8540,53 +8355,10 @@
       </p:cxnSp>
       <p:cxnSp>
         <p:nvCxnSpPr>
-          <p:cNvPr id="267" name="Straight Connector 266">
-            <a:extLst>
-              <a:ext uri="{FF2B5EF4-FFF2-40B4-BE49-F238E27FC236}">
-                <a16:creationId xmlns:a16="http://schemas.microsoft.com/office/drawing/2014/main" id="{F5C2E6C0-5750-4F66-A2CF-30B645FED4BE}"/>
-              </a:ext>
-            </a:extLst>
-          </p:cNvPr>
-          <p:cNvCxnSpPr>
-            <a:cxnSpLocks/>
-          </p:cNvCxnSpPr>
-          <p:nvPr/>
-        </p:nvCxnSpPr>
-        <p:spPr>
-          <a:xfrm>
-            <a:off x="18374400" y="6118605"/>
-            <a:ext cx="495635" cy="0"/>
-          </a:xfrm>
-          <a:prstGeom prst="line">
-            <a:avLst/>
-          </a:prstGeom>
-          <a:ln w="57150">
-            <a:solidFill>
-              <a:schemeClr val="bg1"/>
-            </a:solidFill>
-          </a:ln>
-        </p:spPr>
-        <p:style>
-          <a:lnRef idx="1">
-            <a:schemeClr val="accent1"/>
-          </a:lnRef>
-          <a:fillRef idx="0">
-            <a:schemeClr val="accent1"/>
-          </a:fillRef>
-          <a:effectRef idx="0">
-            <a:schemeClr val="accent1"/>
-          </a:effectRef>
-          <a:fontRef idx="minor">
-            <a:schemeClr val="tx1"/>
-          </a:fontRef>
-        </p:style>
-      </p:cxnSp>
-      <p:cxnSp>
-        <p:nvCxnSpPr>
           <p:cNvPr id="268" name="Straight Connector 267">
             <a:extLst>
               <a:ext uri="{FF2B5EF4-FFF2-40B4-BE49-F238E27FC236}">
-                <a16:creationId xmlns:a16="http://schemas.microsoft.com/office/drawing/2014/main" id="{0FFD9D74-E876-4D87-8C46-81E7E0E78967}"/>
+                <a16:creationId xmlns:a16="http://schemas.microsoft.com/office/drawing/2014/main" xmlns="" id="{0FFD9D74-E876-4D87-8C46-81E7E0E78967}"/>
               </a:ext>
             </a:extLst>
           </p:cNvPr>
@@ -8629,7 +8401,7 @@
           <p:cNvPr id="269" name="Straight Connector 268">
             <a:extLst>
               <a:ext uri="{FF2B5EF4-FFF2-40B4-BE49-F238E27FC236}">
-                <a16:creationId xmlns:a16="http://schemas.microsoft.com/office/drawing/2014/main" id="{C9031EC7-C0F7-4A09-A423-7751EA746644}"/>
+                <a16:creationId xmlns:a16="http://schemas.microsoft.com/office/drawing/2014/main" xmlns="" id="{C9031EC7-C0F7-4A09-A423-7751EA746644}"/>
               </a:ext>
             </a:extLst>
           </p:cNvPr>
@@ -8672,7 +8444,7 @@
           <p:cNvPr id="270" name="Straight Connector 269">
             <a:extLst>
               <a:ext uri="{FF2B5EF4-FFF2-40B4-BE49-F238E27FC236}">
-                <a16:creationId xmlns:a16="http://schemas.microsoft.com/office/drawing/2014/main" id="{786864D3-1CE7-4DC2-B431-9F35D6D83FA9}"/>
+                <a16:creationId xmlns:a16="http://schemas.microsoft.com/office/drawing/2014/main" xmlns="" id="{786864D3-1CE7-4DC2-B431-9F35D6D83FA9}"/>
               </a:ext>
             </a:extLst>
           </p:cNvPr>
@@ -8715,7 +8487,7 @@
           <p:cNvPr id="271" name="Straight Connector 270">
             <a:extLst>
               <a:ext uri="{FF2B5EF4-FFF2-40B4-BE49-F238E27FC236}">
-                <a16:creationId xmlns:a16="http://schemas.microsoft.com/office/drawing/2014/main" id="{E466D59A-6638-451E-AFE9-E3E52C3F755D}"/>
+                <a16:creationId xmlns:a16="http://schemas.microsoft.com/office/drawing/2014/main" xmlns="" id="{E466D59A-6638-451E-AFE9-E3E52C3F755D}"/>
               </a:ext>
             </a:extLst>
           </p:cNvPr>
@@ -8755,53 +8527,10 @@
       </p:cxnSp>
       <p:cxnSp>
         <p:nvCxnSpPr>
-          <p:cNvPr id="272" name="Straight Connector 271">
-            <a:extLst>
-              <a:ext uri="{FF2B5EF4-FFF2-40B4-BE49-F238E27FC236}">
-                <a16:creationId xmlns:a16="http://schemas.microsoft.com/office/drawing/2014/main" id="{CA1BE654-C2F9-4CED-ACD0-B331753CEFC8}"/>
-              </a:ext>
-            </a:extLst>
-          </p:cNvPr>
-          <p:cNvCxnSpPr>
-            <a:cxnSpLocks/>
-          </p:cNvCxnSpPr>
-          <p:nvPr/>
-        </p:nvCxnSpPr>
-        <p:spPr>
-          <a:xfrm>
-            <a:off x="18400672" y="5104355"/>
-            <a:ext cx="495635" cy="0"/>
-          </a:xfrm>
-          <a:prstGeom prst="line">
-            <a:avLst/>
-          </a:prstGeom>
-          <a:ln w="57150">
-            <a:solidFill>
-              <a:schemeClr val="bg1"/>
-            </a:solidFill>
-          </a:ln>
-        </p:spPr>
-        <p:style>
-          <a:lnRef idx="1">
-            <a:schemeClr val="accent1"/>
-          </a:lnRef>
-          <a:fillRef idx="0">
-            <a:schemeClr val="accent1"/>
-          </a:fillRef>
-          <a:effectRef idx="0">
-            <a:schemeClr val="accent1"/>
-          </a:effectRef>
-          <a:fontRef idx="minor">
-            <a:schemeClr val="tx1"/>
-          </a:fontRef>
-        </p:style>
-      </p:cxnSp>
-      <p:cxnSp>
-        <p:nvCxnSpPr>
           <p:cNvPr id="273" name="Straight Connector 272">
             <a:extLst>
               <a:ext uri="{FF2B5EF4-FFF2-40B4-BE49-F238E27FC236}">
-                <a16:creationId xmlns:a16="http://schemas.microsoft.com/office/drawing/2014/main" id="{DB49AC4C-BA3D-4E88-BE56-F638B7B59BD6}"/>
+                <a16:creationId xmlns:a16="http://schemas.microsoft.com/office/drawing/2014/main" xmlns="" id="{DB49AC4C-BA3D-4E88-BE56-F638B7B59BD6}"/>
               </a:ext>
             </a:extLst>
           </p:cNvPr>
@@ -8844,7 +8573,7 @@
           <p:cNvPr id="274" name="Straight Connector 273">
             <a:extLst>
               <a:ext uri="{FF2B5EF4-FFF2-40B4-BE49-F238E27FC236}">
-                <a16:creationId xmlns:a16="http://schemas.microsoft.com/office/drawing/2014/main" id="{440AC2B8-12E2-45B4-8DB2-EB495CA638B7}"/>
+                <a16:creationId xmlns:a16="http://schemas.microsoft.com/office/drawing/2014/main" xmlns="" id="{440AC2B8-12E2-45B4-8DB2-EB495CA638B7}"/>
               </a:ext>
             </a:extLst>
           </p:cNvPr>
@@ -8887,7 +8616,7 @@
           <p:cNvPr id="275" name="Straight Connector 274">
             <a:extLst>
               <a:ext uri="{FF2B5EF4-FFF2-40B4-BE49-F238E27FC236}">
-                <a16:creationId xmlns:a16="http://schemas.microsoft.com/office/drawing/2014/main" id="{34D4D8AE-E4BD-4C91-BE07-6197D8DCD32F}"/>
+                <a16:creationId xmlns:a16="http://schemas.microsoft.com/office/drawing/2014/main" xmlns="" id="{34D4D8AE-E4BD-4C91-BE07-6197D8DCD32F}"/>
               </a:ext>
             </a:extLst>
           </p:cNvPr>
@@ -8930,7 +8659,7 @@
           <p:cNvPr id="276" name="Straight Connector 275">
             <a:extLst>
               <a:ext uri="{FF2B5EF4-FFF2-40B4-BE49-F238E27FC236}">
-                <a16:creationId xmlns:a16="http://schemas.microsoft.com/office/drawing/2014/main" id="{C43007A6-7F52-4A39-97FF-07A7B5BE357A}"/>
+                <a16:creationId xmlns:a16="http://schemas.microsoft.com/office/drawing/2014/main" xmlns="" id="{C43007A6-7F52-4A39-97FF-07A7B5BE357A}"/>
               </a:ext>
             </a:extLst>
           </p:cNvPr>
@@ -8970,53 +8699,10 @@
       </p:cxnSp>
       <p:cxnSp>
         <p:nvCxnSpPr>
-          <p:cNvPr id="277" name="Straight Connector 276">
-            <a:extLst>
-              <a:ext uri="{FF2B5EF4-FFF2-40B4-BE49-F238E27FC236}">
-                <a16:creationId xmlns:a16="http://schemas.microsoft.com/office/drawing/2014/main" id="{D2692A7D-002F-46C7-BE42-DA30C15FE284}"/>
-              </a:ext>
-            </a:extLst>
-          </p:cNvPr>
-          <p:cNvCxnSpPr>
-            <a:cxnSpLocks/>
-          </p:cNvCxnSpPr>
-          <p:nvPr/>
-        </p:nvCxnSpPr>
-        <p:spPr>
-          <a:xfrm>
-            <a:off x="18400672" y="4126899"/>
-            <a:ext cx="495635" cy="0"/>
-          </a:xfrm>
-          <a:prstGeom prst="line">
-            <a:avLst/>
-          </a:prstGeom>
-          <a:ln w="57150">
-            <a:solidFill>
-              <a:schemeClr val="bg1"/>
-            </a:solidFill>
-          </a:ln>
-        </p:spPr>
-        <p:style>
-          <a:lnRef idx="1">
-            <a:schemeClr val="accent1"/>
-          </a:lnRef>
-          <a:fillRef idx="0">
-            <a:schemeClr val="accent1"/>
-          </a:fillRef>
-          <a:effectRef idx="0">
-            <a:schemeClr val="accent1"/>
-          </a:effectRef>
-          <a:fontRef idx="minor">
-            <a:schemeClr val="tx1"/>
-          </a:fontRef>
-        </p:style>
-      </p:cxnSp>
-      <p:cxnSp>
-        <p:nvCxnSpPr>
           <p:cNvPr id="278" name="Straight Connector 277">
             <a:extLst>
               <a:ext uri="{FF2B5EF4-FFF2-40B4-BE49-F238E27FC236}">
-                <a16:creationId xmlns:a16="http://schemas.microsoft.com/office/drawing/2014/main" id="{D33448DE-62FD-4394-AC2A-8AEED619B6D2}"/>
+                <a16:creationId xmlns:a16="http://schemas.microsoft.com/office/drawing/2014/main" xmlns="" id="{D33448DE-62FD-4394-AC2A-8AEED619B6D2}"/>
               </a:ext>
             </a:extLst>
           </p:cNvPr>
@@ -9059,7 +8745,7 @@
           <p:cNvPr id="279" name="Straight Connector 278">
             <a:extLst>
               <a:ext uri="{FF2B5EF4-FFF2-40B4-BE49-F238E27FC236}">
-                <a16:creationId xmlns:a16="http://schemas.microsoft.com/office/drawing/2014/main" id="{CAAEAB94-6AB7-457C-AC02-26A1C50172DB}"/>
+                <a16:creationId xmlns:a16="http://schemas.microsoft.com/office/drawing/2014/main" xmlns="" id="{CAAEAB94-6AB7-457C-AC02-26A1C50172DB}"/>
               </a:ext>
             </a:extLst>
           </p:cNvPr>
@@ -9102,7 +8788,7 @@
           <p:cNvPr id="280" name="Straight Connector 279">
             <a:extLst>
               <a:ext uri="{FF2B5EF4-FFF2-40B4-BE49-F238E27FC236}">
-                <a16:creationId xmlns:a16="http://schemas.microsoft.com/office/drawing/2014/main" id="{E0389D71-8C2D-4F25-9295-7F78AC5B4B61}"/>
+                <a16:creationId xmlns:a16="http://schemas.microsoft.com/office/drawing/2014/main" xmlns="" id="{E0389D71-8C2D-4F25-9295-7F78AC5B4B61}"/>
               </a:ext>
             </a:extLst>
           </p:cNvPr>
@@ -9145,7 +8831,7 @@
           <p:cNvPr id="281" name="Straight Connector 280">
             <a:extLst>
               <a:ext uri="{FF2B5EF4-FFF2-40B4-BE49-F238E27FC236}">
-                <a16:creationId xmlns:a16="http://schemas.microsoft.com/office/drawing/2014/main" id="{1FC1490E-8929-431D-B225-4CAC198E9282}"/>
+                <a16:creationId xmlns:a16="http://schemas.microsoft.com/office/drawing/2014/main" xmlns="" id="{1FC1490E-8929-431D-B225-4CAC198E9282}"/>
               </a:ext>
             </a:extLst>
           </p:cNvPr>
@@ -9185,53 +8871,10 @@
       </p:cxnSp>
       <p:cxnSp>
         <p:nvCxnSpPr>
-          <p:cNvPr id="282" name="Straight Connector 281">
-            <a:extLst>
-              <a:ext uri="{FF2B5EF4-FFF2-40B4-BE49-F238E27FC236}">
-                <a16:creationId xmlns:a16="http://schemas.microsoft.com/office/drawing/2014/main" id="{09E4CFFA-F6E5-4781-8791-C673A19EFEFD}"/>
-              </a:ext>
-            </a:extLst>
-          </p:cNvPr>
-          <p:cNvCxnSpPr>
-            <a:cxnSpLocks/>
-          </p:cNvCxnSpPr>
-          <p:nvPr/>
-        </p:nvCxnSpPr>
-        <p:spPr>
-          <a:xfrm>
-            <a:off x="18400672" y="3102138"/>
-            <a:ext cx="495635" cy="0"/>
-          </a:xfrm>
-          <a:prstGeom prst="line">
-            <a:avLst/>
-          </a:prstGeom>
-          <a:ln w="57150">
-            <a:solidFill>
-              <a:schemeClr val="bg1"/>
-            </a:solidFill>
-          </a:ln>
-        </p:spPr>
-        <p:style>
-          <a:lnRef idx="1">
-            <a:schemeClr val="accent1"/>
-          </a:lnRef>
-          <a:fillRef idx="0">
-            <a:schemeClr val="accent1"/>
-          </a:fillRef>
-          <a:effectRef idx="0">
-            <a:schemeClr val="accent1"/>
-          </a:effectRef>
-          <a:fontRef idx="minor">
-            <a:schemeClr val="tx1"/>
-          </a:fontRef>
-        </p:style>
-      </p:cxnSp>
-      <p:cxnSp>
-        <p:nvCxnSpPr>
           <p:cNvPr id="283" name="Straight Connector 282">
             <a:extLst>
               <a:ext uri="{FF2B5EF4-FFF2-40B4-BE49-F238E27FC236}">
-                <a16:creationId xmlns:a16="http://schemas.microsoft.com/office/drawing/2014/main" id="{A9D876E7-BF19-443B-AD51-BC725F510D40}"/>
+                <a16:creationId xmlns:a16="http://schemas.microsoft.com/office/drawing/2014/main" xmlns="" id="{A9D876E7-BF19-443B-AD51-BC725F510D40}"/>
               </a:ext>
             </a:extLst>
           </p:cNvPr>
@@ -9274,7 +8917,7 @@
           <p:cNvPr id="284" name="Straight Connector 283">
             <a:extLst>
               <a:ext uri="{FF2B5EF4-FFF2-40B4-BE49-F238E27FC236}">
-                <a16:creationId xmlns:a16="http://schemas.microsoft.com/office/drawing/2014/main" id="{51CED738-74F3-4C90-B110-4F293F92F792}"/>
+                <a16:creationId xmlns:a16="http://schemas.microsoft.com/office/drawing/2014/main" xmlns="" id="{51CED738-74F3-4C90-B110-4F293F92F792}"/>
               </a:ext>
             </a:extLst>
           </p:cNvPr>
@@ -9317,7 +8960,7 @@
           <p:cNvPr id="285" name="Straight Connector 284">
             <a:extLst>
               <a:ext uri="{FF2B5EF4-FFF2-40B4-BE49-F238E27FC236}">
-                <a16:creationId xmlns:a16="http://schemas.microsoft.com/office/drawing/2014/main" id="{962B87F1-61CF-4D8C-BE5F-33BA0BCBF61A}"/>
+                <a16:creationId xmlns:a16="http://schemas.microsoft.com/office/drawing/2014/main" xmlns="" id="{962B87F1-61CF-4D8C-BE5F-33BA0BCBF61A}"/>
               </a:ext>
             </a:extLst>
           </p:cNvPr>
@@ -9360,7 +9003,7 @@
           <p:cNvPr id="286" name="Straight Connector 285">
             <a:extLst>
               <a:ext uri="{FF2B5EF4-FFF2-40B4-BE49-F238E27FC236}">
-                <a16:creationId xmlns:a16="http://schemas.microsoft.com/office/drawing/2014/main" id="{E7C4C0D2-08C9-4E61-969F-446E164503A1}"/>
+                <a16:creationId xmlns:a16="http://schemas.microsoft.com/office/drawing/2014/main" xmlns="" id="{E7C4C0D2-08C9-4E61-969F-446E164503A1}"/>
               </a:ext>
             </a:extLst>
           </p:cNvPr>
@@ -9398,55 +9041,12 @@
           </a:fontRef>
         </p:style>
       </p:cxnSp>
-      <p:cxnSp>
-        <p:nvCxnSpPr>
-          <p:cNvPr id="287" name="Straight Connector 286">
-            <a:extLst>
-              <a:ext uri="{FF2B5EF4-FFF2-40B4-BE49-F238E27FC236}">
-                <a16:creationId xmlns:a16="http://schemas.microsoft.com/office/drawing/2014/main" id="{A03D53F2-CA0A-4CB8-80DB-5E7F5E95B13C}"/>
-              </a:ext>
-            </a:extLst>
-          </p:cNvPr>
-          <p:cNvCxnSpPr>
-            <a:cxnSpLocks/>
-          </p:cNvCxnSpPr>
-          <p:nvPr/>
-        </p:nvCxnSpPr>
-        <p:spPr>
-          <a:xfrm>
-            <a:off x="18416438" y="2061615"/>
-            <a:ext cx="495635" cy="0"/>
-          </a:xfrm>
-          <a:prstGeom prst="line">
-            <a:avLst/>
-          </a:prstGeom>
-          <a:ln w="57150">
-            <a:solidFill>
-              <a:schemeClr val="bg1"/>
-            </a:solidFill>
-          </a:ln>
-        </p:spPr>
-        <p:style>
-          <a:lnRef idx="1">
-            <a:schemeClr val="accent1"/>
-          </a:lnRef>
-          <a:fillRef idx="0">
-            <a:schemeClr val="accent1"/>
-          </a:fillRef>
-          <a:effectRef idx="0">
-            <a:schemeClr val="accent1"/>
-          </a:effectRef>
-          <a:fontRef idx="minor">
-            <a:schemeClr val="tx1"/>
-          </a:fontRef>
-        </p:style>
-      </p:cxnSp>
       <p:pic>
         <p:nvPicPr>
           <p:cNvPr id="3" name="Picture 2">
             <a:extLst>
               <a:ext uri="{FF2B5EF4-FFF2-40B4-BE49-F238E27FC236}">
-                <a16:creationId xmlns:a16="http://schemas.microsoft.com/office/drawing/2014/main" id="{E721ED43-6261-4C69-82B3-D8E9441C5ED8}"/>
+                <a16:creationId xmlns:a16="http://schemas.microsoft.com/office/drawing/2014/main" xmlns="" id="{E721ED43-6261-4C69-82B3-D8E9441C5ED8}"/>
               </a:ext>
             </a:extLst>
           </p:cNvPr>
@@ -9456,10 +9056,10 @@
           <p:nvPr/>
         </p:nvPicPr>
         <p:blipFill>
-          <a:blip r:embed="rId17">
+          <a:blip r:embed="rId12" cstate="print">
             <a:extLst>
               <a:ext uri="{28A0092B-C50C-407E-A947-70E740481C1C}">
-                <a14:useLocalDpi xmlns:a14="http://schemas.microsoft.com/office/drawing/2010/main" val="0"/>
+                <a14:useLocalDpi xmlns:a14="http://schemas.microsoft.com/office/drawing/2010/main" xmlns="" val="0"/>
               </a:ext>
             </a:extLst>
           </a:blip>
@@ -9469,7 +9069,7 @@
         </p:blipFill>
         <p:spPr>
           <a:xfrm>
-            <a:off x="70979" y="3845945"/>
+            <a:off x="210679" y="3845945"/>
             <a:ext cx="1616137" cy="568173"/>
           </a:xfrm>
           <a:prstGeom prst="rect">
@@ -9482,7 +9082,7 @@
           <p:cNvPr id="1030" name="Picture 6" descr="Sunday Chuckle: A Call from “Visa Mastercard” | mikeladano.com">
             <a:extLst>
               <a:ext uri="{FF2B5EF4-FFF2-40B4-BE49-F238E27FC236}">
-                <a16:creationId xmlns:a16="http://schemas.microsoft.com/office/drawing/2014/main" id="{03ED2A8E-98DA-47A3-B3D4-8F040E6B0576}"/>
+                <a16:creationId xmlns:a16="http://schemas.microsoft.com/office/drawing/2014/main" xmlns="" id="{03ED2A8E-98DA-47A3-B3D4-8F040E6B0576}"/>
               </a:ext>
             </a:extLst>
           </p:cNvPr>
@@ -9492,10 +9092,10 @@
           <p:nvPr/>
         </p:nvPicPr>
         <p:blipFill>
-          <a:blip r:embed="rId18">
+          <a:blip r:embed="rId13" cstate="print">
             <a:extLst>
               <a:ext uri="{28A0092B-C50C-407E-A947-70E740481C1C}">
-                <a14:useLocalDpi xmlns:a14="http://schemas.microsoft.com/office/drawing/2010/main" val="0"/>
+                <a14:useLocalDpi xmlns:a14="http://schemas.microsoft.com/office/drawing/2010/main" xmlns="" val="0"/>
               </a:ext>
             </a:extLst>
           </a:blip>
@@ -9506,7 +9106,7 @@
         </p:blipFill>
         <p:spPr bwMode="auto">
           <a:xfrm>
-            <a:off x="922060" y="4792218"/>
+            <a:off x="693460" y="4779518"/>
             <a:ext cx="767435" cy="762821"/>
           </a:xfrm>
           <a:prstGeom prst="rect">
@@ -9515,7 +9115,7 @@
           <a:noFill/>
           <a:extLst>
             <a:ext uri="{909E8E84-426E-40DD-AFC4-6F175D3DCCD1}">
-              <a14:hiddenFill xmlns:a14="http://schemas.microsoft.com/office/drawing/2010/main">
+              <a14:hiddenFill xmlns:a14="http://schemas.microsoft.com/office/drawing/2010/main" xmlns="">
                 <a:solidFill>
                   <a:srgbClr val="FFFFFF"/>
                 </a:solidFill>
@@ -9529,7 +9129,7 @@
           <p:cNvPr id="24" name="Group 23">
             <a:extLst>
               <a:ext uri="{FF2B5EF4-FFF2-40B4-BE49-F238E27FC236}">
-                <a16:creationId xmlns:a16="http://schemas.microsoft.com/office/drawing/2014/main" id="{DA078F23-3C05-4A0E-B4F5-C8FA0E352540}"/>
+                <a16:creationId xmlns:a16="http://schemas.microsoft.com/office/drawing/2014/main" xmlns="" id="{DA078F23-3C05-4A0E-B4F5-C8FA0E352540}"/>
               </a:ext>
             </a:extLst>
           </p:cNvPr>
@@ -9538,7 +9138,7 @@
         </p:nvGrpSpPr>
         <p:grpSpPr>
           <a:xfrm>
-            <a:off x="878461" y="5667696"/>
+            <a:off x="675261" y="5667696"/>
             <a:ext cx="766144" cy="951662"/>
             <a:chOff x="878461" y="5667696"/>
             <a:chExt cx="766144" cy="951662"/>
@@ -9549,7 +9149,7 @@
             <p:cNvPr id="1034" name="Picture 10">
               <a:extLst>
                 <a:ext uri="{FF2B5EF4-FFF2-40B4-BE49-F238E27FC236}">
-                  <a16:creationId xmlns:a16="http://schemas.microsoft.com/office/drawing/2014/main" id="{D66CD56D-71C0-4F92-A0C9-CF2A6AA3AE38}"/>
+                  <a16:creationId xmlns:a16="http://schemas.microsoft.com/office/drawing/2014/main" xmlns="" id="{D66CD56D-71C0-4F92-A0C9-CF2A6AA3AE38}"/>
                 </a:ext>
               </a:extLst>
             </p:cNvPr>
@@ -9559,10 +9159,10 @@
             <p:nvPr/>
           </p:nvPicPr>
           <p:blipFill>
-            <a:blip r:embed="rId19">
+            <a:blip r:embed="rId14" cstate="print">
               <a:extLst>
                 <a:ext uri="{28A0092B-C50C-407E-A947-70E740481C1C}">
-                  <a14:useLocalDpi xmlns:a14="http://schemas.microsoft.com/office/drawing/2010/main" val="0"/>
+                  <a14:useLocalDpi xmlns:a14="http://schemas.microsoft.com/office/drawing/2010/main" xmlns="" val="0"/>
                 </a:ext>
               </a:extLst>
             </a:blip>
@@ -9582,7 +9182,7 @@
             <a:noFill/>
             <a:extLst>
               <a:ext uri="{909E8E84-426E-40DD-AFC4-6F175D3DCCD1}">
-                <a14:hiddenFill xmlns:a14="http://schemas.microsoft.com/office/drawing/2010/main">
+                <a14:hiddenFill xmlns:a14="http://schemas.microsoft.com/office/drawing/2010/main" xmlns="">
                   <a:solidFill>
                     <a:srgbClr val="FFFFFF"/>
                   </a:solidFill>
@@ -9596,7 +9196,7 @@
             <p:cNvPr id="5" name="TextBox 4">
               <a:extLst>
                 <a:ext uri="{FF2B5EF4-FFF2-40B4-BE49-F238E27FC236}">
-                  <a16:creationId xmlns:a16="http://schemas.microsoft.com/office/drawing/2014/main" id="{47626994-8911-44A6-9315-9C8E4711AEAC}"/>
+                  <a16:creationId xmlns:a16="http://schemas.microsoft.com/office/drawing/2014/main" xmlns="" id="{47626994-8911-44A6-9315-9C8E4711AEAC}"/>
                 </a:ext>
               </a:extLst>
             </p:cNvPr>
@@ -9640,7 +9240,7 @@
           <p:cNvPr id="194" name="Straight Connector 193">
             <a:extLst>
               <a:ext uri="{FF2B5EF4-FFF2-40B4-BE49-F238E27FC236}">
-                <a16:creationId xmlns:a16="http://schemas.microsoft.com/office/drawing/2014/main" id="{010E5174-A8FD-462C-B9E9-7F445B708FF9}"/>
+                <a16:creationId xmlns:a16="http://schemas.microsoft.com/office/drawing/2014/main" xmlns="" id="{010E5174-A8FD-462C-B9E9-7F445B708FF9}"/>
               </a:ext>
             </a:extLst>
           </p:cNvPr>
@@ -9651,8 +9251,8 @@
         </p:nvCxnSpPr>
         <p:spPr>
           <a:xfrm>
-            <a:off x="2024028" y="1603044"/>
-            <a:ext cx="37679" cy="5132619"/>
+            <a:off x="2032000" y="1663700"/>
+            <a:ext cx="29708" cy="5071963"/>
           </a:xfrm>
           <a:prstGeom prst="line">
             <a:avLst/>
@@ -9686,7 +9286,7 @@
           <p:cNvPr id="33" name="Group 32">
             <a:extLst>
               <a:ext uri="{FF2B5EF4-FFF2-40B4-BE49-F238E27FC236}">
-                <a16:creationId xmlns:a16="http://schemas.microsoft.com/office/drawing/2014/main" id="{77DE6C4C-3171-4DDA-96C7-F17188DAFA63}"/>
+                <a16:creationId xmlns:a16="http://schemas.microsoft.com/office/drawing/2014/main" xmlns="" id="{77DE6C4C-3171-4DDA-96C7-F17188DAFA63}"/>
               </a:ext>
             </a:extLst>
           </p:cNvPr>
@@ -9695,7 +9295,7 @@
         </p:nvGrpSpPr>
         <p:grpSpPr>
           <a:xfrm>
-            <a:off x="592626" y="2695837"/>
+            <a:off x="503726" y="2683137"/>
             <a:ext cx="1287532" cy="932433"/>
             <a:chOff x="592626" y="2695837"/>
             <a:chExt cx="1287532" cy="932433"/>
@@ -9706,7 +9306,7 @@
             <p:cNvPr id="1036" name="Picture 12">
               <a:extLst>
                 <a:ext uri="{FF2B5EF4-FFF2-40B4-BE49-F238E27FC236}">
-                  <a16:creationId xmlns:a16="http://schemas.microsoft.com/office/drawing/2014/main" id="{7A69D589-D87B-47BB-BDC8-7C6E86C568C7}"/>
+                  <a16:creationId xmlns:a16="http://schemas.microsoft.com/office/drawing/2014/main" xmlns="" id="{7A69D589-D87B-47BB-BDC8-7C6E86C568C7}"/>
                 </a:ext>
               </a:extLst>
             </p:cNvPr>
@@ -9716,10 +9316,10 @@
             <p:nvPr/>
           </p:nvPicPr>
           <p:blipFill>
-            <a:blip r:embed="rId20" cstate="email">
+            <a:blip r:embed="rId15" cstate="email">
               <a:extLst>
                 <a:ext uri="{28A0092B-C50C-407E-A947-70E740481C1C}">
-                  <a14:useLocalDpi xmlns:a14="http://schemas.microsoft.com/office/drawing/2010/main"/>
+                  <a14:useLocalDpi xmlns:a14="http://schemas.microsoft.com/office/drawing/2010/main" xmlns=""/>
                 </a:ext>
               </a:extLst>
             </a:blip>
@@ -9739,7 +9339,7 @@
             <a:noFill/>
             <a:extLst>
               <a:ext uri="{909E8E84-426E-40DD-AFC4-6F175D3DCCD1}">
-                <a14:hiddenFill xmlns:a14="http://schemas.microsoft.com/office/drawing/2010/main">
+                <a14:hiddenFill xmlns:a14="http://schemas.microsoft.com/office/drawing/2010/main" xmlns="">
                   <a:solidFill>
                     <a:srgbClr val="FFFFFF"/>
                   </a:solidFill>
@@ -9753,7 +9353,7 @@
             <p:cNvPr id="195" name="TextBox 194">
               <a:extLst>
                 <a:ext uri="{FF2B5EF4-FFF2-40B4-BE49-F238E27FC236}">
-                  <a16:creationId xmlns:a16="http://schemas.microsoft.com/office/drawing/2014/main" id="{F04EEBB7-EF4B-48B9-BD9F-D1C19AFF0C3F}"/>
+                  <a16:creationId xmlns:a16="http://schemas.microsoft.com/office/drawing/2014/main" xmlns="" id="{F04EEBB7-EF4B-48B9-BD9F-D1C19AFF0C3F}"/>
                 </a:ext>
               </a:extLst>
             </p:cNvPr>
@@ -9797,7 +9397,7 @@
           <p:cNvPr id="27" name="Group 26">
             <a:extLst>
               <a:ext uri="{FF2B5EF4-FFF2-40B4-BE49-F238E27FC236}">
-                <a16:creationId xmlns:a16="http://schemas.microsoft.com/office/drawing/2014/main" id="{0FD80BA6-FE4F-4A4A-838D-70F10CF06F47}"/>
+                <a16:creationId xmlns:a16="http://schemas.microsoft.com/office/drawing/2014/main" xmlns="" id="{0FD80BA6-FE4F-4A4A-838D-70F10CF06F47}"/>
               </a:ext>
             </a:extLst>
           </p:cNvPr>
@@ -9806,7 +9406,7 @@
         </p:nvGrpSpPr>
         <p:grpSpPr>
           <a:xfrm>
-            <a:off x="731809" y="1690628"/>
+            <a:off x="604809" y="1690628"/>
             <a:ext cx="943592" cy="921361"/>
             <a:chOff x="731809" y="1690628"/>
             <a:chExt cx="943592" cy="921361"/>
@@ -9817,7 +9417,7 @@
             <p:cNvPr id="196" name="Picture 12">
               <a:extLst>
                 <a:ext uri="{FF2B5EF4-FFF2-40B4-BE49-F238E27FC236}">
-                  <a16:creationId xmlns:a16="http://schemas.microsoft.com/office/drawing/2014/main" id="{E70E62E9-8FA5-4C6F-A173-B4230EE32B62}"/>
+                  <a16:creationId xmlns:a16="http://schemas.microsoft.com/office/drawing/2014/main" xmlns="" id="{E70E62E9-8FA5-4C6F-A173-B4230EE32B62}"/>
                 </a:ext>
               </a:extLst>
             </p:cNvPr>
@@ -9827,10 +9427,10 @@
             <p:nvPr/>
           </p:nvPicPr>
           <p:blipFill>
-            <a:blip r:embed="rId11">
+            <a:blip r:embed="rId16" cstate="print">
               <a:extLst>
                 <a:ext uri="{28A0092B-C50C-407E-A947-70E740481C1C}">
-                  <a14:useLocalDpi xmlns:a14="http://schemas.microsoft.com/office/drawing/2010/main" val="0"/>
+                  <a14:useLocalDpi xmlns:a14="http://schemas.microsoft.com/office/drawing/2010/main" xmlns="" val="0"/>
                 </a:ext>
               </a:extLst>
             </a:blip>
@@ -9850,7 +9450,7 @@
             <a:noFill/>
             <a:extLst>
               <a:ext uri="{909E8E84-426E-40DD-AFC4-6F175D3DCCD1}">
-                <a14:hiddenFill xmlns:a14="http://schemas.microsoft.com/office/drawing/2010/main">
+                <a14:hiddenFill xmlns:a14="http://schemas.microsoft.com/office/drawing/2010/main" xmlns="">
                   <a:solidFill>
                     <a:srgbClr val="FFFFFF"/>
                   </a:solidFill>
@@ -9864,7 +9464,7 @@
             <p:cNvPr id="197" name="TextBox 196">
               <a:extLst>
                 <a:ext uri="{FF2B5EF4-FFF2-40B4-BE49-F238E27FC236}">
-                  <a16:creationId xmlns:a16="http://schemas.microsoft.com/office/drawing/2014/main" id="{63AE2408-B9A6-4528-9C27-5857ACFA0691}"/>
+                  <a16:creationId xmlns:a16="http://schemas.microsoft.com/office/drawing/2014/main" xmlns="" id="{63AE2408-B9A6-4528-9C27-5857ACFA0691}"/>
                 </a:ext>
               </a:extLst>
             </p:cNvPr>
@@ -9903,22 +9503,223 @@
           </p:txBody>
         </p:sp>
       </p:grpSp>
+      <p:grpSp>
+        <p:nvGrpSpPr>
+          <p:cNvPr id="233" name="Group 232"/>
+          <p:cNvGrpSpPr/>
+          <p:nvPr/>
+        </p:nvGrpSpPr>
+        <p:grpSpPr>
+          <a:xfrm>
+            <a:off x="2418455" y="4430168"/>
+            <a:ext cx="1507594" cy="1409677"/>
+            <a:chOff x="2418455" y="4430168"/>
+            <a:chExt cx="1507594" cy="1409677"/>
+          </a:xfrm>
+        </p:grpSpPr>
+        <p:pic>
+          <p:nvPicPr>
+            <p:cNvPr id="221" name="Picture 220">
+              <a:extLst>
+                <a:ext uri="{FF2B5EF4-FFF2-40B4-BE49-F238E27FC236}">
+                  <a16:creationId xmlns:a16="http://schemas.microsoft.com/office/drawing/2014/main" xmlns="" id="{3607E0D5-37A3-4072-98B7-1B249E06736C}"/>
+                </a:ext>
+              </a:extLst>
+            </p:cNvPr>
+            <p:cNvPicPr>
+              <a:picLocks noChangeAspect="1"/>
+            </p:cNvPicPr>
+            <p:nvPr/>
+          </p:nvPicPr>
+          <p:blipFill>
+            <a:blip r:embed="rId4" cstate="print">
+              <a:duotone>
+                <a:prstClr val="black"/>
+                <a:srgbClr val="FF0000">
+                  <a:tint val="45000"/>
+                  <a:satMod val="400000"/>
+                </a:srgbClr>
+              </a:duotone>
+              <a:extLst>
+                <a:ext uri="{28A0092B-C50C-407E-A947-70E740481C1C}">
+                  <a14:useLocalDpi xmlns:a14="http://schemas.microsoft.com/office/drawing/2010/main" xmlns="" val="0"/>
+                </a:ext>
+                <a:ext uri="{837473B0-CC2E-450A-ABE3-18F120FF3D39}">
+                  <a1611:picAttrSrcUrl xmlns:a1611="http://schemas.microsoft.com/office/drawing/2016/11/main" xmlns="" r:id="rId5"/>
+                </a:ext>
+              </a:extLst>
+            </a:blip>
+            <a:stretch>
+              <a:fillRect/>
+            </a:stretch>
+          </p:blipFill>
+          <p:spPr>
+            <a:xfrm>
+              <a:off x="2418455" y="4430168"/>
+              <a:ext cx="1507594" cy="1409677"/>
+            </a:xfrm>
+            <a:prstGeom prst="rect">
+              <a:avLst/>
+            </a:prstGeom>
+          </p:spPr>
+        </p:pic>
+        <p:pic>
+          <p:nvPicPr>
+            <p:cNvPr id="222" name="Picture 221">
+              <a:extLst>
+                <a:ext uri="{FF2B5EF4-FFF2-40B4-BE49-F238E27FC236}">
+                  <a16:creationId xmlns:a16="http://schemas.microsoft.com/office/drawing/2014/main" xmlns="" id="{03A14022-682A-4D1B-B371-6E3F71C6F5DE}"/>
+                </a:ext>
+              </a:extLst>
+            </p:cNvPr>
+            <p:cNvPicPr>
+              <a:picLocks noChangeAspect="1"/>
+            </p:cNvPicPr>
+            <p:nvPr/>
+          </p:nvPicPr>
+          <p:blipFill>
+            <a:blip r:embed="rId17" cstate="print">
+              <a:extLst>
+                <a:ext uri="{28A0092B-C50C-407E-A947-70E740481C1C}">
+                  <a14:useLocalDpi xmlns:a14="http://schemas.microsoft.com/office/drawing/2010/main" xmlns="" val="0"/>
+                </a:ext>
+              </a:extLst>
+            </a:blip>
+            <a:stretch>
+              <a:fillRect/>
+            </a:stretch>
+          </p:blipFill>
+          <p:spPr>
+            <a:xfrm>
+              <a:off x="2632173" y="4829265"/>
+              <a:ext cx="771427" cy="428571"/>
+            </a:xfrm>
+            <a:prstGeom prst="rect">
+              <a:avLst/>
+            </a:prstGeom>
+          </p:spPr>
+        </p:pic>
+      </p:grpSp>
+      <p:grpSp>
+        <p:nvGrpSpPr>
+          <p:cNvPr id="231" name="Group 230"/>
+          <p:cNvGrpSpPr/>
+          <p:nvPr/>
+        </p:nvGrpSpPr>
+        <p:grpSpPr>
+          <a:xfrm>
+            <a:off x="2393055" y="3426868"/>
+            <a:ext cx="1507594" cy="1409677"/>
+            <a:chOff x="2393055" y="3426868"/>
+            <a:chExt cx="1507594" cy="1409677"/>
+          </a:xfrm>
+        </p:grpSpPr>
+        <p:pic>
+          <p:nvPicPr>
+            <p:cNvPr id="223" name="Picture 222">
+              <a:extLst>
+                <a:ext uri="{FF2B5EF4-FFF2-40B4-BE49-F238E27FC236}">
+                  <a16:creationId xmlns:a16="http://schemas.microsoft.com/office/drawing/2014/main" xmlns="" id="{3607E0D5-37A3-4072-98B7-1B249E06736C}"/>
+                </a:ext>
+              </a:extLst>
+            </p:cNvPr>
+            <p:cNvPicPr>
+              <a:picLocks noChangeAspect="1"/>
+            </p:cNvPicPr>
+            <p:nvPr/>
+          </p:nvPicPr>
+          <p:blipFill>
+            <a:blip r:embed="rId4" cstate="print">
+              <a:duotone>
+                <a:prstClr val="black"/>
+                <a:srgbClr val="00B0F0">
+                  <a:tint val="45000"/>
+                  <a:satMod val="400000"/>
+                </a:srgbClr>
+              </a:duotone>
+              <a:extLst>
+                <a:ext uri="{28A0092B-C50C-407E-A947-70E740481C1C}">
+                  <a14:useLocalDpi xmlns:a14="http://schemas.microsoft.com/office/drawing/2010/main" xmlns="" val="0"/>
+                </a:ext>
+                <a:ext uri="{837473B0-CC2E-450A-ABE3-18F120FF3D39}">
+                  <a1611:picAttrSrcUrl xmlns:a1611="http://schemas.microsoft.com/office/drawing/2016/11/main" xmlns="" r:id="rId5"/>
+                </a:ext>
+              </a:extLst>
+            </a:blip>
+            <a:stretch>
+              <a:fillRect/>
+            </a:stretch>
+          </p:blipFill>
+          <p:spPr>
+            <a:xfrm>
+              <a:off x="2393055" y="3426868"/>
+              <a:ext cx="1507594" cy="1409677"/>
+            </a:xfrm>
+            <a:prstGeom prst="rect">
+              <a:avLst/>
+            </a:prstGeom>
+          </p:spPr>
+        </p:pic>
+        <p:pic>
+          <p:nvPicPr>
+            <p:cNvPr id="224" name="Picture 14" descr="Download Paypal Logo Transparent Png HQ PNG Image | FreePNGImg">
+              <a:extLst>
+                <a:ext uri="{FF2B5EF4-FFF2-40B4-BE49-F238E27FC236}">
+                  <a16:creationId xmlns:a16="http://schemas.microsoft.com/office/drawing/2014/main" xmlns="" id="{858294D3-7705-4A54-A840-D955FF644CA2}"/>
+                </a:ext>
+              </a:extLst>
+            </p:cNvPr>
+            <p:cNvPicPr>
+              <a:picLocks noChangeAspect="1" noChangeArrowheads="1"/>
+            </p:cNvPicPr>
+            <p:nvPr/>
+          </p:nvPicPr>
+          <p:blipFill>
+            <a:blip r:embed="rId18" cstate="email">
+              <a:extLst>
+                <a:ext uri="{28A0092B-C50C-407E-A947-70E740481C1C}">
+                  <a14:useLocalDpi xmlns:a14="http://schemas.microsoft.com/office/drawing/2010/main" xmlns=""/>
+                </a:ext>
+              </a:extLst>
+            </a:blip>
+            <a:srcRect/>
+            <a:stretch>
+              <a:fillRect/>
+            </a:stretch>
+          </p:blipFill>
+          <p:spPr bwMode="auto">
+            <a:xfrm>
+              <a:off x="2732311" y="3918933"/>
+              <a:ext cx="561332" cy="391122"/>
+            </a:xfrm>
+            <a:prstGeom prst="rect">
+              <a:avLst/>
+            </a:prstGeom>
+            <a:noFill/>
+            <a:extLst>
+              <a:ext uri="{909E8E84-426E-40DD-AFC4-6F175D3DCCD1}">
+                <a14:hiddenFill xmlns:a14="http://schemas.microsoft.com/office/drawing/2010/main" xmlns="">
+                  <a:solidFill>
+                    <a:srgbClr val="FFFFFF"/>
+                  </a:solidFill>
+                </a14:hiddenFill>
+              </a:ext>
+            </a:extLst>
+          </p:spPr>
+        </p:pic>
+      </p:grpSp>
       <p:sp>
         <p:nvSpPr>
-          <p:cNvPr id="41" name="TextBox 40">
-            <a:extLst>
-              <a:ext uri="{FF2B5EF4-FFF2-40B4-BE49-F238E27FC236}">
-                <a16:creationId xmlns:a16="http://schemas.microsoft.com/office/drawing/2014/main" id="{979AA1F2-44D9-4F8A-A3AC-A526A19C8063}"/>
-              </a:ext>
-            </a:extLst>
-          </p:cNvPr>
-          <p:cNvSpPr txBox="1"/>
+          <p:cNvPr id="2050" name="AutoShape 2" descr="data:image/jpeg;base64,/9j/4AAQSkZJRgABAQAAAQABAAD/2wCEAAoHCBYWFRgWFhUZGBgaGhgdHBocGh0eHR4fHx8aHh4cHB4cIS4lHCEsHx0eJjgmKy8xNTU1HCQ7QDszPy40NTEBDAwMEA8QHhISHjQrISs0NDQ0NDQ0NDQ0NDQ0NDQ0NDQ0NDQ0NDQ0NDQ0NDQ0NDQ0NDQ0NDQ0NDQ0NDQ0NDQ0NP/AABEIALcBEwMBIgACEQEDEQH/xAAZAAADAQEBAAAAAAAAAAAAAAABAgMEAAX/xAA2EAACAQMCBAQEBgICAgMAAAABESEAAjFBUQMSYXEigZGhMrHB8AQTQtHh8VJicoKSwhSisv/EABkBAQEBAQEBAAAAAAAAAAAAAAABAgMFBP/EABwRAQEBAQEAAwEAAAAAAAAAAAABESExAkFxYf/aAAwDAQACEQMRAD8A8IcQZFohSwsdSS+gOtWHBF0pFknoZmEC1rqnvWccokoERzfutO4NWsgC20g3FqfDdGPhCjR15NfEQ8TxG4EIMFRtCI7JKkt4jjmLRAhYaae6xrTcSy64ggYwRPrD86jw+fAecFsQ9mJI8tqsnBTk0AvP6cic76JTXWcSRaBO0FkL0Lc/7AUOINDaQEB3LP8Alg9/7hzjwgwniNFJMAzlkxVk0X4Z5k0OblEZDwCtGfvVOPYFnQM6DSDqX9KILBI5hcSmQETuAvCdKN5cbBfD4ekJQST2HSqDw7wQbiB26sIR5KNO6azhjm5bdhhAL4TcXh+ZxFDgQSWEcyIAEvtj7KpZJbJCHMhMS+3yrNGW8AmAEIET59t9cUltpwrgTKR0ROMQa1X3C5kgidI8kRsCIqHDstDm42tRkkxjzb61qeNDaIBywGAesFLxH9xV7r9B4SQdIBShf8s9HSWXZ8TZ6NgH559aTh26hkuegQ1ff7FSpWtO25kgjQ41RYglHpWZ3G4lAhnKECIWr/ul4twCRhkyjkd9V7A1M3GIeEZAOkw11pIjYYC1kIG6DAZK/wAda7i+EtAkbEqMrbT1qXDtJbULXYFyO2K4gNGAFDwhG32aJT/iLRcVk6wunp+9NwQXbcJU/wDjDQ6arBqRvNxPhJ5gYRwJZMg/eTQt4xJgyQHjOMjSUqYye64IC0gAMLQl+uFGZFRF5JIZbcEsDmJz1jan4mxFoUlsjOJmdqyW8MvmF2SWoAysxkAVqRVDakXB6LD07KuuuNsAfERPlHpNWvs5bSCWYVxR8yNCO2QKFhHLg9hdMb/PuqapBceUq2C3Hsus+tddZaQQRd5Eaobb/XrT8O8cotCA0xh6nG3qambiQCRDuIxIxppg70IBlkYnl65QI0kGP2pBeV+qMAvDB8xVrLtU2NeqBbKEF13EuSZZRBQ0BSQ6FZ2oJWgkZzqdTldDj1NOLOgBzv8Ackj0prAGDc7QB4UQkGGXkwNRvRsuQIAIdsvZtM4P0dUX4PFt5R4sMAFEIRj9pocciEEoRWSZIuUmBC1HlC296M7tD9RfXTNUsBMgaEg4JKO4389VWcTDCwBotixd5gjb5IeWa4Bg8toMFkBpBsDrOdaqOMQHcAeW7wob4BjDAjoajykRbGDyany7bVZGh/K6gdrf3FdVLAABIED9I+ldToZwBcD/AMMdu1aOBY2ebdC7IGYEA+W/asyIBPNbsPCQPLmCdWtsJ1aTIEHUQiIGaxQeNeQSQAEB5icuCfnXcPiubSyTIZMLA5jSfieYH9JCBgIEFT/XShbxCCmo2LloE7ZmkgnfZcbpI82kcb9lS3cM3Jk9cSo+UCr3q44At1iTkSRqzqB3GiXcJthhkJg/XQz5mtSjrAI6lEg3B4mBt0061pN5tTth3AS0Czrnv1rJZwZBJItABUdSHp5VbjcckSGcAhXBeIx97bCpWi3eLwhMvA32Pr60L7F4gkbTMdcLzknd4jPdxPErkEsaJvRFAjLrT+G4l1pcnlMXIlgjfWSKuYJC1ETzaQQl3PffeqWWCCiFBeSlhN66in49gbCfigA9SSBsT88jSXLuQOYgx5shA6bfvU3QAeWSWJJcBkBP7z51SwwUYTZckYCOzHrpr3DtkJQjIITAbQb7dqPEs5EBywT1JHRZz9zSgcS1Wm664LNtqyACD1ycdPWN/AFtoAuNwkxqX30WBtVzxCGJIhcwRCwgDqN6Ql7YiO8ev0qxl3NBAIStkYPT+I96W21GAGpmIV0nYz2pCfCQWzOUHpnQOqfk/wCQJBKM4L2Gf4FEpLrVrcWrYRyluJS/auttYOpCzGrg+dUu8UvWIAS7ffvS8G9NpSFL6EjD+KOlVDGzmkFqCiku7yKAstecrOAgCSsSZpgAYyMo9YXeJ/5daDBNxCZ2UASvFMJVBHiXrUESP9tGYxNT5iwkToRsgO+WS1T8RknOSQhp37muFrtPnEAz2M960o3XO3WDIByHkFznqvOuNw+I29tuhWs69accKGLiAFqJz28P1IzRttAIJd3hRIINsCOwWCv1VFT4Rl82qfdyd8ULiBpjUzk3BwtjT3EDGAyWtWUhK++tcLSHnqJeyQ0CfnvVMR4PDLOkzojKK6EqP6rdYOVTzIXNpyi8MiD9NpWXYgexxmBJz8qa287wgXiNbWf20pQb7CDaUEBqDytS+wz386paxJ5QUFME5cQIIz7U35oJ1EAa4JBJAfTHnSciADJJckbgwUxBqBrrkdbiCgTLCxcs2mR3qVly0YJJNpLUvuQh86F5QASILBIEDIgl4j1xqxJllEiECCzrLj7VUNdnFvvXULeJdbHMI6/zXUGqzgk3a3GdjPkC/rR4XCJZ8RNogLltYK1CM7U/5drZBJUNf+sn7zW7iW8wRuZSZROsElnCGB2rlaPNNgk3O3qyEfT6mk41qJRA1ZAjYT0Felxho7UoHOSR3en74rFxrCYRZFqCDU+EqFt3pKI2cQi4lIqAf2Y7ouq8MDJvYQI8OdSiUnjAS1rGTBegaJ6xguGtM+VaeDJOxDk5xHk9JYrdjRr7MBIC1wiC2WhMjpqetAWC4czjngT4WZzovvWq3HJRY3EAEdfmRBrHZ4icPyAZxgYawz3qQdfbdBOy3LDbJOPm6pZes3BRgYa0tMbbeF1G63DYJR7QWtYQZ6jeiQj/AIwm9obM9Wq0L8TjXFu53QTcpI3AMn1KocPgtQnGJ3cYH7d6z3ABkFvVfLymrcHiWsFh4LuIJDjTUn+amZOCtllrY/1yywIQUZXrUrhoyAmAfYlbxs1itFtjtTJJiFotfXXSo2F35LtcmSghvlw3kGoEuceIkmdkMCNdTNAEIlJGAZJlmQdN8TVPxN55szDyQAjotBXcIC3ARJHv5RtP7OpXflG02pkgYhD4dRDcR1qV1pDEglA4MdtYRdWu4qtFpLDUfqAwtEiI6TUgXh+Lu31A3J9qTWUzbIPNcAiIOJ18o8nXcMzzeLIBWqxpoBjrtR/L1PTIU6ySflSi0jmCWp6ZBW3ntWhTicbKXzXYVM8QkF5LzpmUXiPWnusCQx/sUYcIf9fWk4lmRHcof5ep9dakwdw7pI1XbaTPX3ql3BAFpJL8J1QShYiM7moi42kyZzgMYaZeP6gVeziXJcvUyF0PucnU0qoEkQArddQBoQzv9xVCCAsMpYBblkTLNW4nCBBFokC0QQkBDBEKV2VKeGYm45cTMEzGvemhDaXqgn30BT1C86F9huLIIySCGpAgaNGN3R4rtuFsWnGOVFagdY+zXWhRqnyl/wDkNFrQCYJUFSFgvVZB1yFUrZC5ZJOmCSHau41/yFV8ItARBDcMEAgheumx7kX8ZhG4kBEwUckr5eQqjNbJCUYSnsu/2qpZe7huiJA66+3pT22IvmLlSEe3X9qnbcigIwdkDmMxHlT0C2/mTUEQCyOpHX6VouM+U4e/Y513oXcS0eEjmIuiSYIgQZRDEDB6LrAQeZgjBM6grZTD/elFrfwnF0LHmPlXVL860b0azlG5kHm5QBph+mnaktvMu3KShE7ZRzWjj2Bk83MUArQBaN0bYevyrNb+GUgCGJYLcCNfnvWJgo7THNc2+VkEkCSYlxvUyDxDoSyckeYRktepqVxIBgu6EAWti0p2ftRsvC5eTxAPmPsFAPtr2q4KHh3RzhzOJ/5abFrWhbaiA+kTBbldO9Rv4gtKmdObRmRrbrjfd1zQ+IyS2Qz6BHT0q40pxb/CSWD8sjJnPyqBYLF3RnRAqFvtTfmO5gZwDhbE4FTv5hJ5WGZI6ZDWnt1jUgubk2f8f+sEGSjJR1gVDwkuEJLEoY819aHD490DvIkrCJO2afgXIoP4ugYIyk8adaZgJ4YuZykiAg5foUPmK6ziBoyyZ0cNaGZXWiLkHA5sMAltFoJERHvogBt8QwSUG+kHFxkUFbScLWTj/kJL1a7mmsL5gH8MgsEvv6wSo70buLaFJzcNpJJBJc53iQ6laOV80T1WPTBcaGoAyUSAMBlGS/T+DvRtBZ0JI8wi4H0oXgAwBoW9YDKz5ZrjbzeEDK7+mkEYolDkJEXBGB7EgM96a+1LwtqS5OgA+586rbYCrSiQxcJiN3GOu+9PaLSiSZaiSiRJcRNNRM2sMmS3BYYMdZpb58V3YAsBuYuu0z5019hbEO4aNno4T8pqd4doBZKDEHGMdjn5ZISwaAA7ABxIY9xNObSUMIFGCStcRFU4YJEDwme7D85+vWjfw8jlLWFdicaE+vtTRguB5ijtaG+snbaflVfw4uwJSWoE6bYMU97aN3hgdWe2uPsmm4BQQYRhyBv7kTp0q2qF95/yewAhHXZ40yO1WvvPKEGyyMLp11qdwYFyxhfP/bZdtKWyFLfbQ52mT51PQ35bKRJFw18tCtAfKpcTSD4eZkySCT66YFWsvXZbwO3ckY26VPjcMQASSgD6vvIH2asA4VoLAyGSSYJAPh0Oto+uKW2QO6kD+Eh1ocC8coMMYW7Uefzqt15F3MLujuIdvK0CNe3WqEsXwsiTyl9cT5SazN6STqPKI8vOtt97JDJv+IcwUQTLMaSBn0x32mSQAril6ortpSC4ETDEch8WUyNdPXyo8S4BSWDhldUO+kULb7TBImRlMhBQ9DoTnpQ4XFv5ebl5g/EVgpODEzvFFxq4fDtIDA/+v/sX611Z+cH9B8yaFTDHo2X2kokL/IkBdun2q0cgIYkvS4W5j/sdcCsnE/EAW6a6JDsgPfpULrnIChtexJInNc8Vf8TxLibgTC/SIIGLmcH96h+XcDytESIPt5da0nmMCBrNx2l/CD0rPxCAXaSXlcq1W3U/vWoK8C1vOZGkMokpE9N6yXlQDD5pQgTjSK0WX4MxrCG5DP3mlvtLcLELGYA0+bVWBLLgSweVsIL2lil4tpyQ5j4dXuchab1FiQEd0+g0hd46Ve+yHcCyIMJl7d3NXBG6ww2tkg/MRpVuGESwIgYJGW86E0ltsSgNNugPrB+wbuECPCX4nLxLeBnUZY8qphbJAIIL1KIye0/Wh+WwEWQfLoUC1KwdameEASiQWGS0iCgP6l01/HZ+IZJAgAytJPUAxFPwNau5EqViU9h0UVQWFhYO5KnEAwejpbbZZtQ3xrbhTP1qvKOU81s3IRABySz00ET3rNqIXgnO84JjQyB7k1U8Ikp2mQiwXhqWdIG3rMW6sokCOwHtEVay4Bgsaa/Ud516GKWiXIYDR8U4DIEnau/MiATzEwPvrg9KJkxAUHW3If2PlTAF3EhlkHqUTlZVGa6+3wCHKDgnXII3M770eQFoEoSfuRrlY6Cmv4vwkC5EgknzwwNgY3NTut5iEgHbEnuishURJE+Ho7dRog9O+qrruYnqU/DPmc6DWtH4kgloXC0xCGq3JlD7nKbNOYSeo+qIXXerFNfcB2AuQWVpGB+1UtWcuGZW7zHMozU/y+UlwAT7EZf3HSq8LAF4NoV0A5eXkEMZ6OlCcS/ltkM63LqoT+yd4pfKuB0BDkqRgZR2/euvIuDBlbEnWAdRo/eo8O+E9DJKCIHVnZfyw4q0sBaokonUae9Bm5TGgJw8AjNdcOZkWzqsHJc47PWktt2GEAJ3zspVULwhkoshHaG8xsH0rRxrgwcf6xIB1RjQt61lu2BwAC2C9u2I61bh2HHhBhjSQZ9jqMUo4TBEyUxprcvv5UbLdFzC57BeH/bV6ZK2riS/hDHWCIxzRAD9amOJbcuZnGuEdFoVk70Gjh2gXjmHNsXA6lkBuXVOIArRa0PFKPIcuMgC0BHpms9nELaNsOTjSA5P1ql/H5hI0WPCADbMIOOzNSyhI1vuesXD611ZuJwriTFxnf8AmhVz+tPSutPKfhXT5omfUVDhcJTePDvcV9DXqWcnKIMiQEQ+iP8ANQ4lotudotHW4IHuF7a1znyEzsSLoUF/MqP2qPH4RFokkuQDp7oY21rVY56sm4SF0Cx50vFBatCSZAZka6752pKIWx8XNIwACFhcpM70gyRKRQ5THQCBPlVeKQmR4tIJEQTPX3qF1x1FzUeKemGzP3itwD8u4xocwNSXIycuNKKHLF0IoknJiOnXHypbAmBcunmB9cGr8UcgHcGFy4CjCkGqqAIMME5B1jAT7GqHiBELxDc4nTq/KanBY5l3/slv6dq4ApIEt8pLOdGZQoOvsewLScYAMCLiin3oWkC4m46hIwNx6R5U1wBtZcMEgRP+Py0riCRnBt0EARD+IxAn95orwOIgd+/xAElT0nyq5KA0hG7lPTV7KVqKxW4BZ3AOhEoIry+y1tzMxhi2AQBD5ftUsFPzSUFM4Tn9R/r1rr+YuAQTEF6ksPQfc0LLoAacyGwTLXnHydVtvaBAGQ/IYMdezqIy32GLUZBGUD9nTSr2O23AI7Q1vsvlTcSzdbjsOuvt3mpcvMQmhgAzoU8hEry7U3WT3cULlRCI6paL9LROBio2kAlQADpqEuYoaHTY13PaGEdJJnqGZ1rrgQsgZJWs+aROuQc5Fwa7b55RMjTDRuzuH9zVjZIwDPwvG5O06aelQ4V/hP8AkyInoTjyzT3oNJwkJ3eVrmMisfZiN9pZ8RSLAP7Yj61E2ETdrjM9+kMVewkhqWdevUaMY60nJKcg40GozBysCtaFuuBD8RvBIQHhADgddMULg1DHK0u3zLjp6KRpaAjroo+Rjz9XsMTBGEQAwj8ifMKarRLbBDEBak6hB94R2NNwrWRjqo2DZBMLrSm077tPQ25c/wB1cXhPXw4koOAiP1AaailGbi2K46qGYCcPJzocUeBcCCwSnHN5uf5xVrgbrlaBdMElakodEo7HQUxZAKTEZEnUkBHJCim8ZQ5ySwNgksAEy5P71K7ghm74jBuGkkeJb7kHzqoEAXAsMC1mBOQNxXMG74QLQl49sFanodN6suNM1zQfMS3JkrU93gf4nrWo2EnlXiwuoGc5KET3oW2SYuMYQAOEQQQvXTtR4Uo8+CDDzzKAzjQ9KWix4Vx+x9K6uuvJkcpCGDdoEfeurOsvT4l5tXwgAYJAH/bmMaxUr7x+kC8iQSIHoJ9ayXXkZIQxlPzwT9itPB4jtBfckadf8vlWMaLcbxNxIEnl/n6VO+0oZDlBkI6+Hs4jFU45Rh6Ihh51JIPltUzeSAoDQhjc4yY9hVgW/g4FtpJ0c5nOp7LSpmwXa2yTJjH+x6U/DVpIlDRSjt2kn5VYXsAWkcxASA12IhxhebqrEOHwLRJBOSkPJMiOuO9Z+Pc2EU0AR1QP9f1Y327styIJ3nH8edR4kADmwwMgAIaHTPoa1BIcPUFyIA3IT0fQfWtHIRadmgdw5HR7RpUOJeDjlJRCZBkZI/daKr8PiK2AxMkkvSN4K6edKpb9zBwQdxnWEAvKlFpMSIzqQ/1RkrG1D8x3QADBA0w5D2X9qrcW1EPCnG5cqLknvG1URBJI5dHCegMAL64rrXowOowyipal0OS0GZSEie5OHr5U3DybzkOEp3Y7D0oi3PytMlFDrJHN169BT8K9WvlP6geUEkPbadqleEAxJwgCVqCR9xvVDZbi0Cc3FECAIe2/TSsoAIDQKwWc7Yjvj2prOAgQ2HAR5cHcsy/apjiAiSSzBJUJ9dtOlXtvAiM9MRG8ZnepRku4cTBBIILZWGQhbojQtsKBeuOuqmRPt6aOJwlKyAQBDCRSBH3msvLJyXL7tp+YitSstv4a4gwJ0OJGMdS5yqceIF22JrlYB7LU/elS4KsIDT5v0qdAcOFWqwsaf8SBA1mFG3SsUYuKSLS+7bCQYwgM/eIN3ZAQKP0jXGOlVuuLMJTBIj/IEDKPn61K9C4lxo5+v2ulbjTrrXA8yz5qcU1gu5fiwennpPn0qloPhawP0hwNSBpnJH1W8lZDENNw0xBP70CWMAtAKQ0Wdy+4VOCgZjQwkSAhDVqJOtHhjOrEyAjMs4ke1VFiAYCLQenTO/UTTRk4oRP1Plr61o4PFJIwYEYLGjURGqFZ7wjJO5H3rpjaqcL8QmCkXlH0kMrqqUR59eYyRgDGcfqWnlT2QWOYA9FJOm8/KrC7xSFOAyciMoQD571C/h3KQNSxkp5BgBiI3qiloFxud0hcpu36iRtUDddcT4tHMBIN+enVKnsA/TLIKjQR7KkN5fiC10IBEychNemVQN+bb/kT2geXgrqXmP8AnaOhFtCmDeB4mUENSPYZdX/Dg3ZllQn5y6mOJ4irWTjHWXFXsvtL5iLVomD6QfQ+Vc6AeEbW9UFzB+f9VmvuJ1QeJ7AAIrzrQLefJuInwicOUo9vKkusSRBBEDlxp+oT769aQZw7iBJ1RUZgbH0rgE2UtgNOpmXiqGwKdCVKCiAldMRGazW3AEIoxjzWYHvWorZbbjmuUYIZMkDA27Y61lv4ZUg437jU9Ca02X3C3mINtoORy/FODyyeg0zXXE3Aq7mKJA2G2xhkwPi6VNwYuYCSJUgCAouAy/Wk4lptD5noOg2QPz27Vo/EcDlIfihQJeUwwT99Kyi3eAsH70J3rcD8IAwSiDhgJstXTmZGHtWo8MM8ymSSYjE7M4zBGaj+HOpY1BzdjQHE6unuveSG3g4LUarNS+qn+IIZtjOizusbeW1cBIKxE7w24f8ANG23mSTUsfqCh+kmqXcJXHXJGzSUw38qqJcK07aw9UsLuRT3nRqPUo5UD+qowASIVoN3h3BQAE+bNNeWDhlFAODp2rNqJXb6GBGi06vajfdKcatMIliWUCtdaQ3PSJO2NY2AHTOs1RQcCPinPucBfSKDruI4IkE4gatAfDmSPaKjZwmYtPmQ2gMnr8+1arvEyz6ScaqE9mVTCwi265IFW3YMmI9+tTcZTutuJ8VnKJgkjqEe1WsA5kSBK9mCSDMw37UlvFEFAi3EwU+7J9qSzizOAGtNi8alf3S7Q3F4Z7onNwaj/LC3rPcTaASS2cATnUfMda0cEySFqX3OvTPdUbyHFuG8gSlqYz+9I0y89sF564OHrkFTVRe5UA6o4eQCIA//ADS3weYDIAI3YzrjbrU5ZIbGQSiY1RljRVrBa20LJ8W5l6OcrbftUzxTaACzaDadAkSsNfXFXFzUlycEou1L1zUOJhnleDgbTGrjzpBAlHDd3QEkrfAoCxS3nM5A8ROmXFUQEvcBrraer++tLb8Q8UIZDemvl0qg2MWwSZPUdMd2ztWlmCGCCzIDxAlhL3qZ4ZutgfCWydNQDCGPM0LwFOHyzkcuS9v3qXoN9nKCUF9bnJ8gl3qN3jHLjIRJIyCSNhkebrQLSA0UtQwc8wcc2sx8lnF9oGjcWswTl9IHakFbmf0+i/eurKxMqTqN+9dV0er/APHIIIRnMealU95B0IclET5HPsK0cS8KCZxKZ/1QgdayhNvmPd9yf5PlXKA8C4EkGSdNO7DXsO9PbyhyTEg3Q9gSQD3z0rPfxFDAtP8Ax+eg6iqCwAYAWegWAcGdquKn+IuCYgaRoP8AFN65rNfxbZMYUyRCzIJ6aVe8DfmchAaeTBis14Kklv8Ax+pVbgtZ+IJPKGpACj+T6aULOPcM2g4LgOcQMZyDp5UtuYkDTTtmJT+8VAQ+ZlwgUB99N6Ctt/MCrQiE5JUmLRELSp8WzIAEl/7P91Q4ZINwOnh1hY1kTTcO1kyxtaWuoqqmLmxjvkYCIET3/VTWEmeWcPF10ft9KF1oAJ85wZ3cr1jFOh4mgtzEd5/ipQp4jYMap6dOsDOKP5bCyEY8ozD0H2Ka8oAAnKOYxvrst9KThkEFmZM568uhn50Rp/CcXQkWlkT/ALHoNnp60t9m5RIGUMyPYVOy1s8wEGFBPpDZmm4fEMPu8kzp0/mohuTXQAe4mD0D796PGtBtgBghz+np089KeywDLaCZDb+mOtLZfYHyOCfCjGNgPV6VApYFw5J0LSxBBzp5+tHh/iAjYdWCmCbQOhWZnXGKHGvtJkQXhW4OZ1WnTSs/HuAW5RUrfsTNWTRd80wdN9iUFiWu9LbZKaJW2qfX+6WywASN7SZRJSxg9e21U4RBHwsGLTOF9h4oCAbVdgMb6/37mpW3kCQ1ELG59x5erXXo+IEHEYMZkR6UvOCEvNiJBxj4aQOR4WQ0mCu7xH89aU6q1xLJ0T7mCB/NJxLykTsvaJ7jzp7S93Oq1IcLXJO9UPwvCGinBweiidPsVmB7eY2x7D3rVxLEBroGjAe3+oHrqqjZbIADZgAPcNhvWkE77UgsY064xuPQVG2JWwBOZgD0etbOYcpSZJ+SAjTM9Ky2SQgpJx/9en8+llFwCmC3CnoSY+JA5xV7DrMZdsElwTvAgarpWK/iXA5J3MbB5xNareLcAcESMgknZaCfYb0sEeJxDaOW0wyRlrE/KPWgLQdJI2j5+cjU9GTxOYFjQdjDuBXU3GNqnbpbawAQttz20Q60FPywf1Wj7/5V1L/8kHUjpyv/ANa6nR6trT0IwSfWJPmKzX3+Is+mT3cjyrZwCnnl7HzjBNT/ACrWRl6EvyAhVylVDgzda/h3Iw+4oXXE3nBSLIEaa/JKr32Rat1IAPlr51Pj2kPQaALyhT3zWog8bhxI22II9IPZPYVj/EXCCioiBLOgg49xVuHf16FT56Mvc60vFuNwBNw5g2R9VD/jpVip2Eo6TlxpMiP5pboOicROiwvrkGmHFtEIdTr0nXMfzQ4dwgeEkayyHh/TrWgbrt8bECGI1VLwUkNHPmiSRllR1zirEXSEeV9lva/1dqz3QBBEkFg5Ze/rUiqcmAM99dT6ftRtJIgJgbkwScARgawqFgJkuCSkZDJMW5KiutuNxCubTWwACWCDE9IxVQL7jhPmwdJW8aLvRRYjMkDXEHoV/Ndfw5OcakkZBkbQn32oWQuhDC+LfmZYtfz0oNPESBuut3zJ1ZQIAGPOs/CvDG2xlIaF75pzxLihajIUEkJBe0DahaSyDaAGmTczvIi0GBpURfiXsNQLi7UXOwkQOm0113NywOYMl4SUTrXWI/8AYCZ6yEn3z4jRXKBBTMSjgfN59N8gX3A6KAUVlZUT6ZqJ4eC2SDg6ad1r/NarLGSBo0R0cEED7AqV3CAf6okKdQXBWFP1FJQ3LDAXKkSeuvWPltS8bIBSx00+f17Va3hgYvDUeFhhoCPD5jWo8ay3mtwpk5HZDT5CpAEACSFc5jIhQfT5bVG+MjDyZOYaGH/VahwyOaUDb0IAg9XtWfi2lp5LnEBn+e9agF9yDPMEEJKGcb5x1p+GAGSHGxWhPt8zUbzgNoznWPpTc2YIlpmNwh5VRa5BhCJ2YwEhufkKm1EZRt32RXlR5gbjDJDAPRhevyHcLZYkpAbDRJOGNtxoqgTi3EWgJGObOphnoiqNnEtABWpRPnifXvVLeGS3cNDMzqY1SPeocQoheJEP4QdsCA8KY71YBySCnGpI1ICDEsmP7rRYGwMAktsrX1Xt1qFt8lBlBrRaSOpHp1om+ATOhWXMhBEqlAunmGUDnMnJb1GPOlstBQJ38gTMYBTPlvQvshMc2BD74c5qg4YBM7kMMzEpnJ2TqiV9gBMj/wAv4rq2ixRyGI0OIrqbB6oVwHiJGi6DrWG+83B+KCZy9ko9q1PlDBQw0fdie1YeLcQVPkV3TRH3NcvjA8Pd6vXXE0v4lZJfefNfprrbHdpI+2RTX/hxaUww2Dlxg461oQHChQYbGg3nzql1nLq2QwN9Dv3fXpXfmjXUSZ99sZoEXNC2NAgV/wBRBqqlbYA8SRDMZAMSNIO9L+SV8JTDRLIBedNvKtFsaGNAMh769+ro8bi23NIEEw7bmIQcdvuW0JZZywhLJM409H5NVH8S4tghRCgpArv/AFT/AIe0sXAsT3egD1WoeaS9JDXyZWFqU/Sr9qkFlgDv3HTscxT8Hh+JjmGpMoS46R2ihYOWBozomu+exrRw7BHN4iTICagbBeEmDiKVE+YlKFg6kz1w32iluDggnTYNP1g1RZWGQMo6/P6V19pHLJHR+KAE3mPTrQPw7AwBLAkE6hyJaB03p+Pbg4ZLSDkE5H35im4YFruLa1MlJ25mQhOnWheyCMdbSDEnKgt61neoWwgI22xIIkwwyB2/ferXSyFJD8SjVD9WnbNZ+HfhXFgR3gPuZ9BWnB97oYuGfVI6HWpQtnC8JkEkvOjYjTCJ9OtOe6bhkCEGSCiunQzNSvtWbiNVJUhEenz3dJbYMYJbC9wN8a6edBxsaWNInU4t1o8S4FktN43I9fPcUeJaLinp+5B2GBigZg9u3n94okJeiYwSQBv9pr7LX8M6LLWqSZB7fKms4YWyWuzLfUNjoanxuhliJDiQtv461VRvA5uhKB6t56zScPhgsbjXEH229K033W3WkCY1Qc2xOCF7a1PhrmOAGZIYYeQ53S0rW8ClgECCyQgDoIg4Y0rrLhhPp3Gmq/fFNxLWQH4txGYKPnUOYAHJhlR19pHl2pAbOJBASO05MHc6a01lybHw6PJDMk6p4DqQ4fN/cMwydV8+yoi0iY7d9ZG7kVaNN9uvKLTCdxLjfTXTQ1L8sFGMPzcLqY6R6rbeWSUW3HqZxJ7RTXXm5BYcjACkJZz6mp4H4VgCJGeWMg4uPRLXrimsm4AcpBNxJlEJhg4HMhNZRxebSBAfmzdpgekKqWIpgo5ICE5g6Zq2JjZbZaQPHZgZunGtCsfGvuFx8OvX966plOvS/E2mxAEjOQEs6P6GheDyiADM6gUK6ucVf8NZchda1bkkpPAAZdZuP8RBThjVDRrbqa6uqz0qTiWACgBh5lZH70BeBoQWNYyZhV1dWlS4nGfLoCdddsMqKW8BGR4XoQp5dMyXXV1aDf7DUAjUjYF531/cXWZ5ibkvIwgJG9GuoJ2cIMvGDJ6eqfvWi24K4Lw2pwNgZAygPY5ddXVKF4nA5YNya5go1IkZ19PWhIBRt3hxg6d1LoV1RFghbqiPCCv9tBGgzLea6+6w4ZtG4AMB4kY1G9dXVkQuuRAI5Ze6GPNzmtRbtCk4mHoRtKNdXUqULOFbPxFSQ87ZLOhzrUrcY65cQvQr0FdXUhD8MAsk4Wg83g6UtxZuA1/SgcuGezrq6hCi8ymkCJEgj9UBwcdaW+3mWjiDsp9x9uurq0qRtPMJEmCtp++9ctzOe50ERXV1ULztiWyIAHbtQ4ZJDIZwMeWca11dSg2sI2gATnBztOatw7naXLaLIkIn7NdXUoS/gm3IKh46GEcFg11nDBIFqPNbALl/Cej/ALrq6pBHFxGB4VG5IL3JMvod6e7iIXAhi2SDrM9M/OurqtHfn26ontpp7Kurq6tYP//Z"/>
+          <p:cNvSpPr>
+            <a:spLocks noChangeAspect="1" noChangeArrowheads="1"/>
+          </p:cNvSpPr>
           <p:nvPr/>
         </p:nvSpPr>
-        <p:spPr>
+        <p:spPr bwMode="auto">
           <a:xfrm>
-            <a:off x="4950600" y="8836800"/>
-            <a:ext cx="8686800" cy="230832"/>
+            <a:off x="155575" y="-144463"/>
+            <a:ext cx="304800" cy="304801"/>
           </a:xfrm>
           <a:prstGeom prst="rect">
             <a:avLst/>
@@ -9926,57 +9727,191 @@
           <a:noFill/>
         </p:spPr>
         <p:txBody>
-          <a:bodyPr wrap="square" rtlCol="0">
-            <a:spAutoFit/>
+          <a:bodyPr vert="horz" wrap="square" lIns="91440" tIns="45720" rIns="91440" bIns="45720" numCol="1" anchor="t" anchorCtr="0" compatLnSpc="1">
+            <a:prstTxWarp prst="textNoShape">
+              <a:avLst/>
+            </a:prstTxWarp>
           </a:bodyPr>
           <a:lstStyle/>
           <a:p>
-            <a:r>
-              <a:rPr lang="en-US" sz="900">
-                <a:hlinkClick r:id="rId21" tooltip="https://www.freepngimg.com/png/63086-map-google-computer-icons-point-vector-maker"/>
-              </a:rPr>
-              <a:t>This Photo</a:t>
-            </a:r>
-            <a:r>
-              <a:rPr lang="en-US" sz="900"/>
-              <a:t> by Unknown Author is licensed under </a:t>
-            </a:r>
-            <a:r>
-              <a:rPr lang="en-US" sz="900">
-                <a:hlinkClick r:id="rId22" tooltip="https://creativecommons.org/licenses/by-nc/3.0/"/>
-              </a:rPr>
-              <a:t>CC BY-NC</a:t>
-            </a:r>
-            <a:endParaRPr lang="en-US" sz="900"/>
+            <a:endParaRPr lang="en-US"/>
+          </a:p>
+        </p:txBody>
+      </p:sp>
+      <p:sp>
+        <p:nvSpPr>
+          <p:cNvPr id="235" name="Rectangle 234"/>
+          <p:cNvSpPr/>
+          <p:nvPr/>
+        </p:nvSpPr>
+        <p:spPr>
+          <a:xfrm>
+            <a:off x="0" y="6807200"/>
+            <a:ext cx="18288000" cy="1879599"/>
+          </a:xfrm>
+          <a:prstGeom prst="rect">
+            <a:avLst/>
+          </a:prstGeom>
+          <a:solidFill>
+            <a:schemeClr val="accent6">
+              <a:lumMod val="75000"/>
+            </a:schemeClr>
+          </a:solidFill>
+          <a:ln>
+            <a:noFill/>
+          </a:ln>
+        </p:spPr>
+        <p:style>
+          <a:lnRef idx="2">
+            <a:schemeClr val="accent1">
+              <a:shade val="50000"/>
+            </a:schemeClr>
+          </a:lnRef>
+          <a:fillRef idx="1">
+            <a:schemeClr val="accent1"/>
+          </a:fillRef>
+          <a:effectRef idx="0">
+            <a:schemeClr val="accent1"/>
+          </a:effectRef>
+          <a:fontRef idx="minor">
+            <a:schemeClr val="lt1"/>
+          </a:fontRef>
+        </p:style>
+        <p:txBody>
+          <a:bodyPr rtlCol="0" anchor="ctr"/>
+          <a:lstStyle/>
+          <a:p>
+            <a:pPr algn="ctr"/>
+            <a:endParaRPr lang="en-US"/>
+          </a:p>
+        </p:txBody>
+      </p:sp>
+      <p:sp>
+        <p:nvSpPr>
+          <p:cNvPr id="262" name="Rectangle 261"/>
+          <p:cNvSpPr/>
+          <p:nvPr/>
+        </p:nvSpPr>
+        <p:spPr>
+          <a:xfrm>
+            <a:off x="0" y="0"/>
+            <a:ext cx="18288000" cy="1504950"/>
+          </a:xfrm>
+          <a:prstGeom prst="rect">
+            <a:avLst/>
+          </a:prstGeom>
+          <a:solidFill>
+            <a:schemeClr val="accent6">
+              <a:lumMod val="75000"/>
+            </a:schemeClr>
+          </a:solidFill>
+          <a:ln>
+            <a:noFill/>
+          </a:ln>
+        </p:spPr>
+        <p:style>
+          <a:lnRef idx="2">
+            <a:schemeClr val="accent1">
+              <a:shade val="50000"/>
+            </a:schemeClr>
+          </a:lnRef>
+          <a:fillRef idx="1">
+            <a:schemeClr val="accent1"/>
+          </a:fillRef>
+          <a:effectRef idx="0">
+            <a:schemeClr val="accent1"/>
+          </a:effectRef>
+          <a:fontRef idx="minor">
+            <a:schemeClr val="lt1"/>
+          </a:fontRef>
+        </p:style>
+        <p:txBody>
+          <a:bodyPr rtlCol="0" anchor="ctr"/>
+          <a:lstStyle/>
+          <a:p>
+            <a:pPr algn="ctr"/>
+            <a:endParaRPr lang="en-US"/>
           </a:p>
         </p:txBody>
       </p:sp>
       <p:grpSp>
         <p:nvGrpSpPr>
-          <p:cNvPr id="46" name="Group 45">
-            <a:extLst>
-              <a:ext uri="{FF2B5EF4-FFF2-40B4-BE49-F238E27FC236}">
-                <a16:creationId xmlns:a16="http://schemas.microsoft.com/office/drawing/2014/main" id="{A062BF00-AF7D-4304-A971-12C6BBAE58E8}"/>
-              </a:ext>
-            </a:extLst>
-          </p:cNvPr>
+          <p:cNvPr id="289" name="Group 288"/>
           <p:cNvGrpSpPr/>
           <p:nvPr/>
         </p:nvGrpSpPr>
         <p:grpSpPr>
           <a:xfrm>
-            <a:off x="4998736" y="825190"/>
-            <a:ext cx="908563" cy="908563"/>
-            <a:chOff x="4998736" y="825190"/>
-            <a:chExt cx="908563" cy="908563"/>
+            <a:off x="5353585" y="854407"/>
+            <a:ext cx="731472" cy="723330"/>
+            <a:chOff x="5353585" y="854407"/>
+            <a:chExt cx="731472" cy="723330"/>
           </a:xfrm>
         </p:grpSpPr>
+        <p:sp>
+          <p:nvSpPr>
+            <p:cNvPr id="290" name="Oval 289">
+              <a:extLst>
+                <a:ext uri="{FF2B5EF4-FFF2-40B4-BE49-F238E27FC236}">
+                  <a16:creationId xmlns:a16="http://schemas.microsoft.com/office/drawing/2014/main" xmlns="" id="{13CBE2DA-F492-4926-B03C-F7E235DA0EC2}"/>
+                </a:ext>
+              </a:extLst>
+            </p:cNvPr>
+            <p:cNvSpPr/>
+            <p:nvPr/>
+          </p:nvSpPr>
+          <p:spPr>
+            <a:xfrm>
+              <a:off x="5519740" y="919163"/>
+              <a:ext cx="395286" cy="392906"/>
+            </a:xfrm>
+            <a:prstGeom prst="ellipse">
+              <a:avLst/>
+            </a:prstGeom>
+            <a:solidFill>
+              <a:schemeClr val="bg1">
+                <a:lumMod val="75000"/>
+              </a:schemeClr>
+            </a:solidFill>
+            <a:ln>
+              <a:solidFill>
+                <a:schemeClr val="accent2">
+                  <a:lumMod val="50000"/>
+                </a:schemeClr>
+              </a:solidFill>
+            </a:ln>
+          </p:spPr>
+          <p:style>
+            <a:lnRef idx="2">
+              <a:schemeClr val="accent1">
+                <a:shade val="50000"/>
+              </a:schemeClr>
+            </a:lnRef>
+            <a:fillRef idx="1">
+              <a:schemeClr val="accent1"/>
+            </a:fillRef>
+            <a:effectRef idx="0">
+              <a:schemeClr val="accent1"/>
+            </a:effectRef>
+            <a:fontRef idx="minor">
+              <a:schemeClr val="lt1"/>
+            </a:fontRef>
+          </p:style>
+          <p:txBody>
+            <a:bodyPr rtlCol="0" anchor="ctr"/>
+            <a:lstStyle/>
+            <a:p>
+              <a:pPr algn="ctr"/>
+              <a:endParaRPr lang="en-US"/>
+            </a:p>
+          </p:txBody>
+        </p:sp>
         <p:pic>
           <p:nvPicPr>
-            <p:cNvPr id="40" name="Picture 39">
-              <a:extLst>
-                <a:ext uri="{FF2B5EF4-FFF2-40B4-BE49-F238E27FC236}">
-                  <a16:creationId xmlns:a16="http://schemas.microsoft.com/office/drawing/2014/main" id="{2182A4A0-1361-462F-B45F-2CAF2462958C}"/>
+            <p:cNvPr id="291" name="Picture 290">
+              <a:extLst>
+                <a:ext uri="{FF2B5EF4-FFF2-40B4-BE49-F238E27FC236}">
+                  <a16:creationId xmlns:a16="http://schemas.microsoft.com/office/drawing/2014/main" xmlns="" id="{2182A4A0-1361-462F-B45F-2CAF2462958C}"/>
                 </a:ext>
               </a:extLst>
             </p:cNvPr>
@@ -9986,7 +9921,7 @@
             <p:nvPr/>
           </p:nvPicPr>
           <p:blipFill>
-            <a:blip r:embed="rId23">
+            <a:blip r:embed="rId19" cstate="print">
               <a:duotone>
                 <a:schemeClr val="accent2">
                   <a:shade val="45000"/>
@@ -9996,10 +9931,10 @@
               </a:duotone>
               <a:extLst>
                 <a:ext uri="{28A0092B-C50C-407E-A947-70E740481C1C}">
-                  <a14:useLocalDpi xmlns:a14="http://schemas.microsoft.com/office/drawing/2010/main" val="0"/>
+                  <a14:useLocalDpi xmlns:a14="http://schemas.microsoft.com/office/drawing/2010/main" xmlns="" val="0"/>
                 </a:ext>
                 <a:ext uri="{837473B0-CC2E-450A-ABE3-18F120FF3D39}">
-                  <a1611:picAttrSrcUrl xmlns:a1611="http://schemas.microsoft.com/office/drawing/2016/11/main" r:id="rId21"/>
+                  <a1611:picAttrSrcUrl xmlns:a1611="http://schemas.microsoft.com/office/drawing/2016/11/main" xmlns="" r:id="rId21"/>
                 </a:ext>
               </a:extLst>
             </a:blip>
@@ -10009,8 +9944,8 @@
           </p:blipFill>
           <p:spPr>
             <a:xfrm>
-              <a:off x="4998736" y="825190"/>
-              <a:ext cx="908563" cy="908563"/>
+              <a:off x="5353585" y="854407"/>
+              <a:ext cx="731472" cy="723330"/>
             </a:xfrm>
             <a:prstGeom prst="rect">
               <a:avLst/>
@@ -10019,10 +9954,133 @@
         </p:pic>
         <p:sp>
           <p:nvSpPr>
-            <p:cNvPr id="42" name="Oval 41">
-              <a:extLst>
-                <a:ext uri="{FF2B5EF4-FFF2-40B4-BE49-F238E27FC236}">
-                  <a16:creationId xmlns:a16="http://schemas.microsoft.com/office/drawing/2014/main" id="{13CBE2DA-F492-4926-B03C-F7E235DA0EC2}"/>
+            <p:cNvPr id="292" name="TextBox 291">
+              <a:extLst>
+                <a:ext uri="{FF2B5EF4-FFF2-40B4-BE49-F238E27FC236}">
+                  <a16:creationId xmlns:a16="http://schemas.microsoft.com/office/drawing/2014/main" xmlns="" id="{C8335459-C137-436D-AADD-9C4208F424B8}"/>
+                </a:ext>
+              </a:extLst>
+            </p:cNvPr>
+            <p:cNvSpPr txBox="1"/>
+            <p:nvPr/>
+          </p:nvSpPr>
+          <p:spPr>
+            <a:xfrm>
+              <a:off x="5488307" y="876300"/>
+              <a:ext cx="467993" cy="452432"/>
+            </a:xfrm>
+            <a:prstGeom prst="rect">
+              <a:avLst/>
+            </a:prstGeom>
+            <a:noFill/>
+          </p:spPr>
+          <p:txBody>
+            <a:bodyPr wrap="square" rtlCol="0">
+              <a:spAutoFit/>
+            </a:bodyPr>
+            <a:lstStyle/>
+            <a:p>
+              <a:pPr algn="ctr"/>
+              <a:r>
+                <a:rPr lang="en-US" sz="1180" b="1" dirty="0">
+                  <a:solidFill>
+                    <a:schemeClr val="tx1">
+                      <a:lumMod val="65000"/>
+                      <a:lumOff val="35000"/>
+                    </a:schemeClr>
+                  </a:solidFill>
+                </a:rPr>
+                <a:t>5 </a:t>
+              </a:r>
+              <a:r>
+                <a:rPr lang="en-US" sz="1180" b="1" dirty="0" smtClean="0">
+                  <a:solidFill>
+                    <a:schemeClr val="tx1">
+                      <a:lumMod val="65000"/>
+                      <a:lumOff val="35000"/>
+                    </a:schemeClr>
+                  </a:solidFill>
+                </a:rPr>
+                <a:t>TPS</a:t>
+              </a:r>
+              <a:endParaRPr lang="en-US" sz="1180" b="1" dirty="0">
+                <a:solidFill>
+                  <a:schemeClr val="tx1">
+                    <a:lumMod val="65000"/>
+                    <a:lumOff val="35000"/>
+                  </a:schemeClr>
+                </a:solidFill>
+              </a:endParaRPr>
+            </a:p>
+          </p:txBody>
+        </p:sp>
+      </p:grpSp>
+      <p:grpSp>
+        <p:nvGrpSpPr>
+          <p:cNvPr id="293" name="Group 292"/>
+          <p:cNvGrpSpPr/>
+          <p:nvPr/>
+        </p:nvGrpSpPr>
+        <p:grpSpPr>
+          <a:xfrm>
+            <a:off x="6902734" y="675062"/>
+            <a:ext cx="908563" cy="908563"/>
+            <a:chOff x="6902734" y="675062"/>
+            <a:chExt cx="908563" cy="908563"/>
+          </a:xfrm>
+        </p:grpSpPr>
+        <p:pic>
+          <p:nvPicPr>
+            <p:cNvPr id="294" name="Picture 293">
+              <a:extLst>
+                <a:ext uri="{FF2B5EF4-FFF2-40B4-BE49-F238E27FC236}">
+                  <a16:creationId xmlns:a16="http://schemas.microsoft.com/office/drawing/2014/main" xmlns="" id="{A01C8C6B-449C-4FAE-AD61-E8C1FFACF1A1}"/>
+                </a:ext>
+              </a:extLst>
+            </p:cNvPr>
+            <p:cNvPicPr>
+              <a:picLocks noChangeAspect="1"/>
+            </p:cNvPicPr>
+            <p:nvPr/>
+          </p:nvPicPr>
+          <p:blipFill>
+            <a:blip r:embed="rId22" cstate="print">
+              <a:duotone>
+                <a:schemeClr val="accent2">
+                  <a:shade val="45000"/>
+                  <a:satMod val="135000"/>
+                </a:schemeClr>
+                <a:prstClr val="white"/>
+              </a:duotone>
+              <a:extLst>
+                <a:ext uri="{28A0092B-C50C-407E-A947-70E740481C1C}">
+                  <a14:useLocalDpi xmlns:a14="http://schemas.microsoft.com/office/drawing/2010/main" xmlns="" val="0"/>
+                </a:ext>
+                <a:ext uri="{837473B0-CC2E-450A-ABE3-18F120FF3D39}">
+                  <a1611:picAttrSrcUrl xmlns:a1611="http://schemas.microsoft.com/office/drawing/2016/11/main" xmlns="" r:id="rId21"/>
+                </a:ext>
+              </a:extLst>
+            </a:blip>
+            <a:stretch>
+              <a:fillRect/>
+            </a:stretch>
+          </p:blipFill>
+          <p:spPr>
+            <a:xfrm>
+              <a:off x="6902734" y="675062"/>
+              <a:ext cx="908563" cy="908563"/>
+            </a:xfrm>
+            <a:prstGeom prst="rect">
+              <a:avLst/>
+            </a:prstGeom>
+          </p:spPr>
+        </p:pic>
+        <p:sp>
+          <p:nvSpPr>
+            <p:cNvPr id="295" name="Oval 294">
+              <a:extLst>
+                <a:ext uri="{FF2B5EF4-FFF2-40B4-BE49-F238E27FC236}">
+                  <a16:creationId xmlns:a16="http://schemas.microsoft.com/office/drawing/2014/main" xmlns="" id="{B2E4F982-14AD-4BB5-B48D-D485C6735501}"/>
                 </a:ext>
               </a:extLst>
             </p:cNvPr>
@@ -10031,8 +10089,8 @@
           </p:nvSpPr>
           <p:spPr>
             <a:xfrm>
-              <a:off x="5212310" y="909088"/>
-              <a:ext cx="455965" cy="485322"/>
+              <a:off x="7116308" y="758960"/>
+              <a:ext cx="475117" cy="485322"/>
             </a:xfrm>
             <a:prstGeom prst="ellipse">
               <a:avLst/>
@@ -10077,10 +10135,10 @@
         </p:sp>
         <p:sp>
           <p:nvSpPr>
-            <p:cNvPr id="45" name="TextBox 44">
-              <a:extLst>
-                <a:ext uri="{FF2B5EF4-FFF2-40B4-BE49-F238E27FC236}">
-                  <a16:creationId xmlns:a16="http://schemas.microsoft.com/office/drawing/2014/main" id="{C8335459-C137-436D-AADD-9C4208F424B8}"/>
+            <p:cNvPr id="296" name="TextBox 295">
+              <a:extLst>
+                <a:ext uri="{FF2B5EF4-FFF2-40B4-BE49-F238E27FC236}">
+                  <a16:creationId xmlns:a16="http://schemas.microsoft.com/office/drawing/2014/main" xmlns="" id="{F6177A89-3035-464B-826E-DC00E31AA018}"/>
                 </a:ext>
               </a:extLst>
             </p:cNvPr>
@@ -10089,189 +10147,7 @@
           </p:nvSpPr>
           <p:spPr>
             <a:xfrm>
-              <a:off x="5060239" y="895467"/>
-              <a:ext cx="776929" cy="523220"/>
-            </a:xfrm>
-            <a:prstGeom prst="rect">
-              <a:avLst/>
-            </a:prstGeom>
-            <a:noFill/>
-          </p:spPr>
-          <p:txBody>
-            <a:bodyPr wrap="square" rtlCol="0">
-              <a:spAutoFit/>
-            </a:bodyPr>
-            <a:lstStyle/>
-            <a:p>
-              <a:pPr algn="ctr"/>
-              <a:r>
-                <a:rPr lang="en-US" sz="1400" b="1" dirty="0">
-                  <a:solidFill>
-                    <a:schemeClr val="tx1">
-                      <a:lumMod val="65000"/>
-                      <a:lumOff val="35000"/>
-                    </a:schemeClr>
-                  </a:solidFill>
-                </a:rPr>
-                <a:t>5 </a:t>
-              </a:r>
-            </a:p>
-            <a:p>
-              <a:pPr algn="ctr"/>
-              <a:r>
-                <a:rPr lang="en-US" sz="1400" b="1" dirty="0">
-                  <a:solidFill>
-                    <a:schemeClr val="tx1">
-                      <a:lumMod val="65000"/>
-                      <a:lumOff val="35000"/>
-                    </a:schemeClr>
-                  </a:solidFill>
-                </a:rPr>
-                <a:t>TPS</a:t>
-              </a:r>
-            </a:p>
-          </p:txBody>
-        </p:sp>
-      </p:grpSp>
-      <p:grpSp>
-        <p:nvGrpSpPr>
-          <p:cNvPr id="199" name="Group 198">
-            <a:extLst>
-              <a:ext uri="{FF2B5EF4-FFF2-40B4-BE49-F238E27FC236}">
-                <a16:creationId xmlns:a16="http://schemas.microsoft.com/office/drawing/2014/main" id="{F9895373-E4AC-4E87-9F2E-7CD9BB76268E}"/>
-              </a:ext>
-            </a:extLst>
-          </p:cNvPr>
-          <p:cNvGrpSpPr/>
-          <p:nvPr/>
-        </p:nvGrpSpPr>
-        <p:grpSpPr>
-          <a:xfrm>
-            <a:off x="7162046" y="825190"/>
-            <a:ext cx="908563" cy="908563"/>
-            <a:chOff x="4998736" y="825190"/>
-            <a:chExt cx="908563" cy="908563"/>
-          </a:xfrm>
-        </p:grpSpPr>
-        <p:pic>
-          <p:nvPicPr>
-            <p:cNvPr id="200" name="Picture 199">
-              <a:extLst>
-                <a:ext uri="{FF2B5EF4-FFF2-40B4-BE49-F238E27FC236}">
-                  <a16:creationId xmlns:a16="http://schemas.microsoft.com/office/drawing/2014/main" id="{A01C8C6B-449C-4FAE-AD61-E8C1FFACF1A1}"/>
-                </a:ext>
-              </a:extLst>
-            </p:cNvPr>
-            <p:cNvPicPr>
-              <a:picLocks noChangeAspect="1"/>
-            </p:cNvPicPr>
-            <p:nvPr/>
-          </p:nvPicPr>
-          <p:blipFill>
-            <a:blip r:embed="rId23">
-              <a:duotone>
-                <a:schemeClr val="accent2">
-                  <a:shade val="45000"/>
-                  <a:satMod val="135000"/>
-                </a:schemeClr>
-                <a:prstClr val="white"/>
-              </a:duotone>
-              <a:extLst>
-                <a:ext uri="{28A0092B-C50C-407E-A947-70E740481C1C}">
-                  <a14:useLocalDpi xmlns:a14="http://schemas.microsoft.com/office/drawing/2010/main" val="0"/>
-                </a:ext>
-                <a:ext uri="{837473B0-CC2E-450A-ABE3-18F120FF3D39}">
-                  <a1611:picAttrSrcUrl xmlns:a1611="http://schemas.microsoft.com/office/drawing/2016/11/main" r:id="rId21"/>
-                </a:ext>
-              </a:extLst>
-            </a:blip>
-            <a:stretch>
-              <a:fillRect/>
-            </a:stretch>
-          </p:blipFill>
-          <p:spPr>
-            <a:xfrm>
-              <a:off x="4998736" y="825190"/>
-              <a:ext cx="908563" cy="908563"/>
-            </a:xfrm>
-            <a:prstGeom prst="rect">
-              <a:avLst/>
-            </a:prstGeom>
-          </p:spPr>
-        </p:pic>
-        <p:sp>
-          <p:nvSpPr>
-            <p:cNvPr id="201" name="Oval 200">
-              <a:extLst>
-                <a:ext uri="{FF2B5EF4-FFF2-40B4-BE49-F238E27FC236}">
-                  <a16:creationId xmlns:a16="http://schemas.microsoft.com/office/drawing/2014/main" id="{B2E4F982-14AD-4BB5-B48D-D485C6735501}"/>
-                </a:ext>
-              </a:extLst>
-            </p:cNvPr>
-            <p:cNvSpPr/>
-            <p:nvPr/>
-          </p:nvSpPr>
-          <p:spPr>
-            <a:xfrm>
-              <a:off x="5212310" y="909088"/>
-              <a:ext cx="455965" cy="485322"/>
-            </a:xfrm>
-            <a:prstGeom prst="ellipse">
-              <a:avLst/>
-            </a:prstGeom>
-            <a:solidFill>
-              <a:schemeClr val="bg1">
-                <a:lumMod val="75000"/>
-              </a:schemeClr>
-            </a:solidFill>
-            <a:ln>
-              <a:solidFill>
-                <a:schemeClr val="accent2">
-                  <a:lumMod val="50000"/>
-                </a:schemeClr>
-              </a:solidFill>
-            </a:ln>
-          </p:spPr>
-          <p:style>
-            <a:lnRef idx="2">
-              <a:schemeClr val="accent1">
-                <a:shade val="50000"/>
-              </a:schemeClr>
-            </a:lnRef>
-            <a:fillRef idx="1">
-              <a:schemeClr val="accent1"/>
-            </a:fillRef>
-            <a:effectRef idx="0">
-              <a:schemeClr val="accent1"/>
-            </a:effectRef>
-            <a:fontRef idx="minor">
-              <a:schemeClr val="lt1"/>
-            </a:fontRef>
-          </p:style>
-          <p:txBody>
-            <a:bodyPr rtlCol="0" anchor="ctr"/>
-            <a:lstStyle/>
-            <a:p>
-              <a:pPr algn="ctr"/>
-              <a:endParaRPr lang="en-US"/>
-            </a:p>
-          </p:txBody>
-        </p:sp>
-        <p:sp>
-          <p:nvSpPr>
-            <p:cNvPr id="202" name="TextBox 201">
-              <a:extLst>
-                <a:ext uri="{FF2B5EF4-FFF2-40B4-BE49-F238E27FC236}">
-                  <a16:creationId xmlns:a16="http://schemas.microsoft.com/office/drawing/2014/main" id="{F6177A89-3035-464B-826E-DC00E31AA018}"/>
-                </a:ext>
-              </a:extLst>
-            </p:cNvPr>
-            <p:cNvSpPr txBox="1"/>
-            <p:nvPr/>
-          </p:nvSpPr>
-          <p:spPr>
-            <a:xfrm>
-              <a:off x="5060239" y="895467"/>
+              <a:off x="6964237" y="745339"/>
               <a:ext cx="776929" cy="523220"/>
             </a:xfrm>
             <a:prstGeom prst="rect">
@@ -10317,30 +10193,24 @@
       </p:grpSp>
       <p:grpSp>
         <p:nvGrpSpPr>
-          <p:cNvPr id="203" name="Group 202">
-            <a:extLst>
-              <a:ext uri="{FF2B5EF4-FFF2-40B4-BE49-F238E27FC236}">
-                <a16:creationId xmlns:a16="http://schemas.microsoft.com/office/drawing/2014/main" id="{E972DADF-7C1E-4E83-860B-1C8BA82DAE77}"/>
-              </a:ext>
-            </a:extLst>
-          </p:cNvPr>
+          <p:cNvPr id="297" name="Group 296"/>
           <p:cNvGrpSpPr/>
           <p:nvPr/>
         </p:nvGrpSpPr>
         <p:grpSpPr>
           <a:xfrm>
-            <a:off x="8686202" y="804117"/>
-            <a:ext cx="908563" cy="908563"/>
-            <a:chOff x="4998736" y="825190"/>
-            <a:chExt cx="908563" cy="908563"/>
+            <a:off x="8754442" y="522738"/>
+            <a:ext cx="1057585" cy="1057585"/>
+            <a:chOff x="8754442" y="532263"/>
+            <a:chExt cx="1057585" cy="1057585"/>
           </a:xfrm>
         </p:grpSpPr>
         <p:pic>
           <p:nvPicPr>
-            <p:cNvPr id="209" name="Picture 208">
-              <a:extLst>
-                <a:ext uri="{FF2B5EF4-FFF2-40B4-BE49-F238E27FC236}">
-                  <a16:creationId xmlns:a16="http://schemas.microsoft.com/office/drawing/2014/main" id="{59E4AD3C-AC9D-4FAB-96EA-41DCC199485E}"/>
+            <p:cNvPr id="298" name="Picture 297">
+              <a:extLst>
+                <a:ext uri="{FF2B5EF4-FFF2-40B4-BE49-F238E27FC236}">
+                  <a16:creationId xmlns:a16="http://schemas.microsoft.com/office/drawing/2014/main" xmlns="" id="{59E4AD3C-AC9D-4FAB-96EA-41DCC199485E}"/>
                 </a:ext>
               </a:extLst>
             </p:cNvPr>
@@ -10350,7 +10220,7 @@
             <p:nvPr/>
           </p:nvPicPr>
           <p:blipFill>
-            <a:blip r:embed="rId23">
+            <a:blip r:embed="rId23" cstate="print">
               <a:duotone>
                 <a:schemeClr val="accent2">
                   <a:shade val="45000"/>
@@ -10360,10 +10230,10 @@
               </a:duotone>
               <a:extLst>
                 <a:ext uri="{28A0092B-C50C-407E-A947-70E740481C1C}">
-                  <a14:useLocalDpi xmlns:a14="http://schemas.microsoft.com/office/drawing/2010/main" val="0"/>
+                  <a14:useLocalDpi xmlns:a14="http://schemas.microsoft.com/office/drawing/2010/main" xmlns="" val="0"/>
                 </a:ext>
                 <a:ext uri="{837473B0-CC2E-450A-ABE3-18F120FF3D39}">
-                  <a1611:picAttrSrcUrl xmlns:a1611="http://schemas.microsoft.com/office/drawing/2016/11/main" r:id="rId21"/>
+                  <a1611:picAttrSrcUrl xmlns:a1611="http://schemas.microsoft.com/office/drawing/2016/11/main" xmlns="" r:id="rId21"/>
                 </a:ext>
               </a:extLst>
             </a:blip>
@@ -10373,8 +10243,8 @@
           </p:blipFill>
           <p:spPr>
             <a:xfrm>
-              <a:off x="4998736" y="825190"/>
-              <a:ext cx="908563" cy="908563"/>
+              <a:off x="8754442" y="532263"/>
+              <a:ext cx="1057585" cy="1057585"/>
             </a:xfrm>
             <a:prstGeom prst="rect">
               <a:avLst/>
@@ -10383,10 +10253,10 @@
         </p:pic>
         <p:sp>
           <p:nvSpPr>
-            <p:cNvPr id="210" name="Oval 209">
-              <a:extLst>
-                <a:ext uri="{FF2B5EF4-FFF2-40B4-BE49-F238E27FC236}">
-                  <a16:creationId xmlns:a16="http://schemas.microsoft.com/office/drawing/2014/main" id="{47887903-1D51-4349-A37E-1ECBE16AF262}"/>
+            <p:cNvPr id="299" name="Oval 298">
+              <a:extLst>
+                <a:ext uri="{FF2B5EF4-FFF2-40B4-BE49-F238E27FC236}">
+                  <a16:creationId xmlns:a16="http://schemas.microsoft.com/office/drawing/2014/main" xmlns="" id="{47887903-1D51-4349-A37E-1ECBE16AF262}"/>
                 </a:ext>
               </a:extLst>
             </p:cNvPr>
@@ -10395,8 +10265,8 @@
           </p:nvSpPr>
           <p:spPr>
             <a:xfrm>
-              <a:off x="5212310" y="909088"/>
-              <a:ext cx="455965" cy="485322"/>
+              <a:off x="9008960" y="642353"/>
+              <a:ext cx="544473" cy="545002"/>
             </a:xfrm>
             <a:prstGeom prst="ellipse">
               <a:avLst/>
@@ -10441,10 +10311,10 @@
         </p:sp>
         <p:sp>
           <p:nvSpPr>
-            <p:cNvPr id="211" name="TextBox 210">
-              <a:extLst>
-                <a:ext uri="{FF2B5EF4-FFF2-40B4-BE49-F238E27FC236}">
-                  <a16:creationId xmlns:a16="http://schemas.microsoft.com/office/drawing/2014/main" id="{6C16D8C5-1765-4DF0-9414-366D07BE247A}"/>
+            <p:cNvPr id="300" name="TextBox 299">
+              <a:extLst>
+                <a:ext uri="{FF2B5EF4-FFF2-40B4-BE49-F238E27FC236}">
+                  <a16:creationId xmlns:a16="http://schemas.microsoft.com/office/drawing/2014/main" xmlns="" id="{6C16D8C5-1765-4DF0-9414-366D07BE247A}"/>
                 </a:ext>
               </a:extLst>
             </p:cNvPr>
@@ -10453,8 +10323,8 @@
           </p:nvSpPr>
           <p:spPr>
             <a:xfrm>
-              <a:off x="5060239" y="895467"/>
-              <a:ext cx="776929" cy="523220"/>
+              <a:off x="8938774" y="682388"/>
+              <a:ext cx="696545" cy="523220"/>
             </a:xfrm>
             <a:prstGeom prst="rect">
               <a:avLst/>
@@ -10499,30 +10369,24 @@
       </p:grpSp>
       <p:grpSp>
         <p:nvGrpSpPr>
-          <p:cNvPr id="47" name="Group 46">
-            <a:extLst>
-              <a:ext uri="{FF2B5EF4-FFF2-40B4-BE49-F238E27FC236}">
-                <a16:creationId xmlns:a16="http://schemas.microsoft.com/office/drawing/2014/main" id="{391348E5-F658-47C5-8DF1-7933F7BFF19B}"/>
-              </a:ext>
-            </a:extLst>
-          </p:cNvPr>
+          <p:cNvPr id="301" name="Group 300"/>
           <p:cNvGrpSpPr/>
           <p:nvPr/>
         </p:nvGrpSpPr>
         <p:grpSpPr>
           <a:xfrm>
-            <a:off x="10661198" y="733645"/>
-            <a:ext cx="908563" cy="908563"/>
-            <a:chOff x="10661198" y="733645"/>
-            <a:chExt cx="908563" cy="908563"/>
+            <a:off x="11275359" y="277078"/>
+            <a:ext cx="1157752" cy="1301014"/>
+            <a:chOff x="11275359" y="277078"/>
+            <a:chExt cx="1157752" cy="1301014"/>
           </a:xfrm>
         </p:grpSpPr>
         <p:pic>
           <p:nvPicPr>
-            <p:cNvPr id="213" name="Picture 212">
-              <a:extLst>
-                <a:ext uri="{FF2B5EF4-FFF2-40B4-BE49-F238E27FC236}">
-                  <a16:creationId xmlns:a16="http://schemas.microsoft.com/office/drawing/2014/main" id="{4CA3A1B7-6BD9-413C-865C-E7A6087CA992}"/>
+            <p:cNvPr id="302" name="Picture 301">
+              <a:extLst>
+                <a:ext uri="{FF2B5EF4-FFF2-40B4-BE49-F238E27FC236}">
+                  <a16:creationId xmlns:a16="http://schemas.microsoft.com/office/drawing/2014/main" xmlns="" id="{4CA3A1B7-6BD9-413C-865C-E7A6087CA992}"/>
                 </a:ext>
               </a:extLst>
             </p:cNvPr>
@@ -10532,7 +10396,7 @@
             <p:nvPr/>
           </p:nvPicPr>
           <p:blipFill>
-            <a:blip r:embed="rId23">
+            <a:blip r:embed="rId24" cstate="print">
               <a:duotone>
                 <a:schemeClr val="accent2">
                   <a:shade val="45000"/>
@@ -10542,10 +10406,10 @@
               </a:duotone>
               <a:extLst>
                 <a:ext uri="{28A0092B-C50C-407E-A947-70E740481C1C}">
-                  <a14:useLocalDpi xmlns:a14="http://schemas.microsoft.com/office/drawing/2010/main" val="0"/>
+                  <a14:useLocalDpi xmlns:a14="http://schemas.microsoft.com/office/drawing/2010/main" xmlns="" val="0"/>
                 </a:ext>
                 <a:ext uri="{837473B0-CC2E-450A-ABE3-18F120FF3D39}">
-                  <a1611:picAttrSrcUrl xmlns:a1611="http://schemas.microsoft.com/office/drawing/2016/11/main" r:id="rId21"/>
+                  <a1611:picAttrSrcUrl xmlns:a1611="http://schemas.microsoft.com/office/drawing/2016/11/main" xmlns="" r:id="rId21"/>
                 </a:ext>
               </a:extLst>
             </a:blip>
@@ -10555,8 +10419,8 @@
           </p:blipFill>
           <p:spPr>
             <a:xfrm>
-              <a:off x="10661198" y="733645"/>
-              <a:ext cx="908563" cy="908563"/>
+              <a:off x="11275359" y="277078"/>
+              <a:ext cx="1157752" cy="1301014"/>
             </a:xfrm>
             <a:prstGeom prst="rect">
               <a:avLst/>
@@ -10565,10 +10429,10 @@
         </p:pic>
         <p:sp>
           <p:nvSpPr>
-            <p:cNvPr id="214" name="Oval 213">
-              <a:extLst>
-                <a:ext uri="{FF2B5EF4-FFF2-40B4-BE49-F238E27FC236}">
-                  <a16:creationId xmlns:a16="http://schemas.microsoft.com/office/drawing/2014/main" id="{1FD5771E-D9BA-4E31-B943-7B6523AE56AE}"/>
+            <p:cNvPr id="303" name="Oval 302">
+              <a:extLst>
+                <a:ext uri="{FF2B5EF4-FFF2-40B4-BE49-F238E27FC236}">
+                  <a16:creationId xmlns:a16="http://schemas.microsoft.com/office/drawing/2014/main" xmlns="" id="{1FD5771E-D9BA-4E31-B943-7B6523AE56AE}"/>
                 </a:ext>
               </a:extLst>
             </p:cNvPr>
@@ -10577,8 +10441,8 @@
           </p:nvSpPr>
           <p:spPr>
             <a:xfrm>
-              <a:off x="10874772" y="817543"/>
-              <a:ext cx="455965" cy="485322"/>
+              <a:off x="11547509" y="436728"/>
+              <a:ext cx="598998" cy="664967"/>
             </a:xfrm>
             <a:prstGeom prst="ellipse">
               <a:avLst/>
@@ -10623,10 +10487,10 @@
         </p:sp>
         <p:sp>
           <p:nvSpPr>
-            <p:cNvPr id="215" name="TextBox 214">
-              <a:extLst>
-                <a:ext uri="{FF2B5EF4-FFF2-40B4-BE49-F238E27FC236}">
-                  <a16:creationId xmlns:a16="http://schemas.microsoft.com/office/drawing/2014/main" id="{D76FE56A-1D06-4F19-A1C0-7B63358B0C09}"/>
+            <p:cNvPr id="304" name="TextBox 303">
+              <a:extLst>
+                <a:ext uri="{FF2B5EF4-FFF2-40B4-BE49-F238E27FC236}">
+                  <a16:creationId xmlns:a16="http://schemas.microsoft.com/office/drawing/2014/main" xmlns="" id="{D76FE56A-1D06-4F19-A1C0-7B63358B0C09}"/>
                 </a:ext>
               </a:extLst>
             </p:cNvPr>
@@ -10635,8 +10499,8 @@
           </p:nvSpPr>
           <p:spPr>
             <a:xfrm>
-              <a:off x="10722701" y="850222"/>
-              <a:ext cx="776929" cy="492443"/>
+              <a:off x="11449264" y="535422"/>
+              <a:ext cx="833722" cy="523220"/>
             </a:xfrm>
             <a:prstGeom prst="rect">
               <a:avLst/>
@@ -10651,7 +10515,7 @@
             <a:p>
               <a:pPr algn="ctr"/>
               <a:r>
-                <a:rPr lang="en-US" sz="1300" b="1" dirty="0">
+                <a:rPr lang="en-US" sz="1400" b="1" dirty="0">
                   <a:solidFill>
                     <a:schemeClr val="tx1">
                       <a:lumMod val="65000"/>
@@ -10665,7 +10529,7 @@
             <a:p>
               <a:pPr algn="ctr"/>
               <a:r>
-                <a:rPr lang="en-US" sz="1300" b="1" dirty="0">
+                <a:rPr lang="en-US" sz="1400" b="1" dirty="0">
                   <a:solidFill>
                     <a:schemeClr val="tx1">
                       <a:lumMod val="65000"/>
@@ -10681,30 +10545,24 @@
       </p:grpSp>
       <p:grpSp>
         <p:nvGrpSpPr>
-          <p:cNvPr id="216" name="Group 215">
-            <a:extLst>
-              <a:ext uri="{FF2B5EF4-FFF2-40B4-BE49-F238E27FC236}">
-                <a16:creationId xmlns:a16="http://schemas.microsoft.com/office/drawing/2014/main" id="{0ECE6D2C-8C40-45D4-9D38-2111EFEC35C1}"/>
-              </a:ext>
-            </a:extLst>
-          </p:cNvPr>
+          <p:cNvPr id="305" name="Group 304"/>
           <p:cNvGrpSpPr/>
           <p:nvPr/>
         </p:nvGrpSpPr>
         <p:grpSpPr>
           <a:xfrm>
-            <a:off x="12842550" y="677822"/>
-            <a:ext cx="908563" cy="908563"/>
-            <a:chOff x="10661198" y="733645"/>
-            <a:chExt cx="908563" cy="908563"/>
+            <a:off x="14698678" y="177422"/>
+            <a:ext cx="1323794" cy="1408964"/>
+            <a:chOff x="14698678" y="177422"/>
+            <a:chExt cx="1323794" cy="1408964"/>
           </a:xfrm>
         </p:grpSpPr>
         <p:pic>
           <p:nvPicPr>
-            <p:cNvPr id="217" name="Picture 216">
-              <a:extLst>
-                <a:ext uri="{FF2B5EF4-FFF2-40B4-BE49-F238E27FC236}">
-                  <a16:creationId xmlns:a16="http://schemas.microsoft.com/office/drawing/2014/main" id="{7D00EB27-F895-444C-BBF7-C86E55BA20EA}"/>
+            <p:cNvPr id="306" name="Picture 305">
+              <a:extLst>
+                <a:ext uri="{FF2B5EF4-FFF2-40B4-BE49-F238E27FC236}">
+                  <a16:creationId xmlns:a16="http://schemas.microsoft.com/office/drawing/2014/main" xmlns="" id="{7D00EB27-F895-444C-BBF7-C86E55BA20EA}"/>
                 </a:ext>
               </a:extLst>
             </p:cNvPr>
@@ -10714,7 +10572,7 @@
             <p:nvPr/>
           </p:nvPicPr>
           <p:blipFill>
-            <a:blip r:embed="rId23">
+            <a:blip r:embed="rId25" cstate="print">
               <a:duotone>
                 <a:schemeClr val="accent2">
                   <a:shade val="45000"/>
@@ -10724,10 +10582,10 @@
               </a:duotone>
               <a:extLst>
                 <a:ext uri="{28A0092B-C50C-407E-A947-70E740481C1C}">
-                  <a14:useLocalDpi xmlns:a14="http://schemas.microsoft.com/office/drawing/2010/main" val="0"/>
+                  <a14:useLocalDpi xmlns:a14="http://schemas.microsoft.com/office/drawing/2010/main" xmlns="" val="0"/>
                 </a:ext>
                 <a:ext uri="{837473B0-CC2E-450A-ABE3-18F120FF3D39}">
-                  <a1611:picAttrSrcUrl xmlns:a1611="http://schemas.microsoft.com/office/drawing/2016/11/main" r:id="rId21"/>
+                  <a1611:picAttrSrcUrl xmlns:a1611="http://schemas.microsoft.com/office/drawing/2016/11/main" xmlns="" r:id="rId21"/>
                 </a:ext>
               </a:extLst>
             </a:blip>
@@ -10737,8 +10595,8 @@
           </p:blipFill>
           <p:spPr>
             <a:xfrm>
-              <a:off x="10661198" y="733645"/>
-              <a:ext cx="908563" cy="908563"/>
+              <a:off x="14698678" y="177422"/>
+              <a:ext cx="1323794" cy="1408964"/>
             </a:xfrm>
             <a:prstGeom prst="rect">
               <a:avLst/>
@@ -10747,10 +10605,10 @@
         </p:pic>
         <p:sp>
           <p:nvSpPr>
-            <p:cNvPr id="218" name="Oval 217">
-              <a:extLst>
-                <a:ext uri="{FF2B5EF4-FFF2-40B4-BE49-F238E27FC236}">
-                  <a16:creationId xmlns:a16="http://schemas.microsoft.com/office/drawing/2014/main" id="{C25FCFBA-CA76-4D04-A222-C0A21EBE6E3A}"/>
+            <p:cNvPr id="307" name="Oval 306">
+              <a:extLst>
+                <a:ext uri="{FF2B5EF4-FFF2-40B4-BE49-F238E27FC236}">
+                  <a16:creationId xmlns:a16="http://schemas.microsoft.com/office/drawing/2014/main" xmlns="" id="{C25FCFBA-CA76-4D04-A222-C0A21EBE6E3A}"/>
                 </a:ext>
               </a:extLst>
             </p:cNvPr>
@@ -10759,8 +10617,8 @@
           </p:nvSpPr>
           <p:spPr>
             <a:xfrm>
-              <a:off x="10874772" y="817543"/>
-              <a:ext cx="455965" cy="485322"/>
+              <a:off x="15009859" y="307528"/>
+              <a:ext cx="712362" cy="752618"/>
             </a:xfrm>
             <a:prstGeom prst="ellipse">
               <a:avLst/>
@@ -10805,10 +10663,10 @@
         </p:sp>
         <p:sp>
           <p:nvSpPr>
-            <p:cNvPr id="219" name="TextBox 218">
-              <a:extLst>
-                <a:ext uri="{FF2B5EF4-FFF2-40B4-BE49-F238E27FC236}">
-                  <a16:creationId xmlns:a16="http://schemas.microsoft.com/office/drawing/2014/main" id="{B5FF11E5-291D-4462-B208-526368E99C1C}"/>
+            <p:cNvPr id="308" name="TextBox 307">
+              <a:extLst>
+                <a:ext uri="{FF2B5EF4-FFF2-40B4-BE49-F238E27FC236}">
+                  <a16:creationId xmlns:a16="http://schemas.microsoft.com/office/drawing/2014/main" xmlns="" id="{B5FF11E5-291D-4462-B208-526368E99C1C}"/>
                 </a:ext>
               </a:extLst>
             </p:cNvPr>
@@ -10817,8 +10675,8 @@
           </p:nvSpPr>
           <p:spPr>
             <a:xfrm>
-              <a:off x="10722701" y="850222"/>
-              <a:ext cx="776929" cy="492443"/>
+              <a:off x="14952062" y="467387"/>
+              <a:ext cx="865693" cy="523220"/>
             </a:xfrm>
             <a:prstGeom prst="rect">
               <a:avLst/>
@@ -10833,7 +10691,7 @@
             <a:p>
               <a:pPr algn="ctr"/>
               <a:r>
-                <a:rPr lang="en-US" sz="1300" b="1" dirty="0">
+                <a:rPr lang="en-US" sz="1400" b="1" dirty="0">
                   <a:solidFill>
                     <a:schemeClr val="tx1">
                       <a:lumMod val="65000"/>
@@ -10847,7 +10705,7 @@
             <a:p>
               <a:pPr algn="ctr"/>
               <a:r>
-                <a:rPr lang="en-US" sz="1300" b="1" dirty="0">
+                <a:rPr lang="en-US" sz="1400" b="1" dirty="0">
                   <a:solidFill>
                     <a:schemeClr val="tx1">
                       <a:lumMod val="65000"/>
@@ -10864,7 +10722,7 @@
     </p:spTree>
     <p:extLst>
       <p:ext uri="{BB962C8B-B14F-4D97-AF65-F5344CB8AC3E}">
-        <p14:creationId xmlns:p14="http://schemas.microsoft.com/office/powerpoint/2010/main" val="339053272"/>
+        <p14:creationId xmlns:p14="http://schemas.microsoft.com/office/powerpoint/2010/main" xmlns="" val="339053272"/>
       </p:ext>
     </p:extLst>
   </p:cSld>
@@ -10909,94 +10767,6 @@
                                         </p:attrNameLst>
                                       </p:cBhvr>
                                       <p:rCtr x="6094" y="-201"/>
-                                    </p:animMotion>
-                                  </p:childTnLst>
-                                </p:cTn>
-                              </p:par>
-                              <p:par>
-                                <p:cTn id="7" presetID="63" presetClass="path" presetSubtype="0" accel="50000" decel="50000" fill="hold" nodeType="withEffect">
-                                  <p:stCondLst>
-                                    <p:cond delay="0"/>
-                                  </p:stCondLst>
-                                  <p:childTnLst>
-                                    <p:animMotion origin="layout" path="M 2.77778E-7 6.43275E-7 L 0.21979 0.00055 " pathEditMode="relative" rAng="0" ptsTypes="AA">
-                                      <p:cBhvr>
-                                        <p:cTn id="8" dur="2000" fill="hold"/>
-                                        <p:tgtEl>
-                                          <p:spTgt spid="14"/>
-                                        </p:tgtEl>
-                                        <p:attrNameLst>
-                                          <p:attrName>ppt_x</p:attrName>
-                                          <p:attrName>ppt_y</p:attrName>
-                                        </p:attrNameLst>
-                                      </p:cBhvr>
-                                      <p:rCtr x="10990" y="18"/>
-                                    </p:animMotion>
-                                  </p:childTnLst>
-                                </p:cTn>
-                              </p:par>
-                              <p:par>
-                                <p:cTn id="9" presetID="63" presetClass="path" presetSubtype="0" accel="50000" decel="50000" fill="hold" nodeType="withEffect">
-                                  <p:stCondLst>
-                                    <p:cond delay="0"/>
-                                  </p:stCondLst>
-                                  <p:childTnLst>
-                                    <p:animMotion origin="layout" path="M -3.33333E-6 -1.46199E-6 L 0.39358 0.00329 " pathEditMode="relative" rAng="0" ptsTypes="AA">
-                                      <p:cBhvr>
-                                        <p:cTn id="10" dur="3500" fill="hold"/>
-                                        <p:tgtEl>
-                                          <p:spTgt spid="29"/>
-                                        </p:tgtEl>
-                                        <p:attrNameLst>
-                                          <p:attrName>ppt_x</p:attrName>
-                                          <p:attrName>ppt_y</p:attrName>
-                                        </p:attrNameLst>
-                                      </p:cBhvr>
-                                      <p:rCtr x="19679" y="164"/>
-                                    </p:animMotion>
-                                  </p:childTnLst>
-                                </p:cTn>
-                              </p:par>
-                              <p:par>
-                                <p:cTn id="11" presetID="63" presetClass="path" presetSubtype="0" accel="50000" decel="50000" fill="hold" nodeType="withEffect">
-                                  <p:stCondLst>
-                                    <p:cond delay="0"/>
-                                  </p:stCondLst>
-                                  <p:childTnLst>
-                                    <p:animMotion origin="layout" path="M 1.11111E-6 -3.27485E-6 L 0.57552 0.00092 " pathEditMode="relative" rAng="0" ptsTypes="AA">
-                                      <p:cBhvr>
-                                        <p:cTn id="12" dur="1800" fill="hold"/>
-                                        <p:tgtEl>
-                                          <p:spTgt spid="37"/>
-                                        </p:tgtEl>
-                                        <p:attrNameLst>
-                                          <p:attrName>ppt_x</p:attrName>
-                                          <p:attrName>ppt_y</p:attrName>
-                                        </p:attrNameLst>
-                                      </p:cBhvr>
-                                      <p:rCtr x="28776" y="37"/>
-                                    </p:animMotion>
-                                  </p:childTnLst>
-                                </p:cTn>
-                              </p:par>
-                              <p:par>
-                                <p:cTn id="13" presetID="63" presetClass="path" presetSubtype="0" accel="50000" decel="50000" fill="hold" nodeType="withEffect">
-                                  <p:stCondLst>
-                                    <p:cond delay="0"/>
-                                  </p:stCondLst>
-                                  <p:childTnLst>
-                                    <p:animMotion origin="layout" path="M 4.72222E-6 -3.50877E-7 L 0.87664 -0.00073 " pathEditMode="relative" rAng="0" ptsTypes="AA">
-                                      <p:cBhvr>
-                                        <p:cTn id="14" dur="1500" fill="hold"/>
-                                        <p:tgtEl>
-                                          <p:spTgt spid="18"/>
-                                        </p:tgtEl>
-                                        <p:attrNameLst>
-                                          <p:attrName>ppt_x</p:attrName>
-                                          <p:attrName>ppt_y</p:attrName>
-                                        </p:attrNameLst>
-                                      </p:cBhvr>
-                                      <p:rCtr x="43828" y="-37"/>
                                     </p:animMotion>
                                   </p:childTnLst>
                                 </p:cTn>
@@ -11049,12 +10819,75 @@
           <a:chExt cx="0" cy="0"/>
         </a:xfrm>
       </p:grpSpPr>
+      <p:sp>
+        <p:nvSpPr>
+          <p:cNvPr id="2" name="Title 1"/>
+          <p:cNvSpPr>
+            <a:spLocks noGrp="1"/>
+          </p:cNvSpPr>
+          <p:nvPr>
+            <p:ph type="title"/>
+          </p:nvPr>
+        </p:nvSpPr>
+        <p:spPr/>
+        <p:txBody>
+          <a:bodyPr/>
+          <a:lstStyle/>
+          <a:p>
+            <a:endParaRPr lang="en-US"/>
+          </a:p>
+        </p:txBody>
+      </p:sp>
+      <p:sp>
+        <p:nvSpPr>
+          <p:cNvPr id="3" name="Content Placeholder 2"/>
+          <p:cNvSpPr>
+            <a:spLocks noGrp="1"/>
+          </p:cNvSpPr>
+          <p:nvPr>
+            <p:ph idx="1"/>
+          </p:nvPr>
+        </p:nvSpPr>
+        <p:spPr/>
+        <p:txBody>
+          <a:bodyPr/>
+          <a:lstStyle/>
+          <a:p>
+            <a:endParaRPr lang="en-US"/>
+          </a:p>
+        </p:txBody>
+      </p:sp>
+    </p:spTree>
+  </p:cSld>
+  <p:clrMapOvr>
+    <a:masterClrMapping/>
+  </p:clrMapOvr>
+</p:sld>
+</file>
+
+<file path=ppt/slides/slide3.xml><?xml version="1.0" encoding="utf-8"?>
+<p:sld xmlns:a="http://schemas.openxmlformats.org/drawingml/2006/main" xmlns:r="http://schemas.openxmlformats.org/officeDocument/2006/relationships" xmlns:p="http://schemas.openxmlformats.org/presentationml/2006/main">
+  <p:cSld>
+    <p:spTree>
+      <p:nvGrpSpPr>
+        <p:cNvPr id="1" name=""/>
+        <p:cNvGrpSpPr/>
+        <p:nvPr/>
+      </p:nvGrpSpPr>
+      <p:grpSpPr>
+        <a:xfrm>
+          <a:off x="0" y="0"/>
+          <a:ext cx="0" cy="0"/>
+          <a:chOff x="0" y="0"/>
+          <a:chExt cx="0" cy="0"/>
+        </a:xfrm>
+      </p:grpSpPr>
       <p:pic>
         <p:nvPicPr>
           <p:cNvPr id="31" name="Picture 30">
             <a:extLst>
               <a:ext uri="{FF2B5EF4-FFF2-40B4-BE49-F238E27FC236}">
-                <a16:creationId xmlns:a16="http://schemas.microsoft.com/office/drawing/2014/main" id="{5B141C54-14E2-450A-88A2-834BB0948B36}"/>
+                <a16:creationId xmlns:a16="http://schemas.microsoft.com/office/drawing/2014/main" xmlns="" id="{5B141C54-14E2-450A-88A2-834BB0948B36}"/>
               </a:ext>
             </a:extLst>
           </p:cNvPr>
@@ -11064,13 +10897,13 @@
           <p:nvPr/>
         </p:nvPicPr>
         <p:blipFill rotWithShape="1">
-          <a:blip r:embed="rId2">
+          <a:blip r:embed="rId2" cstate="print">
             <a:extLst>
               <a:ext uri="{28A0092B-C50C-407E-A947-70E740481C1C}">
-                <a14:useLocalDpi xmlns:a14="http://schemas.microsoft.com/office/drawing/2010/main" val="0"/>
+                <a14:useLocalDpi xmlns:a14="http://schemas.microsoft.com/office/drawing/2010/main" xmlns="" val="0"/>
               </a:ext>
               <a:ext uri="{837473B0-CC2E-450A-ABE3-18F120FF3D39}">
-                <a1611:picAttrSrcUrl xmlns:a1611="http://schemas.microsoft.com/office/drawing/2016/11/main" r:id="rId3"/>
+                <a1611:picAttrSrcUrl xmlns:a1611="http://schemas.microsoft.com/office/drawing/2016/11/main" xmlns="" r:id="rId3"/>
               </a:ext>
             </a:extLst>
           </a:blip>
@@ -11092,7 +10925,7 @@
           <p:cNvPr id="32" name="Straight Connector 31">
             <a:extLst>
               <a:ext uri="{FF2B5EF4-FFF2-40B4-BE49-F238E27FC236}">
-                <a16:creationId xmlns:a16="http://schemas.microsoft.com/office/drawing/2014/main" id="{0146B271-8766-4B2A-BA36-5FA388342AFD}"/>
+                <a16:creationId xmlns:a16="http://schemas.microsoft.com/office/drawing/2014/main" xmlns="" id="{0146B271-8766-4B2A-BA36-5FA388342AFD}"/>
               </a:ext>
             </a:extLst>
           </p:cNvPr>
@@ -11135,7 +10968,7 @@
           <p:cNvPr id="33" name="Straight Connector 32">
             <a:extLst>
               <a:ext uri="{FF2B5EF4-FFF2-40B4-BE49-F238E27FC236}">
-                <a16:creationId xmlns:a16="http://schemas.microsoft.com/office/drawing/2014/main" id="{D62BFA10-74F2-4F7A-B531-744AED9EA3EF}"/>
+                <a16:creationId xmlns:a16="http://schemas.microsoft.com/office/drawing/2014/main" xmlns="" id="{D62BFA10-74F2-4F7A-B531-744AED9EA3EF}"/>
               </a:ext>
             </a:extLst>
           </p:cNvPr>
@@ -11178,7 +11011,7 @@
           <p:cNvPr id="34" name="Straight Connector 33">
             <a:extLst>
               <a:ext uri="{FF2B5EF4-FFF2-40B4-BE49-F238E27FC236}">
-                <a16:creationId xmlns:a16="http://schemas.microsoft.com/office/drawing/2014/main" id="{78FE934F-D534-4C48-A786-BE452457BDBB}"/>
+                <a16:creationId xmlns:a16="http://schemas.microsoft.com/office/drawing/2014/main" xmlns="" id="{78FE934F-D534-4C48-A786-BE452457BDBB}"/>
               </a:ext>
             </a:extLst>
           </p:cNvPr>
@@ -11221,7 +11054,7 @@
           <p:cNvPr id="35" name="Straight Connector 34">
             <a:extLst>
               <a:ext uri="{FF2B5EF4-FFF2-40B4-BE49-F238E27FC236}">
-                <a16:creationId xmlns:a16="http://schemas.microsoft.com/office/drawing/2014/main" id="{E809BCA7-D80C-4788-BC5E-F41D1055DD82}"/>
+                <a16:creationId xmlns:a16="http://schemas.microsoft.com/office/drawing/2014/main" xmlns="" id="{E809BCA7-D80C-4788-BC5E-F41D1055DD82}"/>
               </a:ext>
             </a:extLst>
           </p:cNvPr>
@@ -11264,7 +11097,7 @@
           <p:cNvPr id="36" name="Straight Connector 35">
             <a:extLst>
               <a:ext uri="{FF2B5EF4-FFF2-40B4-BE49-F238E27FC236}">
-                <a16:creationId xmlns:a16="http://schemas.microsoft.com/office/drawing/2014/main" id="{AB12C848-357F-43F5-93CD-52A63BBFC673}"/>
+                <a16:creationId xmlns:a16="http://schemas.microsoft.com/office/drawing/2014/main" xmlns="" id="{AB12C848-357F-43F5-93CD-52A63BBFC673}"/>
               </a:ext>
             </a:extLst>
           </p:cNvPr>
@@ -11307,7 +11140,7 @@
           <p:cNvPr id="37" name="Straight Connector 36">
             <a:extLst>
               <a:ext uri="{FF2B5EF4-FFF2-40B4-BE49-F238E27FC236}">
-                <a16:creationId xmlns:a16="http://schemas.microsoft.com/office/drawing/2014/main" id="{E4AE31BA-42F1-4C05-93DC-338843727329}"/>
+                <a16:creationId xmlns:a16="http://schemas.microsoft.com/office/drawing/2014/main" xmlns="" id="{E4AE31BA-42F1-4C05-93DC-338843727329}"/>
               </a:ext>
             </a:extLst>
           </p:cNvPr>
@@ -11350,7 +11183,7 @@
           <p:cNvPr id="38" name="Straight Connector 37">
             <a:extLst>
               <a:ext uri="{FF2B5EF4-FFF2-40B4-BE49-F238E27FC236}">
-                <a16:creationId xmlns:a16="http://schemas.microsoft.com/office/drawing/2014/main" id="{7FB63560-E7B6-4DDF-AA61-318686632BD3}"/>
+                <a16:creationId xmlns:a16="http://schemas.microsoft.com/office/drawing/2014/main" xmlns="" id="{7FB63560-E7B6-4DDF-AA61-318686632BD3}"/>
               </a:ext>
             </a:extLst>
           </p:cNvPr>
@@ -11393,7 +11226,7 @@
           <p:cNvPr id="39" name="Straight Connector 38">
             <a:extLst>
               <a:ext uri="{FF2B5EF4-FFF2-40B4-BE49-F238E27FC236}">
-                <a16:creationId xmlns:a16="http://schemas.microsoft.com/office/drawing/2014/main" id="{5700D798-E16D-42B0-B671-3D827E70B15B}"/>
+                <a16:creationId xmlns:a16="http://schemas.microsoft.com/office/drawing/2014/main" xmlns="" id="{5700D798-E16D-42B0-B671-3D827E70B15B}"/>
               </a:ext>
             </a:extLst>
           </p:cNvPr>
@@ -11436,7 +11269,7 @@
           <p:cNvPr id="40" name="Straight Connector 39">
             <a:extLst>
               <a:ext uri="{FF2B5EF4-FFF2-40B4-BE49-F238E27FC236}">
-                <a16:creationId xmlns:a16="http://schemas.microsoft.com/office/drawing/2014/main" id="{82487B40-9200-40F6-B124-BBBD4D518020}"/>
+                <a16:creationId xmlns:a16="http://schemas.microsoft.com/office/drawing/2014/main" xmlns="" id="{82487B40-9200-40F6-B124-BBBD4D518020}"/>
               </a:ext>
             </a:extLst>
           </p:cNvPr>
@@ -11479,7 +11312,7 @@
           <p:cNvPr id="41" name="Straight Connector 40">
             <a:extLst>
               <a:ext uri="{FF2B5EF4-FFF2-40B4-BE49-F238E27FC236}">
-                <a16:creationId xmlns:a16="http://schemas.microsoft.com/office/drawing/2014/main" id="{6CF6E650-D910-42FA-815B-F1CA81478050}"/>
+                <a16:creationId xmlns:a16="http://schemas.microsoft.com/office/drawing/2014/main" xmlns="" id="{6CF6E650-D910-42FA-815B-F1CA81478050}"/>
               </a:ext>
             </a:extLst>
           </p:cNvPr>
@@ -11522,7 +11355,7 @@
           <p:cNvPr id="42" name="Straight Connector 41">
             <a:extLst>
               <a:ext uri="{FF2B5EF4-FFF2-40B4-BE49-F238E27FC236}">
-                <a16:creationId xmlns:a16="http://schemas.microsoft.com/office/drawing/2014/main" id="{D0C46F97-5A45-4912-8668-D6F740F3AC2D}"/>
+                <a16:creationId xmlns:a16="http://schemas.microsoft.com/office/drawing/2014/main" xmlns="" id="{D0C46F97-5A45-4912-8668-D6F740F3AC2D}"/>
               </a:ext>
             </a:extLst>
           </p:cNvPr>
@@ -11565,7 +11398,7 @@
           <p:cNvPr id="43" name="Straight Connector 42">
             <a:extLst>
               <a:ext uri="{FF2B5EF4-FFF2-40B4-BE49-F238E27FC236}">
-                <a16:creationId xmlns:a16="http://schemas.microsoft.com/office/drawing/2014/main" id="{CA51F4EE-8FF8-4728-9A35-9D2E097343E4}"/>
+                <a16:creationId xmlns:a16="http://schemas.microsoft.com/office/drawing/2014/main" xmlns="" id="{CA51F4EE-8FF8-4728-9A35-9D2E097343E4}"/>
               </a:ext>
             </a:extLst>
           </p:cNvPr>
@@ -11608,7 +11441,7 @@
           <p:cNvPr id="44" name="Straight Connector 43">
             <a:extLst>
               <a:ext uri="{FF2B5EF4-FFF2-40B4-BE49-F238E27FC236}">
-                <a16:creationId xmlns:a16="http://schemas.microsoft.com/office/drawing/2014/main" id="{71AB6C10-4275-4BA8-AAE1-FED065357649}"/>
+                <a16:creationId xmlns:a16="http://schemas.microsoft.com/office/drawing/2014/main" xmlns="" id="{71AB6C10-4275-4BA8-AAE1-FED065357649}"/>
               </a:ext>
             </a:extLst>
           </p:cNvPr>
@@ -11651,7 +11484,7 @@
           <p:cNvPr id="45" name="Straight Connector 44">
             <a:extLst>
               <a:ext uri="{FF2B5EF4-FFF2-40B4-BE49-F238E27FC236}">
-                <a16:creationId xmlns:a16="http://schemas.microsoft.com/office/drawing/2014/main" id="{73A6F2F8-3FBC-4687-85A7-56D08C0A8BE5}"/>
+                <a16:creationId xmlns:a16="http://schemas.microsoft.com/office/drawing/2014/main" xmlns="" id="{73A6F2F8-3FBC-4687-85A7-56D08C0A8BE5}"/>
               </a:ext>
             </a:extLst>
           </p:cNvPr>
@@ -11694,7 +11527,7 @@
           <p:cNvPr id="46" name="Straight Connector 45">
             <a:extLst>
               <a:ext uri="{FF2B5EF4-FFF2-40B4-BE49-F238E27FC236}">
-                <a16:creationId xmlns:a16="http://schemas.microsoft.com/office/drawing/2014/main" id="{E3DDF748-D1B7-4409-9296-46813E9762DC}"/>
+                <a16:creationId xmlns:a16="http://schemas.microsoft.com/office/drawing/2014/main" xmlns="" id="{E3DDF748-D1B7-4409-9296-46813E9762DC}"/>
               </a:ext>
             </a:extLst>
           </p:cNvPr>
@@ -11737,7 +11570,7 @@
           <p:cNvPr id="47" name="Straight Connector 46">
             <a:extLst>
               <a:ext uri="{FF2B5EF4-FFF2-40B4-BE49-F238E27FC236}">
-                <a16:creationId xmlns:a16="http://schemas.microsoft.com/office/drawing/2014/main" id="{10FF3A0F-671E-45D9-9F15-907829AC502B}"/>
+                <a16:creationId xmlns:a16="http://schemas.microsoft.com/office/drawing/2014/main" xmlns="" id="{10FF3A0F-671E-45D9-9F15-907829AC502B}"/>
               </a:ext>
             </a:extLst>
           </p:cNvPr>
@@ -11780,7 +11613,7 @@
           <p:cNvPr id="48" name="Straight Connector 47">
             <a:extLst>
               <a:ext uri="{FF2B5EF4-FFF2-40B4-BE49-F238E27FC236}">
-                <a16:creationId xmlns:a16="http://schemas.microsoft.com/office/drawing/2014/main" id="{FE04D75D-2D4E-4C5F-B74D-78A847C38425}"/>
+                <a16:creationId xmlns:a16="http://schemas.microsoft.com/office/drawing/2014/main" xmlns="" id="{FE04D75D-2D4E-4C5F-B74D-78A847C38425}"/>
               </a:ext>
             </a:extLst>
           </p:cNvPr>
@@ -11823,7 +11656,7 @@
           <p:cNvPr id="49" name="Straight Connector 48">
             <a:extLst>
               <a:ext uri="{FF2B5EF4-FFF2-40B4-BE49-F238E27FC236}">
-                <a16:creationId xmlns:a16="http://schemas.microsoft.com/office/drawing/2014/main" id="{5A6E5047-4215-48A1-8091-74EBD4982E36}"/>
+                <a16:creationId xmlns:a16="http://schemas.microsoft.com/office/drawing/2014/main" xmlns="" id="{5A6E5047-4215-48A1-8091-74EBD4982E36}"/>
               </a:ext>
             </a:extLst>
           </p:cNvPr>
@@ -11866,7 +11699,7 @@
           <p:cNvPr id="50" name="Straight Connector 49">
             <a:extLst>
               <a:ext uri="{FF2B5EF4-FFF2-40B4-BE49-F238E27FC236}">
-                <a16:creationId xmlns:a16="http://schemas.microsoft.com/office/drawing/2014/main" id="{05B160B6-0970-416D-BCF8-7C54D7B4BDF0}"/>
+                <a16:creationId xmlns:a16="http://schemas.microsoft.com/office/drawing/2014/main" xmlns="" id="{05B160B6-0970-416D-BCF8-7C54D7B4BDF0}"/>
               </a:ext>
             </a:extLst>
           </p:cNvPr>
@@ -11909,7 +11742,7 @@
           <p:cNvPr id="51" name="Straight Connector 50">
             <a:extLst>
               <a:ext uri="{FF2B5EF4-FFF2-40B4-BE49-F238E27FC236}">
-                <a16:creationId xmlns:a16="http://schemas.microsoft.com/office/drawing/2014/main" id="{8AE4BBE4-0FCF-443D-B81C-E63DB503586E}"/>
+                <a16:creationId xmlns:a16="http://schemas.microsoft.com/office/drawing/2014/main" xmlns="" id="{8AE4BBE4-0FCF-443D-B81C-E63DB503586E}"/>
               </a:ext>
             </a:extLst>
           </p:cNvPr>
@@ -11952,7 +11785,7 @@
           <p:cNvPr id="4" name="Straight Connector 3">
             <a:extLst>
               <a:ext uri="{FF2B5EF4-FFF2-40B4-BE49-F238E27FC236}">
-                <a16:creationId xmlns:a16="http://schemas.microsoft.com/office/drawing/2014/main" id="{8D0BE50F-C5FA-46A1-A121-D5128A1A88B1}"/>
+                <a16:creationId xmlns:a16="http://schemas.microsoft.com/office/drawing/2014/main" xmlns="" id="{8D0BE50F-C5FA-46A1-A121-D5128A1A88B1}"/>
               </a:ext>
             </a:extLst>
           </p:cNvPr>
@@ -11991,13 +11824,20 @@
     </p:spTree>
     <p:extLst>
       <p:ext uri="{BB962C8B-B14F-4D97-AF65-F5344CB8AC3E}">
-        <p14:creationId xmlns:p14="http://schemas.microsoft.com/office/powerpoint/2010/main" val="494433214"/>
+        <p14:creationId xmlns:p14="http://schemas.microsoft.com/office/powerpoint/2010/main" xmlns="" val="494433214"/>
       </p:ext>
     </p:extLst>
   </p:cSld>
   <p:clrMapOvr>
     <a:masterClrMapping/>
   </p:clrMapOvr>
+  <p:timing>
+    <p:tnLst>
+      <p:par>
+        <p:cTn id="1" dur="indefinite" restart="never" nodeType="tmRoot"/>
+      </p:par>
+    </p:tnLst>
+  </p:timing>
 </p:sld>
 </file>
 
@@ -12044,7 +11884,7 @@
     </a:clrScheme>
     <a:fontScheme name="Office Theme">
       <a:majorFont>
-        <a:latin typeface="Calibri Light" panose="020F0302020204030204"/>
+        <a:latin typeface="Calibri Light"/>
         <a:ea typeface=""/>
         <a:cs typeface=""/>
         <a:font script="Jpan" typeface="游ゴシック Light"/>
@@ -12079,7 +11919,7 @@
         <a:font script="Geor" typeface="Sylfaen"/>
       </a:majorFont>
       <a:minorFont>
-        <a:latin typeface="Calibri" panose="020F0502020204030204"/>
+        <a:latin typeface="Calibri"/>
         <a:ea typeface=""/>
         <a:cs typeface=""/>
         <a:font script="Jpan" typeface="游ゴシック"/>
@@ -12256,7 +12096,7 @@
   <a:extraClrSchemeLst/>
   <a:extLst>
     <a:ext uri="{05A4C25C-085E-4340-85A3-A5531E510DB2}">
-      <thm15:themeFamily xmlns:thm15="http://schemas.microsoft.com/office/thememl/2012/main" name="Office Theme" id="{62F939B6-93AF-4DB8-9C6B-D6C7DFDC589F}" vid="{4A3C46E8-61CC-4603-A589-7422A47A8E4A}"/>
+      <thm15:themeFamily xmlns:thm15="http://schemas.microsoft.com/office/thememl/2012/main" xmlns="" name="Office Theme" id="{62F939B6-93AF-4DB8-9C6B-D6C7DFDC589F}" vid="{4A3C46E8-61CC-4603-A589-7422A47A8E4A}"/>
     </a:ext>
   </a:extLst>
 </a:theme>

</xml_diff>

<commit_message>
car racing part finalized
</commit_message>
<xml_diff>
--- a/design/01_racing/PPT.pptx
+++ b/design/01_racing/PPT.pptx
@@ -11023,12 +11023,322 @@
           </p:txBody>
         </p:sp>
       </p:grpSp>
+      <p:cxnSp>
+        <p:nvCxnSpPr>
+          <p:cNvPr id="260" name="Straight Connector 259">
+            <a:extLst>
+              <a:ext uri="{FF2B5EF4-FFF2-40B4-BE49-F238E27FC236}">
+                <a16:creationId xmlns:a16="http://schemas.microsoft.com/office/drawing/2014/main" id="{24CE8451-58D3-4D84-B7EA-E363E3461089}"/>
+              </a:ext>
+            </a:extLst>
+          </p:cNvPr>
+          <p:cNvCxnSpPr>
+            <a:cxnSpLocks/>
+          </p:cNvCxnSpPr>
+          <p:nvPr/>
+        </p:nvCxnSpPr>
+        <p:spPr>
+          <a:xfrm>
+            <a:off x="3250312" y="6144703"/>
+            <a:ext cx="448818" cy="0"/>
+          </a:xfrm>
+          <a:prstGeom prst="line">
+            <a:avLst/>
+          </a:prstGeom>
+          <a:ln w="57150">
+            <a:solidFill>
+              <a:schemeClr val="bg1"/>
+            </a:solidFill>
+          </a:ln>
+        </p:spPr>
+        <p:style>
+          <a:lnRef idx="1">
+            <a:schemeClr val="accent1"/>
+          </a:lnRef>
+          <a:fillRef idx="0">
+            <a:schemeClr val="accent1"/>
+          </a:fillRef>
+          <a:effectRef idx="0">
+            <a:schemeClr val="accent1"/>
+          </a:effectRef>
+          <a:fontRef idx="minor">
+            <a:schemeClr val="tx1"/>
+          </a:fontRef>
+        </p:style>
+      </p:cxnSp>
+      <p:cxnSp>
+        <p:nvCxnSpPr>
+          <p:cNvPr id="261" name="Straight Connector 260">
+            <a:extLst>
+              <a:ext uri="{FF2B5EF4-FFF2-40B4-BE49-F238E27FC236}">
+                <a16:creationId xmlns:a16="http://schemas.microsoft.com/office/drawing/2014/main" id="{695912F7-2715-45B0-A800-B093938B3A75}"/>
+              </a:ext>
+            </a:extLst>
+          </p:cNvPr>
+          <p:cNvCxnSpPr>
+            <a:cxnSpLocks/>
+          </p:cNvCxnSpPr>
+          <p:nvPr/>
+        </p:nvCxnSpPr>
+        <p:spPr>
+          <a:xfrm>
+            <a:off x="3276584" y="5130453"/>
+            <a:ext cx="448818" cy="0"/>
+          </a:xfrm>
+          <a:prstGeom prst="line">
+            <a:avLst/>
+          </a:prstGeom>
+          <a:ln w="57150">
+            <a:solidFill>
+              <a:schemeClr val="bg1"/>
+            </a:solidFill>
+          </a:ln>
+        </p:spPr>
+        <p:style>
+          <a:lnRef idx="1">
+            <a:schemeClr val="accent1"/>
+          </a:lnRef>
+          <a:fillRef idx="0">
+            <a:schemeClr val="accent1"/>
+          </a:fillRef>
+          <a:effectRef idx="0">
+            <a:schemeClr val="accent1"/>
+          </a:effectRef>
+          <a:fontRef idx="minor">
+            <a:schemeClr val="tx1"/>
+          </a:fontRef>
+        </p:style>
+      </p:cxnSp>
+      <p:cxnSp>
+        <p:nvCxnSpPr>
+          <p:cNvPr id="267" name="Straight Connector 266">
+            <a:extLst>
+              <a:ext uri="{FF2B5EF4-FFF2-40B4-BE49-F238E27FC236}">
+                <a16:creationId xmlns:a16="http://schemas.microsoft.com/office/drawing/2014/main" id="{803D84DB-BFA8-49AA-8215-5C4F46E84B7B}"/>
+              </a:ext>
+            </a:extLst>
+          </p:cNvPr>
+          <p:cNvCxnSpPr>
+            <a:cxnSpLocks/>
+          </p:cNvCxnSpPr>
+          <p:nvPr/>
+        </p:nvCxnSpPr>
+        <p:spPr>
+          <a:xfrm>
+            <a:off x="3276584" y="4152997"/>
+            <a:ext cx="448818" cy="0"/>
+          </a:xfrm>
+          <a:prstGeom prst="line">
+            <a:avLst/>
+          </a:prstGeom>
+          <a:ln w="57150">
+            <a:solidFill>
+              <a:schemeClr val="bg1"/>
+            </a:solidFill>
+          </a:ln>
+        </p:spPr>
+        <p:style>
+          <a:lnRef idx="1">
+            <a:schemeClr val="accent1"/>
+          </a:lnRef>
+          <a:fillRef idx="0">
+            <a:schemeClr val="accent1"/>
+          </a:fillRef>
+          <a:effectRef idx="0">
+            <a:schemeClr val="accent1"/>
+          </a:effectRef>
+          <a:fontRef idx="minor">
+            <a:schemeClr val="tx1"/>
+          </a:fontRef>
+        </p:style>
+      </p:cxnSp>
+      <p:cxnSp>
+        <p:nvCxnSpPr>
+          <p:cNvPr id="272" name="Straight Connector 271">
+            <a:extLst>
+              <a:ext uri="{FF2B5EF4-FFF2-40B4-BE49-F238E27FC236}">
+                <a16:creationId xmlns:a16="http://schemas.microsoft.com/office/drawing/2014/main" id="{5DB41577-15A3-4094-B1D8-8E1A50077F7F}"/>
+              </a:ext>
+            </a:extLst>
+          </p:cNvPr>
+          <p:cNvCxnSpPr>
+            <a:cxnSpLocks/>
+          </p:cNvCxnSpPr>
+          <p:nvPr/>
+        </p:nvCxnSpPr>
+        <p:spPr>
+          <a:xfrm>
+            <a:off x="3276584" y="3128236"/>
+            <a:ext cx="448818" cy="0"/>
+          </a:xfrm>
+          <a:prstGeom prst="line">
+            <a:avLst/>
+          </a:prstGeom>
+          <a:ln w="57150">
+            <a:solidFill>
+              <a:schemeClr val="bg1"/>
+            </a:solidFill>
+          </a:ln>
+        </p:spPr>
+        <p:style>
+          <a:lnRef idx="1">
+            <a:schemeClr val="accent1"/>
+          </a:lnRef>
+          <a:fillRef idx="0">
+            <a:schemeClr val="accent1"/>
+          </a:fillRef>
+          <a:effectRef idx="0">
+            <a:schemeClr val="accent1"/>
+          </a:effectRef>
+          <a:fontRef idx="minor">
+            <a:schemeClr val="tx1"/>
+          </a:fontRef>
+        </p:style>
+      </p:cxnSp>
+      <p:cxnSp>
+        <p:nvCxnSpPr>
+          <p:cNvPr id="277" name="Straight Connector 276">
+            <a:extLst>
+              <a:ext uri="{FF2B5EF4-FFF2-40B4-BE49-F238E27FC236}">
+                <a16:creationId xmlns:a16="http://schemas.microsoft.com/office/drawing/2014/main" id="{332F03B7-4A14-4C75-B4CA-DD1FBE43595E}"/>
+              </a:ext>
+            </a:extLst>
+          </p:cNvPr>
+          <p:cNvCxnSpPr>
+            <a:cxnSpLocks/>
+          </p:cNvCxnSpPr>
+          <p:nvPr/>
+        </p:nvCxnSpPr>
+        <p:spPr>
+          <a:xfrm>
+            <a:off x="3292350" y="2087713"/>
+            <a:ext cx="448818" cy="0"/>
+          </a:xfrm>
+          <a:prstGeom prst="line">
+            <a:avLst/>
+          </a:prstGeom>
+          <a:ln w="57150">
+            <a:solidFill>
+              <a:schemeClr val="bg1"/>
+            </a:solidFill>
+          </a:ln>
+        </p:spPr>
+        <p:style>
+          <a:lnRef idx="1">
+            <a:schemeClr val="accent1"/>
+          </a:lnRef>
+          <a:fillRef idx="0">
+            <a:schemeClr val="accent1"/>
+          </a:fillRef>
+          <a:effectRef idx="0">
+            <a:schemeClr val="accent1"/>
+          </a:effectRef>
+          <a:fontRef idx="minor">
+            <a:schemeClr val="tx1"/>
+          </a:fontRef>
+        </p:style>
+      </p:cxnSp>
+      <p:cxnSp>
+        <p:nvCxnSpPr>
+          <p:cNvPr id="240" name="Straight Connector 239">
+            <a:extLst>
+              <a:ext uri="{FF2B5EF4-FFF2-40B4-BE49-F238E27FC236}">
+                <a16:creationId xmlns:a16="http://schemas.microsoft.com/office/drawing/2014/main" id="{89B791F0-4A31-40AC-93DB-0621025D22C7}"/>
+              </a:ext>
+            </a:extLst>
+          </p:cNvPr>
+          <p:cNvCxnSpPr>
+            <a:cxnSpLocks/>
+          </p:cNvCxnSpPr>
+          <p:nvPr/>
+        </p:nvCxnSpPr>
+        <p:spPr>
+          <a:xfrm>
+            <a:off x="3546943" y="1628031"/>
+            <a:ext cx="23790" cy="5041904"/>
+          </a:xfrm>
+          <a:prstGeom prst="line">
+            <a:avLst/>
+          </a:prstGeom>
+          <a:ln w="19050">
+            <a:solidFill>
+              <a:schemeClr val="bg1">
+                <a:lumMod val="50000"/>
+              </a:schemeClr>
+            </a:solidFill>
+            <a:prstDash val="dash"/>
+          </a:ln>
+        </p:spPr>
+        <p:style>
+          <a:lnRef idx="1">
+            <a:schemeClr val="accent1"/>
+          </a:lnRef>
+          <a:fillRef idx="0">
+            <a:schemeClr val="accent1"/>
+          </a:fillRef>
+          <a:effectRef idx="0">
+            <a:schemeClr val="accent1"/>
+          </a:effectRef>
+          <a:fontRef idx="minor">
+            <a:schemeClr val="tx1"/>
+          </a:fontRef>
+        </p:style>
+      </p:cxnSp>
+      <p:sp>
+        <p:nvSpPr>
+          <p:cNvPr id="244" name="TextBox 243">
+            <a:extLst>
+              <a:ext uri="{FF2B5EF4-FFF2-40B4-BE49-F238E27FC236}">
+                <a16:creationId xmlns:a16="http://schemas.microsoft.com/office/drawing/2014/main" id="{E1C8533C-F754-4E65-AFBC-AAE0A6E8AE20}"/>
+              </a:ext>
+            </a:extLst>
+          </p:cNvPr>
+          <p:cNvSpPr txBox="1"/>
+          <p:nvPr/>
+        </p:nvSpPr>
+        <p:spPr>
+          <a:xfrm rot="5400000">
+            <a:off x="1311978" y="3952401"/>
+            <a:ext cx="5028283" cy="376163"/>
+          </a:xfrm>
+          <a:prstGeom prst="rect">
+            <a:avLst/>
+          </a:prstGeom>
+          <a:solidFill>
+            <a:srgbClr val="00B050"/>
+          </a:solidFill>
+          <a:ln>
+            <a:solidFill>
+              <a:srgbClr val="00B050"/>
+            </a:solidFill>
+          </a:ln>
+        </p:spPr>
+        <p:txBody>
+          <a:bodyPr wrap="square" rtlCol="0">
+            <a:spAutoFit/>
+          </a:bodyPr>
+          <a:lstStyle/>
+          <a:p>
+            <a:pPr algn="ctr"/>
+            <a:r>
+              <a:rPr lang="en-US" b="1" dirty="0">
+                <a:solidFill>
+                  <a:schemeClr val="bg1">
+                    <a:lumMod val="95000"/>
+                  </a:schemeClr>
+                </a:solidFill>
+              </a:rPr>
+              <a:t>START</a:t>
+            </a:r>
+          </a:p>
+        </p:txBody>
+      </p:sp>
       <p:grpSp>
         <p:nvGrpSpPr>
-          <p:cNvPr id="18" name="Group 17">
+          <p:cNvPr id="6" name="Group 5">
             <a:extLst>
               <a:ext uri="{FF2B5EF4-FFF2-40B4-BE49-F238E27FC236}">
-                <a16:creationId xmlns:a16="http://schemas.microsoft.com/office/drawing/2014/main" id="{4DCCBB12-9C09-48C8-A58F-22F865635324}"/>
+                <a16:creationId xmlns:a16="http://schemas.microsoft.com/office/drawing/2014/main" id="{E97FA060-F8F1-4726-A7EA-3C5E7F0F327D}"/>
               </a:ext>
             </a:extLst>
           </p:cNvPr>
@@ -11037,10 +11347,10 @@
         </p:nvGrpSpPr>
         <p:grpSpPr>
           <a:xfrm>
-            <a:off x="12842550" y="160338"/>
-            <a:ext cx="1433757" cy="1354607"/>
-            <a:chOff x="12842550" y="677822"/>
-            <a:chExt cx="908563" cy="908563"/>
+            <a:off x="12842550" y="55880"/>
+            <a:ext cx="1433757" cy="1459065"/>
+            <a:chOff x="12842550" y="55880"/>
+            <a:chExt cx="1433757" cy="1459065"/>
           </a:xfrm>
         </p:grpSpPr>
         <p:pic>
@@ -11093,8 +11403,8 @@
           </p:blipFill>
           <p:spPr>
             <a:xfrm>
-              <a:off x="12842550" y="677822"/>
-              <a:ext cx="908563" cy="908563"/>
+              <a:off x="12842550" y="55880"/>
+              <a:ext cx="1433757" cy="1459065"/>
             </a:xfrm>
             <a:prstGeom prst="rect">
               <a:avLst/>
@@ -11122,8 +11432,8 @@
           </p:nvSpPr>
           <p:spPr>
             <a:xfrm>
-              <a:off x="13056124" y="761720"/>
-              <a:ext cx="455965" cy="485322"/>
+              <a:off x="13179580" y="218440"/>
+              <a:ext cx="739620" cy="769999"/>
             </a:xfrm>
             <a:prstGeom prst="ellipse">
               <a:avLst/>
@@ -11168,10 +11478,10 @@
         </p:sp>
         <p:sp>
           <p:nvSpPr>
-            <p:cNvPr id="259" name="TextBox 258">
-              <a:extLst>
-                <a:ext uri="{FF2B5EF4-FFF2-40B4-BE49-F238E27FC236}">
-                  <a16:creationId xmlns:a16="http://schemas.microsoft.com/office/drawing/2014/main" id="{F6990F67-AA13-4D9C-9B62-DE8FA9F44FA6}"/>
+            <p:cNvPr id="248" name="TextBox 247">
+              <a:extLst>
+                <a:ext uri="{FF2B5EF4-FFF2-40B4-BE49-F238E27FC236}">
+                  <a16:creationId xmlns:a16="http://schemas.microsoft.com/office/drawing/2014/main" id="{F0C531A4-D032-4D28-B2A9-54640591CEA9}"/>
                 </a:ext>
               </a:extLst>
             </p:cNvPr>
@@ -11180,8 +11490,8 @@
           </p:nvSpPr>
           <p:spPr>
             <a:xfrm>
-              <a:off x="12904053" y="794399"/>
-              <a:ext cx="776929" cy="433508"/>
+              <a:off x="12939605" y="286143"/>
+              <a:ext cx="1226032" cy="672607"/>
             </a:xfrm>
             <a:prstGeom prst="rect">
               <a:avLst/>
@@ -11224,316 +11534,6 @@
           </p:txBody>
         </p:sp>
       </p:grpSp>
-      <p:cxnSp>
-        <p:nvCxnSpPr>
-          <p:cNvPr id="260" name="Straight Connector 259">
-            <a:extLst>
-              <a:ext uri="{FF2B5EF4-FFF2-40B4-BE49-F238E27FC236}">
-                <a16:creationId xmlns:a16="http://schemas.microsoft.com/office/drawing/2014/main" id="{24CE8451-58D3-4D84-B7EA-E363E3461089}"/>
-              </a:ext>
-            </a:extLst>
-          </p:cNvPr>
-          <p:cNvCxnSpPr>
-            <a:cxnSpLocks/>
-          </p:cNvCxnSpPr>
-          <p:nvPr/>
-        </p:nvCxnSpPr>
-        <p:spPr>
-          <a:xfrm>
-            <a:off x="3559233" y="6144703"/>
-            <a:ext cx="448818" cy="0"/>
-          </a:xfrm>
-          <a:prstGeom prst="line">
-            <a:avLst/>
-          </a:prstGeom>
-          <a:ln w="57150">
-            <a:solidFill>
-              <a:schemeClr val="bg1"/>
-            </a:solidFill>
-          </a:ln>
-        </p:spPr>
-        <p:style>
-          <a:lnRef idx="1">
-            <a:schemeClr val="accent1"/>
-          </a:lnRef>
-          <a:fillRef idx="0">
-            <a:schemeClr val="accent1"/>
-          </a:fillRef>
-          <a:effectRef idx="0">
-            <a:schemeClr val="accent1"/>
-          </a:effectRef>
-          <a:fontRef idx="minor">
-            <a:schemeClr val="tx1"/>
-          </a:fontRef>
-        </p:style>
-      </p:cxnSp>
-      <p:cxnSp>
-        <p:nvCxnSpPr>
-          <p:cNvPr id="261" name="Straight Connector 260">
-            <a:extLst>
-              <a:ext uri="{FF2B5EF4-FFF2-40B4-BE49-F238E27FC236}">
-                <a16:creationId xmlns:a16="http://schemas.microsoft.com/office/drawing/2014/main" id="{695912F7-2715-45B0-A800-B093938B3A75}"/>
-              </a:ext>
-            </a:extLst>
-          </p:cNvPr>
-          <p:cNvCxnSpPr>
-            <a:cxnSpLocks/>
-          </p:cNvCxnSpPr>
-          <p:nvPr/>
-        </p:nvCxnSpPr>
-        <p:spPr>
-          <a:xfrm>
-            <a:off x="3585505" y="5130453"/>
-            <a:ext cx="448818" cy="0"/>
-          </a:xfrm>
-          <a:prstGeom prst="line">
-            <a:avLst/>
-          </a:prstGeom>
-          <a:ln w="57150">
-            <a:solidFill>
-              <a:schemeClr val="bg1"/>
-            </a:solidFill>
-          </a:ln>
-        </p:spPr>
-        <p:style>
-          <a:lnRef idx="1">
-            <a:schemeClr val="accent1"/>
-          </a:lnRef>
-          <a:fillRef idx="0">
-            <a:schemeClr val="accent1"/>
-          </a:fillRef>
-          <a:effectRef idx="0">
-            <a:schemeClr val="accent1"/>
-          </a:effectRef>
-          <a:fontRef idx="minor">
-            <a:schemeClr val="tx1"/>
-          </a:fontRef>
-        </p:style>
-      </p:cxnSp>
-      <p:cxnSp>
-        <p:nvCxnSpPr>
-          <p:cNvPr id="267" name="Straight Connector 266">
-            <a:extLst>
-              <a:ext uri="{FF2B5EF4-FFF2-40B4-BE49-F238E27FC236}">
-                <a16:creationId xmlns:a16="http://schemas.microsoft.com/office/drawing/2014/main" id="{803D84DB-BFA8-49AA-8215-5C4F46E84B7B}"/>
-              </a:ext>
-            </a:extLst>
-          </p:cNvPr>
-          <p:cNvCxnSpPr>
-            <a:cxnSpLocks/>
-          </p:cNvCxnSpPr>
-          <p:nvPr/>
-        </p:nvCxnSpPr>
-        <p:spPr>
-          <a:xfrm>
-            <a:off x="3585505" y="4152997"/>
-            <a:ext cx="448818" cy="0"/>
-          </a:xfrm>
-          <a:prstGeom prst="line">
-            <a:avLst/>
-          </a:prstGeom>
-          <a:ln w="57150">
-            <a:solidFill>
-              <a:schemeClr val="bg1"/>
-            </a:solidFill>
-          </a:ln>
-        </p:spPr>
-        <p:style>
-          <a:lnRef idx="1">
-            <a:schemeClr val="accent1"/>
-          </a:lnRef>
-          <a:fillRef idx="0">
-            <a:schemeClr val="accent1"/>
-          </a:fillRef>
-          <a:effectRef idx="0">
-            <a:schemeClr val="accent1"/>
-          </a:effectRef>
-          <a:fontRef idx="minor">
-            <a:schemeClr val="tx1"/>
-          </a:fontRef>
-        </p:style>
-      </p:cxnSp>
-      <p:cxnSp>
-        <p:nvCxnSpPr>
-          <p:cNvPr id="272" name="Straight Connector 271">
-            <a:extLst>
-              <a:ext uri="{FF2B5EF4-FFF2-40B4-BE49-F238E27FC236}">
-                <a16:creationId xmlns:a16="http://schemas.microsoft.com/office/drawing/2014/main" id="{5DB41577-15A3-4094-B1D8-8E1A50077F7F}"/>
-              </a:ext>
-            </a:extLst>
-          </p:cNvPr>
-          <p:cNvCxnSpPr>
-            <a:cxnSpLocks/>
-          </p:cNvCxnSpPr>
-          <p:nvPr/>
-        </p:nvCxnSpPr>
-        <p:spPr>
-          <a:xfrm>
-            <a:off x="3585505" y="3128236"/>
-            <a:ext cx="448818" cy="0"/>
-          </a:xfrm>
-          <a:prstGeom prst="line">
-            <a:avLst/>
-          </a:prstGeom>
-          <a:ln w="57150">
-            <a:solidFill>
-              <a:schemeClr val="bg1"/>
-            </a:solidFill>
-          </a:ln>
-        </p:spPr>
-        <p:style>
-          <a:lnRef idx="1">
-            <a:schemeClr val="accent1"/>
-          </a:lnRef>
-          <a:fillRef idx="0">
-            <a:schemeClr val="accent1"/>
-          </a:fillRef>
-          <a:effectRef idx="0">
-            <a:schemeClr val="accent1"/>
-          </a:effectRef>
-          <a:fontRef idx="minor">
-            <a:schemeClr val="tx1"/>
-          </a:fontRef>
-        </p:style>
-      </p:cxnSp>
-      <p:cxnSp>
-        <p:nvCxnSpPr>
-          <p:cNvPr id="277" name="Straight Connector 276">
-            <a:extLst>
-              <a:ext uri="{FF2B5EF4-FFF2-40B4-BE49-F238E27FC236}">
-                <a16:creationId xmlns:a16="http://schemas.microsoft.com/office/drawing/2014/main" id="{332F03B7-4A14-4C75-B4CA-DD1FBE43595E}"/>
-              </a:ext>
-            </a:extLst>
-          </p:cNvPr>
-          <p:cNvCxnSpPr>
-            <a:cxnSpLocks/>
-          </p:cNvCxnSpPr>
-          <p:nvPr/>
-        </p:nvCxnSpPr>
-        <p:spPr>
-          <a:xfrm>
-            <a:off x="3601271" y="2087713"/>
-            <a:ext cx="448818" cy="0"/>
-          </a:xfrm>
-          <a:prstGeom prst="line">
-            <a:avLst/>
-          </a:prstGeom>
-          <a:ln w="57150">
-            <a:solidFill>
-              <a:schemeClr val="bg1"/>
-            </a:solidFill>
-          </a:ln>
-        </p:spPr>
-        <p:style>
-          <a:lnRef idx="1">
-            <a:schemeClr val="accent1"/>
-          </a:lnRef>
-          <a:fillRef idx="0">
-            <a:schemeClr val="accent1"/>
-          </a:fillRef>
-          <a:effectRef idx="0">
-            <a:schemeClr val="accent1"/>
-          </a:effectRef>
-          <a:fontRef idx="minor">
-            <a:schemeClr val="tx1"/>
-          </a:fontRef>
-        </p:style>
-      </p:cxnSp>
-      <p:cxnSp>
-        <p:nvCxnSpPr>
-          <p:cNvPr id="282" name="Straight Connector 281">
-            <a:extLst>
-              <a:ext uri="{FF2B5EF4-FFF2-40B4-BE49-F238E27FC236}">
-                <a16:creationId xmlns:a16="http://schemas.microsoft.com/office/drawing/2014/main" id="{99A5544F-29FE-414E-984B-6606132BDB47}"/>
-              </a:ext>
-            </a:extLst>
-          </p:cNvPr>
-          <p:cNvCxnSpPr>
-            <a:cxnSpLocks/>
-          </p:cNvCxnSpPr>
-          <p:nvPr/>
-        </p:nvCxnSpPr>
-        <p:spPr>
-          <a:xfrm>
-            <a:off x="3855864" y="1628031"/>
-            <a:ext cx="23790" cy="5041904"/>
-          </a:xfrm>
-          <a:prstGeom prst="line">
-            <a:avLst/>
-          </a:prstGeom>
-          <a:ln w="19050">
-            <a:solidFill>
-              <a:schemeClr val="bg1">
-                <a:lumMod val="50000"/>
-              </a:schemeClr>
-            </a:solidFill>
-            <a:prstDash val="dash"/>
-          </a:ln>
-        </p:spPr>
-        <p:style>
-          <a:lnRef idx="1">
-            <a:schemeClr val="accent1"/>
-          </a:lnRef>
-          <a:fillRef idx="0">
-            <a:schemeClr val="accent1"/>
-          </a:fillRef>
-          <a:effectRef idx="0">
-            <a:schemeClr val="accent1"/>
-          </a:effectRef>
-          <a:fontRef idx="minor">
-            <a:schemeClr val="tx1"/>
-          </a:fontRef>
-        </p:style>
-      </p:cxnSp>
-      <p:sp>
-        <p:nvSpPr>
-          <p:cNvPr id="287" name="TextBox 286">
-            <a:extLst>
-              <a:ext uri="{FF2B5EF4-FFF2-40B4-BE49-F238E27FC236}">
-                <a16:creationId xmlns:a16="http://schemas.microsoft.com/office/drawing/2014/main" id="{C9AEA044-49AC-4D21-9494-F8B9F2266A6F}"/>
-              </a:ext>
-            </a:extLst>
-          </p:cNvPr>
-          <p:cNvSpPr txBox="1"/>
-          <p:nvPr/>
-        </p:nvSpPr>
-        <p:spPr>
-          <a:xfrm rot="5400000">
-            <a:off x="1620899" y="3952401"/>
-            <a:ext cx="5028283" cy="376163"/>
-          </a:xfrm>
-          <a:prstGeom prst="rect">
-            <a:avLst/>
-          </a:prstGeom>
-          <a:solidFill>
-            <a:srgbClr val="00B050"/>
-          </a:solidFill>
-          <a:ln>
-            <a:solidFill>
-              <a:srgbClr val="00B050"/>
-            </a:solidFill>
-          </a:ln>
-        </p:spPr>
-        <p:txBody>
-          <a:bodyPr wrap="square" rtlCol="0">
-            <a:spAutoFit/>
-          </a:bodyPr>
-          <a:lstStyle/>
-          <a:p>
-            <a:pPr algn="ctr"/>
-            <a:r>
-              <a:rPr lang="en-US" b="1" dirty="0">
-                <a:solidFill>
-                  <a:schemeClr val="bg1">
-                    <a:lumMod val="95000"/>
-                  </a:schemeClr>
-                </a:solidFill>
-              </a:rPr>
-              <a:t>START</a:t>
-            </a:r>
-          </a:p>
-        </p:txBody>
-      </p:sp>
       <p:grpSp>
         <p:nvGrpSpPr>
           <p:cNvPr id="233" name="Car Visa mastercard"/>
@@ -11542,7 +11542,7 @@
         </p:nvGrpSpPr>
         <p:grpSpPr>
           <a:xfrm>
-            <a:off x="2418455" y="4430168"/>
+            <a:off x="2109534" y="4430168"/>
             <a:ext cx="1507594" cy="1409677"/>
             <a:chOff x="2418455" y="4430168"/>
             <a:chExt cx="1507594" cy="1409677"/>
@@ -11639,7 +11639,7 @@
         </p:nvGrpSpPr>
         <p:grpSpPr>
           <a:xfrm>
-            <a:off x="2393055" y="3426868"/>
+            <a:off x="2084134" y="3426868"/>
             <a:ext cx="1507594" cy="1409677"/>
             <a:chOff x="2393055" y="3426868"/>
             <a:chExt cx="1507594" cy="1409677"/>
@@ -11747,7 +11747,7 @@
         </p:nvGrpSpPr>
         <p:grpSpPr>
           <a:xfrm>
-            <a:off x="2393055" y="2436268"/>
+            <a:off x="2084134" y="2436268"/>
             <a:ext cx="1507594" cy="1409677"/>
             <a:chOff x="2393055" y="2436268"/>
             <a:chExt cx="1507594" cy="1409677"/>
@@ -11856,8 +11856,8 @@
         </p:nvGrpSpPr>
         <p:grpSpPr>
           <a:xfrm>
-            <a:off x="2415400" y="5385012"/>
-            <a:ext cx="1437694" cy="1499870"/>
+            <a:off x="2157903" y="5385012"/>
+            <a:ext cx="1410653" cy="1499870"/>
             <a:chOff x="2415400" y="5385012"/>
             <a:chExt cx="1437694" cy="1499870"/>
           </a:xfrm>
@@ -11960,7 +11960,7 @@
         </p:nvGrpSpPr>
         <p:grpSpPr>
           <a:xfrm>
-            <a:off x="2428568" y="1379336"/>
+            <a:off x="2119647" y="1379336"/>
             <a:ext cx="1433757" cy="1409677"/>
             <a:chOff x="2428568" y="1379336"/>
             <a:chExt cx="1433757" cy="1409677"/>
@@ -12108,9 +12108,9 @@
                                     <p:cond delay="0"/>
                                   </p:stCondLst>
                                   <p:childTnLst>
-                                    <p:animMotion origin="layout" path="M -1.80556E-6 1.16959E-6 L 0.70295 0.00329 " pathEditMode="relative" rAng="0" ptsTypes="AA">
+                                    <p:animMotion origin="layout" path="M -4.72222E-6 1.16959E-6 L 0.71919 0.00036 " pathEditMode="relative" rAng="0" ptsTypes="AA">
                                       <p:cBhvr>
-                                        <p:cTn id="6" dur="5000" fill="hold"/>
+                                        <p:cTn id="6" dur="6000" fill="hold"/>
                                         <p:tgtEl>
                                           <p:spTgt spid="2"/>
                                         </p:tgtEl>
@@ -12119,7 +12119,7 @@
                                           <p:attrName>ppt_y</p:attrName>
                                         </p:attrNameLst>
                                       </p:cBhvr>
-                                      <p:rCtr x="35148" y="164"/>
+                                      <p:rCtr x="35955" y="18"/>
                                     </p:animMotion>
                                   </p:childTnLst>
                                 </p:cTn>
@@ -12130,7 +12130,7 @@
                                     <p:cond delay="0"/>
                                   </p:stCondLst>
                                   <p:childTnLst>
-                                    <p:animMotion origin="layout" path="M 1.38889E-6 6.43275E-7 L 0.702 0.00201 " pathEditMode="relative" rAng="0" ptsTypes="AA">
+                                    <p:animMotion origin="layout" path="M 1.66667E-6 -0.00292 L 0.71944 -0.00091 " pathEditMode="relative" rAng="0" ptsTypes="AA">
                                       <p:cBhvr>
                                         <p:cTn id="8" dur="4000" fill="hold"/>
                                         <p:tgtEl>
@@ -12141,7 +12141,7 @@
                                           <p:attrName>ppt_y</p:attrName>
                                         </p:attrNameLst>
                                       </p:cBhvr>
-                                      <p:rCtr x="35095" y="91"/>
+                                      <p:rCtr x="35972" y="91"/>
                                     </p:animMotion>
                                   </p:childTnLst>
                                 </p:cTn>
@@ -12152,7 +12152,7 @@
                                     <p:cond delay="0"/>
                                   </p:stCondLst>
                                   <p:childTnLst>
-                                    <p:animMotion origin="layout" path="M 1.38889E-6 -4.44444E-6 L 0.702 0.00293 " pathEditMode="relative" rAng="0" ptsTypes="AA">
+                                    <p:animMotion origin="layout" path="M 0.01788 -4.44444E-6 L 0.71988 0.00293 " pathEditMode="relative" rAng="0" ptsTypes="AA">
                                       <p:cBhvr>
                                         <p:cTn id="10" dur="3000" fill="hold"/>
                                         <p:tgtEl>
@@ -12174,7 +12174,7 @@
                                     <p:cond delay="0"/>
                                   </p:stCondLst>
                                   <p:childTnLst>
-                                    <p:animMotion origin="layout" path="M 2.5E-6 -1.52047E-6 L 0.70061 -0.00055 " pathEditMode="relative" rAng="0" ptsTypes="AA">
+                                    <p:animMotion origin="layout" path="M 0.01788 -1.52047E-6 L 0.71849 -0.00055 " pathEditMode="relative" rAng="0" ptsTypes="AA">
                                       <p:cBhvr>
                                         <p:cTn id="12" dur="2000" fill="hold"/>
                                         <p:tgtEl>
@@ -12196,7 +12196,7 @@
                                     <p:cond delay="0"/>
                                   </p:stCondLst>
                                   <p:childTnLst>
-                                    <p:animMotion origin="layout" path="M -4.16667E-6 -3.50877E-7 L 0.70382 0.0011 " pathEditMode="relative" rAng="0" ptsTypes="AA">
+                                    <p:animMotion origin="layout" path="M 0.01615 -3.50877E-7 L 0.71997 0.0011 " pathEditMode="relative" rAng="0" ptsTypes="AA">
                                       <p:cBhvr>
                                         <p:cTn id="14" dur="800" fill="hold"/>
                                         <p:tgtEl>

</xml_diff>